<commit_message>
Add more tests to ppt file
</commit_message>
<xml_diff>
--- a/doc/test/PasteLab.pptx
+++ b/doc/test/PasteLab.pptx
@@ -8,7 +8,7 @@
     <p:sldMasterId id="2147483684" r:id="rId4"/>
   </p:sldMasterIdLst>
   <p:notesMasterIdLst>
-    <p:notesMasterId r:id="rId31"/>
+    <p:notesMasterId r:id="rId32"/>
   </p:notesMasterIdLst>
   <p:sldIdLst>
     <p:sldId id="287" r:id="rId5"/>
@@ -34,9 +34,10 @@
     <p:sldId id="386" r:id="rId25"/>
     <p:sldId id="383" r:id="rId26"/>
     <p:sldId id="388" r:id="rId27"/>
-    <p:sldId id="387" r:id="rId28"/>
-    <p:sldId id="384" r:id="rId29"/>
-    <p:sldId id="389" r:id="rId30"/>
+    <p:sldId id="390" r:id="rId28"/>
+    <p:sldId id="387" r:id="rId29"/>
+    <p:sldId id="384" r:id="rId30"/>
+    <p:sldId id="389" r:id="rId31"/>
   </p:sldIdLst>
   <p:sldSz cx="9144000" cy="6858000" type="screen4x3"/>
   <p:notesSz cx="6858000" cy="9144000"/>
@@ -167,6 +168,7 @@
             <p14:sldId id="386"/>
             <p14:sldId id="383"/>
             <p14:sldId id="388"/>
+            <p14:sldId id="390"/>
             <p14:sldId id="387"/>
             <p14:sldId id="384"/>
             <p14:sldId id="389"/>
@@ -263,7 +265,7 @@
           <a:p>
             <a:fld id="{43E32005-3A63-48D2-8C73-BF5F95786EBD}" type="datetimeFigureOut">
               <a:rPr lang="en-US" smtClean="0"/>
-              <a:t>5/15/2017</a:t>
+              <a:t>5/19/2017</a:t>
             </a:fld>
             <a:endParaRPr lang="en-US"/>
           </a:p>
@@ -1693,11 +1695,7 @@
           <a:p>
             <a:r>
               <a:rPr lang="en-US" dirty="0" smtClean="0"/>
-              <a:t>You can also cut by using </a:t>
-            </a:r>
-            <a:r>
-              <a:rPr lang="en-US" dirty="0" smtClean="0"/>
-              <a:t>ctrl-x</a:t>
+              <a:t>You can also cut by using ctrl-x</a:t>
             </a:r>
           </a:p>
           <a:p>
@@ -1797,11 +1795,7 @@
           <a:p>
             <a:r>
               <a:rPr lang="en-US" dirty="0" smtClean="0"/>
-              <a:t>You can also cut by using </a:t>
-            </a:r>
-            <a:r>
-              <a:rPr lang="en-US" dirty="0" smtClean="0"/>
-              <a:t>ctrl-x</a:t>
+              <a:t>You can also cut by using ctrl-x</a:t>
             </a:r>
           </a:p>
           <a:p>
@@ -1836,7 +1830,7 @@
           <a:p>
             <a:fld id="{0FE7C38A-472B-4221-8E00-509E1DA863EC}" type="slidenum">
               <a:rPr lang="en-US" smtClean="0"/>
-              <a:t>24</a:t>
+              <a:t>25</a:t>
             </a:fld>
             <a:endParaRPr lang="en-US"/>
           </a:p>
@@ -1928,7 +1922,7 @@
           <a:p>
             <a:fld id="{0FE7C38A-472B-4221-8E00-509E1DA863EC}" type="slidenum">
               <a:rPr lang="en-US" smtClean="0"/>
-              <a:t>25</a:t>
+              <a:t>26</a:t>
             </a:fld>
             <a:endParaRPr lang="en-US"/>
           </a:p>
@@ -2020,7 +2014,7 @@
           <a:p>
             <a:fld id="{0FE7C38A-472B-4221-8E00-509E1DA863EC}" type="slidenum">
               <a:rPr lang="en-US" smtClean="0"/>
-              <a:t>26</a:t>
+              <a:t>27</a:t>
             </a:fld>
             <a:endParaRPr lang="en-US"/>
           </a:p>
@@ -2854,7 +2848,7 @@
           <a:p>
             <a:fld id="{699DC775-C286-4358-8C92-D7E584E969B3}" type="datetimeFigureOut">
               <a:rPr lang="en-US" smtClean="0"/>
-              <a:t>5/15/2017</a:t>
+              <a:t>5/19/2017</a:t>
             </a:fld>
             <a:endParaRPr lang="en-US"/>
           </a:p>
@@ -3022,7 +3016,7 @@
           <a:p>
             <a:fld id="{699DC775-C286-4358-8C92-D7E584E969B3}" type="datetimeFigureOut">
               <a:rPr lang="en-US" smtClean="0"/>
-              <a:t>5/15/2017</a:t>
+              <a:t>5/19/2017</a:t>
             </a:fld>
             <a:endParaRPr lang="en-US"/>
           </a:p>
@@ -3200,7 +3194,7 @@
           <a:p>
             <a:fld id="{699DC775-C286-4358-8C92-D7E584E969B3}" type="datetimeFigureOut">
               <a:rPr lang="en-US" smtClean="0"/>
-              <a:t>5/15/2017</a:t>
+              <a:t>5/19/2017</a:t>
             </a:fld>
             <a:endParaRPr lang="en-US"/>
           </a:p>
@@ -3440,7 +3434,7 @@
           <a:p>
             <a:fld id="{699DC775-C286-4358-8C92-D7E584E969B3}" type="datetimeFigureOut">
               <a:rPr lang="en-US" smtClean="0"/>
-              <a:t>5/15/2017</a:t>
+              <a:t>5/19/2017</a:t>
             </a:fld>
             <a:endParaRPr lang="en-US"/>
           </a:p>
@@ -3608,7 +3602,7 @@
           <a:p>
             <a:fld id="{699DC775-C286-4358-8C92-D7E584E969B3}" type="datetimeFigureOut">
               <a:rPr lang="en-US" smtClean="0"/>
-              <a:t>5/15/2017</a:t>
+              <a:t>5/19/2017</a:t>
             </a:fld>
             <a:endParaRPr lang="en-US"/>
           </a:p>
@@ -3853,7 +3847,7 @@
           <a:p>
             <a:fld id="{699DC775-C286-4358-8C92-D7E584E969B3}" type="datetimeFigureOut">
               <a:rPr lang="en-US" smtClean="0"/>
-              <a:t>5/15/2017</a:t>
+              <a:t>5/19/2017</a:t>
             </a:fld>
             <a:endParaRPr lang="en-US"/>
           </a:p>
@@ -4138,7 +4132,7 @@
           <a:p>
             <a:fld id="{699DC775-C286-4358-8C92-D7E584E969B3}" type="datetimeFigureOut">
               <a:rPr lang="en-US" smtClean="0"/>
-              <a:t>5/15/2017</a:t>
+              <a:t>5/19/2017</a:t>
             </a:fld>
             <a:endParaRPr lang="en-US"/>
           </a:p>
@@ -4557,7 +4551,7 @@
           <a:p>
             <a:fld id="{699DC775-C286-4358-8C92-D7E584E969B3}" type="datetimeFigureOut">
               <a:rPr lang="en-US" smtClean="0"/>
-              <a:t>5/15/2017</a:t>
+              <a:t>5/19/2017</a:t>
             </a:fld>
             <a:endParaRPr lang="en-US"/>
           </a:p>
@@ -4674,7 +4668,7 @@
           <a:p>
             <a:fld id="{699DC775-C286-4358-8C92-D7E584E969B3}" type="datetimeFigureOut">
               <a:rPr lang="en-US" smtClean="0"/>
-              <a:t>5/15/2017</a:t>
+              <a:t>5/19/2017</a:t>
             </a:fld>
             <a:endParaRPr lang="en-US"/>
           </a:p>
@@ -4769,7 +4763,7 @@
           <a:p>
             <a:fld id="{699DC775-C286-4358-8C92-D7E584E969B3}" type="datetimeFigureOut">
               <a:rPr lang="en-US" smtClean="0"/>
-              <a:t>5/15/2017</a:t>
+              <a:t>5/19/2017</a:t>
             </a:fld>
             <a:endParaRPr lang="en-US"/>
           </a:p>
@@ -5044,7 +5038,7 @@
           <a:p>
             <a:fld id="{699DC775-C286-4358-8C92-D7E584E969B3}" type="datetimeFigureOut">
               <a:rPr lang="en-US" smtClean="0"/>
-              <a:t>5/15/2017</a:t>
+              <a:t>5/19/2017</a:t>
             </a:fld>
             <a:endParaRPr lang="en-US"/>
           </a:p>
@@ -5212,7 +5206,7 @@
           <a:p>
             <a:fld id="{699DC775-C286-4358-8C92-D7E584E969B3}" type="datetimeFigureOut">
               <a:rPr lang="en-US" smtClean="0"/>
-              <a:t>5/15/2017</a:t>
+              <a:t>5/19/2017</a:t>
             </a:fld>
             <a:endParaRPr lang="en-US"/>
           </a:p>
@@ -5464,7 +5458,7 @@
           <a:p>
             <a:fld id="{699DC775-C286-4358-8C92-D7E584E969B3}" type="datetimeFigureOut">
               <a:rPr lang="en-US" smtClean="0"/>
-              <a:t>5/15/2017</a:t>
+              <a:t>5/19/2017</a:t>
             </a:fld>
             <a:endParaRPr lang="en-US"/>
           </a:p>
@@ -5632,7 +5626,7 @@
           <a:p>
             <a:fld id="{699DC775-C286-4358-8C92-D7E584E969B3}" type="datetimeFigureOut">
               <a:rPr lang="en-US" smtClean="0"/>
-              <a:t>5/15/2017</a:t>
+              <a:t>5/19/2017</a:t>
             </a:fld>
             <a:endParaRPr lang="en-US"/>
           </a:p>
@@ -5810,7 +5804,7 @@
           <a:p>
             <a:fld id="{699DC775-C286-4358-8C92-D7E584E969B3}" type="datetimeFigureOut">
               <a:rPr lang="en-US" smtClean="0"/>
-              <a:t>5/15/2017</a:t>
+              <a:t>5/19/2017</a:t>
             </a:fld>
             <a:endParaRPr lang="en-US"/>
           </a:p>
@@ -6058,7 +6052,7 @@
           <a:p>
             <a:fld id="{699DC775-C286-4358-8C92-D7E584E969B3}" type="datetimeFigureOut">
               <a:rPr lang="en-US" smtClean="0"/>
-              <a:t>5/15/2017</a:t>
+              <a:t>5/19/2017</a:t>
             </a:fld>
             <a:endParaRPr lang="en-US"/>
           </a:p>
@@ -6234,7 +6228,7 @@
           <a:p>
             <a:fld id="{699DC775-C286-4358-8C92-D7E584E969B3}" type="datetimeFigureOut">
               <a:rPr lang="en-US" smtClean="0"/>
-              <a:t>5/15/2017</a:t>
+              <a:t>5/19/2017</a:t>
             </a:fld>
             <a:endParaRPr lang="en-US"/>
           </a:p>
@@ -6487,7 +6481,7 @@
           <a:p>
             <a:fld id="{699DC775-C286-4358-8C92-D7E584E969B3}" type="datetimeFigureOut">
               <a:rPr lang="en-US" smtClean="0"/>
-              <a:t>5/15/2017</a:t>
+              <a:t>5/19/2017</a:t>
             </a:fld>
             <a:endParaRPr lang="en-US"/>
           </a:p>
@@ -6780,7 +6774,7 @@
           <a:p>
             <a:fld id="{699DC775-C286-4358-8C92-D7E584E969B3}" type="datetimeFigureOut">
               <a:rPr lang="en-US" smtClean="0"/>
-              <a:t>5/15/2017</a:t>
+              <a:t>5/19/2017</a:t>
             </a:fld>
             <a:endParaRPr lang="en-US"/>
           </a:p>
@@ -7207,7 +7201,7 @@
           <a:p>
             <a:fld id="{699DC775-C286-4358-8C92-D7E584E969B3}" type="datetimeFigureOut">
               <a:rPr lang="en-US" smtClean="0"/>
-              <a:t>5/15/2017</a:t>
+              <a:t>5/19/2017</a:t>
             </a:fld>
             <a:endParaRPr lang="en-US"/>
           </a:p>
@@ -7332,7 +7326,7 @@
           <a:p>
             <a:fld id="{699DC775-C286-4358-8C92-D7E584E969B3}" type="datetimeFigureOut">
               <a:rPr lang="en-US" smtClean="0"/>
-              <a:t>5/15/2017</a:t>
+              <a:t>5/19/2017</a:t>
             </a:fld>
             <a:endParaRPr lang="en-US"/>
           </a:p>
@@ -7435,7 +7429,7 @@
           <a:p>
             <a:fld id="{699DC775-C286-4358-8C92-D7E584E969B3}" type="datetimeFigureOut">
               <a:rPr lang="en-US" smtClean="0"/>
-              <a:t>5/15/2017</a:t>
+              <a:t>5/19/2017</a:t>
             </a:fld>
             <a:endParaRPr lang="en-US"/>
           </a:p>
@@ -7680,7 +7674,7 @@
           <a:p>
             <a:fld id="{699DC775-C286-4358-8C92-D7E584E969B3}" type="datetimeFigureOut">
               <a:rPr lang="en-US" smtClean="0"/>
-              <a:t>5/15/2017</a:t>
+              <a:t>5/19/2017</a:t>
             </a:fld>
             <a:endParaRPr lang="en-US"/>
           </a:p>
@@ -7963,7 +7957,7 @@
           <a:p>
             <a:fld id="{699DC775-C286-4358-8C92-D7E584E969B3}" type="datetimeFigureOut">
               <a:rPr lang="en-US" smtClean="0"/>
-              <a:t>5/15/2017</a:t>
+              <a:t>5/19/2017</a:t>
             </a:fld>
             <a:endParaRPr lang="en-US"/>
           </a:p>
@@ -8223,7 +8217,7 @@
           <a:p>
             <a:fld id="{699DC775-C286-4358-8C92-D7E584E969B3}" type="datetimeFigureOut">
               <a:rPr lang="en-US" smtClean="0"/>
-              <a:t>5/15/2017</a:t>
+              <a:t>5/19/2017</a:t>
             </a:fld>
             <a:endParaRPr lang="en-US"/>
           </a:p>
@@ -8399,7 +8393,7 @@
           <a:p>
             <a:fld id="{699DC775-C286-4358-8C92-D7E584E969B3}" type="datetimeFigureOut">
               <a:rPr lang="en-US" smtClean="0"/>
-              <a:t>5/15/2017</a:t>
+              <a:t>5/19/2017</a:t>
             </a:fld>
             <a:endParaRPr lang="en-US"/>
           </a:p>
@@ -8585,7 +8579,7 @@
           <a:p>
             <a:fld id="{699DC775-C286-4358-8C92-D7E584E969B3}" type="datetimeFigureOut">
               <a:rPr lang="en-US" smtClean="0"/>
-              <a:t>5/15/2017</a:t>
+              <a:t>5/19/2017</a:t>
             </a:fld>
             <a:endParaRPr lang="en-US"/>
           </a:p>
@@ -8777,7 +8771,7 @@
           <a:p>
             <a:fld id="{45696B32-6A70-48EC-8939-9D142D9557CD}" type="datetimeFigureOut">
               <a:rPr lang="en-US" smtClean="0"/>
-              <a:t>5/15/2017</a:t>
+              <a:t>5/19/2017</a:t>
             </a:fld>
             <a:endParaRPr lang="en-US"/>
           </a:p>
@@ -9093,7 +9087,7 @@
           <a:p>
             <a:fld id="{45696B32-6A70-48EC-8939-9D142D9557CD}" type="datetimeFigureOut">
               <a:rPr lang="en-US" smtClean="0"/>
-              <a:t>5/15/2017</a:t>
+              <a:t>5/19/2017</a:t>
             </a:fld>
             <a:endParaRPr lang="en-US"/>
           </a:p>
@@ -9339,7 +9333,7 @@
           <a:p>
             <a:fld id="{45696B32-6A70-48EC-8939-9D142D9557CD}" type="datetimeFigureOut">
               <a:rPr lang="en-US" smtClean="0"/>
-              <a:t>5/15/2017</a:t>
+              <a:t>5/19/2017</a:t>
             </a:fld>
             <a:endParaRPr lang="en-US"/>
           </a:p>
@@ -9571,7 +9565,7 @@
           <a:p>
             <a:fld id="{45696B32-6A70-48EC-8939-9D142D9557CD}" type="datetimeFigureOut">
               <a:rPr lang="en-US" smtClean="0"/>
-              <a:t>5/15/2017</a:t>
+              <a:t>5/19/2017</a:t>
             </a:fld>
             <a:endParaRPr lang="en-US"/>
           </a:p>
@@ -9938,7 +9932,7 @@
           <a:p>
             <a:fld id="{45696B32-6A70-48EC-8939-9D142D9557CD}" type="datetimeFigureOut">
               <a:rPr lang="en-US" smtClean="0"/>
-              <a:t>5/15/2017</a:t>
+              <a:t>5/19/2017</a:t>
             </a:fld>
             <a:endParaRPr lang="en-US"/>
           </a:p>
@@ -10056,7 +10050,7 @@
           <a:p>
             <a:fld id="{45696B32-6A70-48EC-8939-9D142D9557CD}" type="datetimeFigureOut">
               <a:rPr lang="en-US" smtClean="0"/>
-              <a:t>5/15/2017</a:t>
+              <a:t>5/19/2017</a:t>
             </a:fld>
             <a:endParaRPr lang="en-US"/>
           </a:p>
@@ -10341,7 +10335,7 @@
           <a:p>
             <a:fld id="{699DC775-C286-4358-8C92-D7E584E969B3}" type="datetimeFigureOut">
               <a:rPr lang="en-US" smtClean="0"/>
-              <a:t>5/15/2017</a:t>
+              <a:t>5/19/2017</a:t>
             </a:fld>
             <a:endParaRPr lang="en-US"/>
           </a:p>
@@ -10436,7 +10430,7 @@
           <a:p>
             <a:fld id="{45696B32-6A70-48EC-8939-9D142D9557CD}" type="datetimeFigureOut">
               <a:rPr lang="en-US" smtClean="0"/>
-              <a:t>5/15/2017</a:t>
+              <a:t>5/19/2017</a:t>
             </a:fld>
             <a:endParaRPr lang="en-US"/>
           </a:p>
@@ -10713,7 +10707,7 @@
           <a:p>
             <a:fld id="{45696B32-6A70-48EC-8939-9D142D9557CD}" type="datetimeFigureOut">
               <a:rPr lang="en-US" smtClean="0"/>
-              <a:t>5/15/2017</a:t>
+              <a:t>5/19/2017</a:t>
             </a:fld>
             <a:endParaRPr lang="en-US"/>
           </a:p>
@@ -10966,7 +10960,7 @@
           <a:p>
             <a:fld id="{45696B32-6A70-48EC-8939-9D142D9557CD}" type="datetimeFigureOut">
               <a:rPr lang="en-US" smtClean="0"/>
-              <a:t>5/15/2017</a:t>
+              <a:t>5/19/2017</a:t>
             </a:fld>
             <a:endParaRPr lang="en-US"/>
           </a:p>
@@ -11136,7 +11130,7 @@
           <a:p>
             <a:fld id="{45696B32-6A70-48EC-8939-9D142D9557CD}" type="datetimeFigureOut">
               <a:rPr lang="en-US" smtClean="0"/>
-              <a:t>5/15/2017</a:t>
+              <a:t>5/19/2017</a:t>
             </a:fld>
             <a:endParaRPr lang="en-US"/>
           </a:p>
@@ -11316,7 +11310,7 @@
           <a:p>
             <a:fld id="{45696B32-6A70-48EC-8939-9D142D9557CD}" type="datetimeFigureOut">
               <a:rPr lang="en-US" smtClean="0"/>
-              <a:t>5/15/2017</a:t>
+              <a:t>5/19/2017</a:t>
             </a:fld>
             <a:endParaRPr lang="en-US"/>
           </a:p>
@@ -11735,7 +11729,7 @@
           <a:p>
             <a:fld id="{699DC775-C286-4358-8C92-D7E584E969B3}" type="datetimeFigureOut">
               <a:rPr lang="en-US" smtClean="0"/>
-              <a:t>5/15/2017</a:t>
+              <a:t>5/19/2017</a:t>
             </a:fld>
             <a:endParaRPr lang="en-US"/>
           </a:p>
@@ -11852,7 +11846,7 @@
           <a:p>
             <a:fld id="{699DC775-C286-4358-8C92-D7E584E969B3}" type="datetimeFigureOut">
               <a:rPr lang="en-US" smtClean="0"/>
-              <a:t>5/15/2017</a:t>
+              <a:t>5/19/2017</a:t>
             </a:fld>
             <a:endParaRPr lang="en-US"/>
           </a:p>
@@ -11947,7 +11941,7 @@
           <a:p>
             <a:fld id="{699DC775-C286-4358-8C92-D7E584E969B3}" type="datetimeFigureOut">
               <a:rPr lang="en-US" smtClean="0"/>
-              <a:t>5/15/2017</a:t>
+              <a:t>5/19/2017</a:t>
             </a:fld>
             <a:endParaRPr lang="en-US"/>
           </a:p>
@@ -12222,7 +12216,7 @@
           <a:p>
             <a:fld id="{699DC775-C286-4358-8C92-D7E584E969B3}" type="datetimeFigureOut">
               <a:rPr lang="en-US" smtClean="0"/>
-              <a:t>5/15/2017</a:t>
+              <a:t>5/19/2017</a:t>
             </a:fld>
             <a:endParaRPr lang="en-US"/>
           </a:p>
@@ -12474,7 +12468,7 @@
           <a:p>
             <a:fld id="{699DC775-C286-4358-8C92-D7E584E969B3}" type="datetimeFigureOut">
               <a:rPr lang="en-US" smtClean="0"/>
-              <a:t>5/15/2017</a:t>
+              <a:t>5/19/2017</a:t>
             </a:fld>
             <a:endParaRPr lang="en-US"/>
           </a:p>
@@ -12685,7 +12679,7 @@
           <a:p>
             <a:fld id="{699DC775-C286-4358-8C92-D7E584E969B3}" type="datetimeFigureOut">
               <a:rPr lang="en-US" smtClean="0"/>
-              <a:t>5/15/2017</a:t>
+              <a:t>5/19/2017</a:t>
             </a:fld>
             <a:endParaRPr lang="en-US"/>
           </a:p>
@@ -13198,7 +13192,7 @@
           <a:p>
             <a:fld id="{699DC775-C286-4358-8C92-D7E584E969B3}" type="datetimeFigureOut">
               <a:rPr lang="en-US" smtClean="0"/>
-              <a:t>5/15/2017</a:t>
+              <a:t>5/19/2017</a:t>
             </a:fld>
             <a:endParaRPr lang="en-US"/>
           </a:p>
@@ -13709,7 +13703,7 @@
           <a:p>
             <a:fld id="{699DC775-C286-4358-8C92-D7E584E969B3}" type="datetimeFigureOut">
               <a:rPr lang="en-US" smtClean="0"/>
-              <a:t>5/15/2017</a:t>
+              <a:t>5/19/2017</a:t>
             </a:fld>
             <a:endParaRPr lang="en-US"/>
           </a:p>
@@ -14219,7 +14213,7 @@
           <a:p>
             <a:fld id="{45696B32-6A70-48EC-8939-9D142D9557CD}" type="datetimeFigureOut">
               <a:rPr lang="en-US" smtClean="0"/>
-              <a:t>5/15/2017</a:t>
+              <a:t>5/19/2017</a:t>
             </a:fld>
             <a:endParaRPr lang="en-US"/>
           </a:p>
@@ -16448,11 +16442,7 @@
           <a:p>
             <a:r>
               <a:rPr lang="en-US" dirty="0" smtClean="0"/>
-              <a:t>Paste:: </a:t>
-            </a:r>
-            <a:r>
-              <a:rPr lang="en-US" dirty="0" smtClean="0"/>
-              <a:t>Paste Into Group</a:t>
+              <a:t>Paste:: Paste Into Group</a:t>
             </a:r>
             <a:endParaRPr lang="en-SG" dirty="0"/>
           </a:p>
@@ -16493,15 +16483,23 @@
             </a:r>
             <a:r>
               <a:rPr lang="en-US" dirty="0" smtClean="0"/>
-              <a:t>the appropriate </a:t>
-            </a:r>
+              <a:t>the appropriate shape/group.</a:t>
+            </a:r>
+            <a:endParaRPr lang="en-US" dirty="0"/>
+          </a:p>
+          <a:p>
+            <a:pPr marL="285750" indent="-285750"/>
             <a:r>
               <a:rPr lang="en-US" dirty="0" smtClean="0"/>
-              <a:t>shape/group</a:t>
-            </a:r>
+              <a:t>Right click on the shape/group and click cut/copy.</a:t>
+            </a:r>
+            <a:endParaRPr lang="en-US" dirty="0"/>
+          </a:p>
+          <a:p>
+            <a:pPr marL="285750" indent="-285750"/>
             <a:r>
               <a:rPr lang="en-US" dirty="0" smtClean="0"/>
-              <a:t>.</a:t>
+              <a:t>Right click on the group of squares</a:t>
             </a:r>
             <a:endParaRPr lang="en-US" dirty="0"/>
           </a:p>
@@ -16509,39 +16507,7 @@
             <a:pPr marL="285750" indent="-285750"/>
             <a:r>
               <a:rPr lang="en-US" dirty="0" smtClean="0"/>
-              <a:t>Right click on the shape/group and click </a:t>
-            </a:r>
-            <a:r>
-              <a:rPr lang="en-US" dirty="0" smtClean="0"/>
-              <a:t>cut/copy.</a:t>
-            </a:r>
-            <a:endParaRPr lang="en-US" dirty="0"/>
-          </a:p>
-          <a:p>
-            <a:pPr marL="285750" indent="-285750"/>
-            <a:r>
-              <a:rPr lang="en-US" dirty="0" smtClean="0"/>
-              <a:t>Right click on the </a:t>
-            </a:r>
-            <a:r>
-              <a:rPr lang="en-US" dirty="0" smtClean="0"/>
-              <a:t>group of squares</a:t>
-            </a:r>
-            <a:endParaRPr lang="en-US" dirty="0"/>
-          </a:p>
-          <a:p>
-            <a:pPr marL="285750" indent="-285750"/>
-            <a:r>
-              <a:rPr lang="en-US" dirty="0" smtClean="0"/>
-              <a:t>Select </a:t>
-            </a:r>
-            <a:r>
-              <a:rPr lang="en-US" dirty="0" smtClean="0"/>
-              <a:t>Paste Into Group in </a:t>
-            </a:r>
-            <a:r>
-              <a:rPr lang="en-US" dirty="0" smtClean="0"/>
-              <a:t>the </a:t>
+              <a:t>Select Paste Into Group in the </a:t>
             </a:r>
             <a:r>
               <a:rPr lang="en-US" dirty="0" err="1" smtClean="0"/>
@@ -16796,6 +16762,217 @@
           <a:chExt cx="0" cy="0"/>
         </a:xfrm>
       </p:grpSpPr>
+      <p:grpSp>
+        <p:nvGrpSpPr>
+          <p:cNvPr id="2" name="Group 1"/>
+          <p:cNvGrpSpPr/>
+          <p:nvPr/>
+        </p:nvGrpSpPr>
+        <p:grpSpPr>
+          <a:xfrm>
+            <a:off x="914400" y="1116842"/>
+            <a:ext cx="8001000" cy="3150358"/>
+            <a:chOff x="914400" y="1116842"/>
+            <a:chExt cx="8001000" cy="3150358"/>
+          </a:xfrm>
+        </p:grpSpPr>
+        <p:sp>
+          <p:nvSpPr>
+            <p:cNvPr id="5" name="Rectangle 4"/>
+            <p:cNvSpPr/>
+            <p:nvPr/>
+          </p:nvSpPr>
+          <p:spPr>
+            <a:xfrm>
+              <a:off x="914400" y="1116842"/>
+              <a:ext cx="1981200" cy="2057400"/>
+            </a:xfrm>
+            <a:prstGeom prst="rect">
+              <a:avLst/>
+            </a:prstGeom>
+            <a:solidFill>
+              <a:srgbClr val="FF0000"/>
+            </a:solidFill>
+          </p:spPr>
+          <p:style>
+            <a:lnRef idx="2">
+              <a:schemeClr val="accent1">
+                <a:shade val="50000"/>
+              </a:schemeClr>
+            </a:lnRef>
+            <a:fillRef idx="1">
+              <a:schemeClr val="accent1"/>
+            </a:fillRef>
+            <a:effectRef idx="0">
+              <a:schemeClr val="accent1"/>
+            </a:effectRef>
+            <a:fontRef idx="minor">
+              <a:schemeClr val="lt1"/>
+            </a:fontRef>
+          </p:style>
+          <p:txBody>
+            <a:bodyPr rtlCol="0" anchor="ctr"/>
+            <a:lstStyle/>
+            <a:p>
+              <a:pPr algn="ctr"/>
+              <a:endParaRPr lang="en-US"/>
+            </a:p>
+          </p:txBody>
+        </p:sp>
+        <p:sp>
+          <p:nvSpPr>
+            <p:cNvPr id="6" name="Rectangle 5"/>
+            <p:cNvSpPr/>
+            <p:nvPr/>
+          </p:nvSpPr>
+          <p:spPr>
+            <a:xfrm>
+              <a:off x="1447800" y="1650242"/>
+              <a:ext cx="1981200" cy="2057400"/>
+            </a:xfrm>
+            <a:prstGeom prst="rect">
+              <a:avLst/>
+            </a:prstGeom>
+            <a:solidFill>
+              <a:srgbClr val="00B050"/>
+            </a:solidFill>
+          </p:spPr>
+          <p:style>
+            <a:lnRef idx="2">
+              <a:schemeClr val="accent1">
+                <a:shade val="50000"/>
+              </a:schemeClr>
+            </a:lnRef>
+            <a:fillRef idx="1">
+              <a:schemeClr val="accent1"/>
+            </a:fillRef>
+            <a:effectRef idx="0">
+              <a:schemeClr val="accent1"/>
+            </a:effectRef>
+            <a:fontRef idx="minor">
+              <a:schemeClr val="lt1"/>
+            </a:fontRef>
+          </p:style>
+          <p:txBody>
+            <a:bodyPr rtlCol="0" anchor="ctr"/>
+            <a:lstStyle/>
+            <a:p>
+              <a:pPr algn="ctr"/>
+              <a:endParaRPr lang="en-US"/>
+            </a:p>
+          </p:txBody>
+        </p:sp>
+        <p:sp>
+          <p:nvSpPr>
+            <p:cNvPr id="7" name="Rectangle 6"/>
+            <p:cNvSpPr/>
+            <p:nvPr/>
+          </p:nvSpPr>
+          <p:spPr>
+            <a:xfrm>
+              <a:off x="1981200" y="2209800"/>
+              <a:ext cx="1981200" cy="2057400"/>
+            </a:xfrm>
+            <a:prstGeom prst="rect">
+              <a:avLst/>
+            </a:prstGeom>
+            <a:solidFill>
+              <a:srgbClr val="0070C0"/>
+            </a:solidFill>
+          </p:spPr>
+          <p:style>
+            <a:lnRef idx="2">
+              <a:schemeClr val="accent1">
+                <a:shade val="50000"/>
+              </a:schemeClr>
+            </a:lnRef>
+            <a:fillRef idx="1">
+              <a:schemeClr val="accent1"/>
+            </a:fillRef>
+            <a:effectRef idx="0">
+              <a:schemeClr val="accent1"/>
+            </a:effectRef>
+            <a:fontRef idx="minor">
+              <a:schemeClr val="lt1"/>
+            </a:fontRef>
+          </p:style>
+          <p:txBody>
+            <a:bodyPr rtlCol="0" anchor="ctr"/>
+            <a:lstStyle/>
+            <a:p>
+              <a:pPr algn="ctr"/>
+              <a:endParaRPr lang="en-US"/>
+            </a:p>
+          </p:txBody>
+        </p:sp>
+        <p:pic>
+          <p:nvPicPr>
+            <p:cNvPr id="9" name="selectMe"/>
+            <p:cNvPicPr>
+              <a:picLocks noChangeAspect="1"/>
+            </p:cNvPicPr>
+            <p:nvPr/>
+          </p:nvPicPr>
+          <p:blipFill>
+            <a:blip r:embed="rId2">
+              <a:extLst>
+                <a:ext uri="{28A0092B-C50C-407E-A947-70E740481C1C}">
+                  <a14:useLocalDpi xmlns:a14="http://schemas.microsoft.com/office/drawing/2010/main" val="0"/>
+                </a:ext>
+              </a:extLst>
+            </a:blip>
+            <a:stretch>
+              <a:fillRect/>
+            </a:stretch>
+          </p:blipFill>
+          <p:spPr>
+            <a:xfrm>
+              <a:off x="4343400" y="1208782"/>
+              <a:ext cx="4572000" cy="3058418"/>
+            </a:xfrm>
+            <a:prstGeom prst="rect">
+              <a:avLst/>
+            </a:prstGeom>
+          </p:spPr>
+        </p:pic>
+      </p:grpSp>
+    </p:spTree>
+    <p:extLst>
+      <p:ext uri="{BB962C8B-B14F-4D97-AF65-F5344CB8AC3E}">
+        <p14:creationId xmlns:p14="http://schemas.microsoft.com/office/powerpoint/2010/main" val="1259813525"/>
+      </p:ext>
+    </p:extLst>
+  </p:cSld>
+  <p:clrMapOvr>
+    <a:masterClrMapping/>
+  </p:clrMapOvr>
+  <p:timing>
+    <p:tnLst>
+      <p:par>
+        <p:cTn id="1" dur="indefinite" restart="never" nodeType="tmRoot"/>
+      </p:par>
+    </p:tnLst>
+  </p:timing>
+</p:sld>
+</file>
+
+<file path=ppt/slides/slide25.xml><?xml version="1.0" encoding="utf-8"?>
+<p:sld xmlns:a="http://schemas.openxmlformats.org/drawingml/2006/main" xmlns:r="http://schemas.openxmlformats.org/officeDocument/2006/relationships" xmlns:p="http://schemas.openxmlformats.org/presentationml/2006/main">
+  <p:cSld>
+    <p:spTree>
+      <p:nvGrpSpPr>
+        <p:cNvPr id="1" name=""/>
+        <p:cNvGrpSpPr/>
+        <p:nvPr/>
+      </p:nvGrpSpPr>
+      <p:grpSpPr>
+        <a:xfrm>
+          <a:off x="0" y="0"/>
+          <a:ext cx="0" cy="0"/>
+          <a:chOff x="0" y="0"/>
+          <a:chExt cx="0" cy="0"/>
+        </a:xfrm>
+      </p:grpSpPr>
       <p:sp>
         <p:nvSpPr>
           <p:cNvPr id="2" name="Title 1"/>
@@ -16813,11 +16990,7 @@
           <a:p>
             <a:r>
               <a:rPr lang="en-US" dirty="0" smtClean="0"/>
-              <a:t>Paste:: </a:t>
-            </a:r>
-            <a:r>
-              <a:rPr lang="en-US" dirty="0" smtClean="0"/>
-              <a:t>Merge Into One Group</a:t>
+              <a:t>Paste:: Merge Into One Group</a:t>
             </a:r>
             <a:endParaRPr lang="en-SG" dirty="0"/>
           </a:p>
@@ -16858,11 +17031,15 @@
             </a:r>
             <a:r>
               <a:rPr lang="en-US" dirty="0" smtClean="0"/>
-              <a:t>the appropriate </a:t>
-            </a:r>
+              <a:t>the appropriate shapes/groups.</a:t>
+            </a:r>
+            <a:endParaRPr lang="en-US" dirty="0"/>
+          </a:p>
+          <a:p>
+            <a:pPr marL="285750" indent="-285750"/>
             <a:r>
               <a:rPr lang="en-US" dirty="0" smtClean="0"/>
-              <a:t>shapes/groups.</a:t>
+              <a:t>Right click on the shapes/groups.</a:t>
             </a:r>
             <a:endParaRPr lang="en-US" dirty="0"/>
           </a:p>
@@ -16870,23 +17047,7 @@
             <a:pPr marL="285750" indent="-285750"/>
             <a:r>
               <a:rPr lang="en-US" dirty="0" smtClean="0"/>
-              <a:t>Right click on the </a:t>
-            </a:r>
-            <a:r>
-              <a:rPr lang="en-US" dirty="0" smtClean="0"/>
-              <a:t>shapes/groups.</a:t>
-            </a:r>
-            <a:endParaRPr lang="en-US" dirty="0"/>
-          </a:p>
-          <a:p>
-            <a:pPr marL="285750" indent="-285750"/>
-            <a:r>
-              <a:rPr lang="en-US" dirty="0" smtClean="0"/>
-              <a:t>Select Merge Into One Group in </a:t>
-            </a:r>
-            <a:r>
-              <a:rPr lang="en-US" dirty="0" smtClean="0"/>
-              <a:t>the </a:t>
+              <a:t>Select Merge Into One Group in the </a:t>
             </a:r>
             <a:r>
               <a:rPr lang="en-US" dirty="0" err="1" smtClean="0"/>
@@ -16913,7 +17074,7 @@
 </p:sld>
 </file>
 
-<file path=ppt/slides/slide25.xml><?xml version="1.0" encoding="utf-8"?>
+<file path=ppt/slides/slide26.xml><?xml version="1.0" encoding="utf-8"?>
 <p:sld xmlns:a="http://schemas.openxmlformats.org/drawingml/2006/main" xmlns:r="http://schemas.openxmlformats.org/officeDocument/2006/relationships" xmlns:p="http://schemas.openxmlformats.org/presentationml/2006/main">
   <p:cSld>
     <p:spTree>
@@ -17238,7 +17399,7 @@
 </p:sld>
 </file>
 
-<file path=ppt/slides/slide26.xml><?xml version="1.0" encoding="utf-8"?>
+<file path=ppt/slides/slide27.xml><?xml version="1.0" encoding="utf-8"?>
 <p:sld xmlns:a="http://schemas.openxmlformats.org/drawingml/2006/main" xmlns:r="http://schemas.openxmlformats.org/officeDocument/2006/relationships" xmlns:p="http://schemas.openxmlformats.org/presentationml/2006/main">
   <p:cSld>
     <p:spTree>

</xml_diff>

<commit_message>
Change to Paste lab UT to FT
</commit_message>
<xml_diff>
--- a/doc/test/PasteLab.pptx
+++ b/doc/test/PasteLab.pptx
@@ -8,7 +8,7 @@
     <p:sldMasterId id="2147483684" r:id="rId4"/>
   </p:sldMasterIdLst>
   <p:notesMasterIdLst>
-    <p:notesMasterId r:id="rId32"/>
+    <p:notesMasterId r:id="rId29"/>
   </p:notesMasterIdLst>
   <p:sldIdLst>
     <p:sldId id="287" r:id="rId5"/>
@@ -29,15 +29,12 @@
     <p:sldId id="378" r:id="rId20"/>
     <p:sldId id="379" r:id="rId21"/>
     <p:sldId id="380" r:id="rId22"/>
-    <p:sldId id="382" r:id="rId23"/>
+    <p:sldId id="391" r:id="rId23"/>
     <p:sldId id="385" r:id="rId24"/>
-    <p:sldId id="386" r:id="rId25"/>
+    <p:sldId id="394" r:id="rId25"/>
     <p:sldId id="383" r:id="rId26"/>
     <p:sldId id="388" r:id="rId27"/>
-    <p:sldId id="390" r:id="rId28"/>
-    <p:sldId id="387" r:id="rId29"/>
-    <p:sldId id="384" r:id="rId30"/>
-    <p:sldId id="389" r:id="rId31"/>
+    <p:sldId id="395" r:id="rId28"/>
   </p:sldIdLst>
   <p:sldSz cx="9144000" cy="6858000" type="screen4x3"/>
   <p:notesSz cx="6858000" cy="9144000"/>
@@ -163,15 +160,12 @@
             <p14:sldId id="378"/>
             <p14:sldId id="379"/>
             <p14:sldId id="380"/>
-            <p14:sldId id="382"/>
+            <p14:sldId id="391"/>
             <p14:sldId id="385"/>
-            <p14:sldId id="386"/>
+            <p14:sldId id="394"/>
             <p14:sldId id="383"/>
             <p14:sldId id="388"/>
-            <p14:sldId id="390"/>
-            <p14:sldId id="387"/>
-            <p14:sldId id="384"/>
-            <p14:sldId id="389"/>
+            <p14:sldId id="395"/>
           </p14:sldIdLst>
         </p14:section>
       </p14:sectionLst>
@@ -265,7 +259,7 @@
           <a:p>
             <a:fld id="{43E32005-3A63-48D2-8C73-BF5F95786EBD}" type="datetimeFigureOut">
               <a:rPr lang="en-US" smtClean="0"/>
-              <a:t>5/19/2017</a:t>
+              <a:t>5/22/2017</a:t>
             </a:fld>
             <a:endParaRPr lang="en-US"/>
           </a:p>
@@ -1307,15 +1301,8 @@
             </a:r>
             <a:r>
               <a:rPr lang="en-US" baseline="0" dirty="0" smtClean="0"/>
-              <a:t> Cut the building image and right click the green square and select Replace With Clipboard</a:t>
-            </a:r>
-          </a:p>
-          <a:p>
-            <a:r>
-              <a:rPr lang="en-US" baseline="0" dirty="0" smtClean="0"/>
-              <a:t>The current behavior is wrong. But tests should work once it is fixed.</a:t>
-            </a:r>
-            <a:endParaRPr lang="en-US" dirty="0"/>
+              <a:t> Cut the building image and right click the green square and select Replace With Clipboard.</a:t>
+            </a:r>
           </a:p>
         </p:txBody>
       </p:sp>
@@ -1345,7 +1332,7 @@
     </p:spTree>
     <p:extLst>
       <p:ext uri="{BB962C8B-B14F-4D97-AF65-F5344CB8AC3E}">
-        <p14:creationId xmlns:p14="http://schemas.microsoft.com/office/powerpoint/2010/main" val="1461921802"/>
+        <p14:creationId xmlns:p14="http://schemas.microsoft.com/office/powerpoint/2010/main" val="299054212"/>
       </p:ext>
     </p:extLst>
   </p:cSld>
@@ -1409,7 +1396,7 @@
             </a:r>
             <a:r>
               <a:rPr lang="en-US" dirty="0" smtClean="0"/>
-              <a:t> 3 colored squares that are merged and building</a:t>
+              <a:t> 3 colored squares that are merged into a group and building</a:t>
             </a:r>
             <a:r>
               <a:rPr lang="en-US" baseline="0" dirty="0" smtClean="0"/>
@@ -1417,6 +1404,14 @@
             </a:r>
           </a:p>
           <a:p>
+            <a:r>
+              <a:rPr lang="en-US" dirty="0" smtClean="0"/>
+              <a:t>The grou</a:t>
+            </a:r>
+            <a:r>
+              <a:rPr lang="en-US" baseline="0" dirty="0" smtClean="0"/>
+              <a:t>p of 3 colored squares have an appear animation</a:t>
+            </a:r>
             <a:endParaRPr lang="en-US" dirty="0"/>
           </a:p>
         </p:txBody>
@@ -1519,9 +1514,15 @@
               <a:rPr lang="en-US" baseline="0" dirty="0" smtClean="0"/>
               <a:t> the green square’s position.</a:t>
             </a:r>
-          </a:p>
-          <a:p>
-            <a:endParaRPr lang="en-US" dirty="0"/>
+            <a:r>
+              <a:rPr lang="en-US" b="0" baseline="0" dirty="0"/>
+              <a:t> </a:t>
+            </a:r>
+            <a:r>
+              <a:rPr lang="en-US" b="0" baseline="0" dirty="0" smtClean="0"/>
+              <a:t>Note that the group should still retain its animation</a:t>
+            </a:r>
+            <a:endParaRPr lang="en-US" baseline="0" dirty="0" smtClean="0"/>
           </a:p>
         </p:txBody>
       </p:sp>
@@ -1551,7 +1552,7 @@
     </p:spTree>
     <p:extLst>
       <p:ext uri="{BB962C8B-B14F-4D97-AF65-F5344CB8AC3E}">
-        <p14:creationId xmlns:p14="http://schemas.microsoft.com/office/powerpoint/2010/main" val="514405344"/>
+        <p14:creationId xmlns:p14="http://schemas.microsoft.com/office/powerpoint/2010/main" val="419367686"/>
       </p:ext>
     </p:extLst>
   </p:cSld>
@@ -1795,21 +1796,51 @@
           <a:p>
             <a:r>
               <a:rPr lang="en-US" dirty="0" smtClean="0"/>
-              <a:t>You can also cut by using ctrl-x</a:t>
-            </a:r>
-          </a:p>
-          <a:p>
+              <a:t>Original</a:t>
+            </a:r>
+            <a:r>
+              <a:rPr lang="en-US" baseline="0" dirty="0" smtClean="0"/>
+              <a:t> Shapes</a:t>
+            </a:r>
             <a:r>
               <a:rPr lang="en-US" dirty="0" smtClean="0"/>
-              <a:t>You can also copy by using ctrl-c</a:t>
-            </a:r>
-          </a:p>
-          <a:p>
+              <a:t> 3 colored squares that are merged into a group and building</a:t>
+            </a:r>
+            <a:r>
+              <a:rPr lang="en-US" baseline="0" dirty="0" smtClean="0"/>
+              <a:t> image</a:t>
+            </a:r>
+          </a:p>
+          <a:p>
+            <a:pPr marL="0" marR="0" lvl="0" indent="0" algn="l" defTabSz="914400" rtl="0" eaLnBrk="1" fontAlgn="auto" latinLnBrk="0" hangingPunct="1">
+              <a:lnSpc>
+                <a:spcPct val="100000"/>
+              </a:lnSpc>
+              <a:spcBef>
+                <a:spcPts val="0"/>
+              </a:spcBef>
+              <a:spcAft>
+                <a:spcPts val="0"/>
+              </a:spcAft>
+              <a:buClrTx/>
+              <a:buSzTx/>
+              <a:buFontTx/>
+              <a:buNone/>
+              <a:tabLst/>
+              <a:defRPr/>
+            </a:pPr>
             <a:r>
               <a:rPr lang="en-US" dirty="0" smtClean="0"/>
-              <a:t>Use cut or copy depending on the instructions</a:t>
-            </a:r>
-            <a:endParaRPr lang="en-US" dirty="0"/>
+              <a:t>The grou</a:t>
+            </a:r>
+            <a:r>
+              <a:rPr lang="en-US" baseline="0" dirty="0" smtClean="0"/>
+              <a:t>p of 3 colored squares have an appear animation</a:t>
+            </a:r>
+            <a:endParaRPr lang="en-US" dirty="0" smtClean="0"/>
+          </a:p>
+          <a:p>
+            <a:endParaRPr lang="en-US" baseline="0" dirty="0" smtClean="0"/>
           </a:p>
         </p:txBody>
       </p:sp>
@@ -1830,7 +1861,7 @@
           <a:p>
             <a:fld id="{0FE7C38A-472B-4221-8E00-509E1DA863EC}" type="slidenum">
               <a:rPr lang="en-US" smtClean="0"/>
-              <a:t>25</a:t>
+              <a:t>23</a:t>
             </a:fld>
             <a:endParaRPr lang="en-US"/>
           </a:p>
@@ -1839,7 +1870,7 @@
     </p:spTree>
     <p:extLst>
       <p:ext uri="{BB962C8B-B14F-4D97-AF65-F5344CB8AC3E}">
-        <p14:creationId xmlns:p14="http://schemas.microsoft.com/office/powerpoint/2010/main" val="2277280769"/>
+        <p14:creationId xmlns:p14="http://schemas.microsoft.com/office/powerpoint/2010/main" val="3694306195"/>
       </p:ext>
     </p:extLst>
   </p:cSld>
@@ -1895,13 +1926,38 @@
           <a:p>
             <a:r>
               <a:rPr lang="en-US" dirty="0" smtClean="0"/>
-              <a:t>Original</a:t>
+              <a:t>Expected. Cut the building image and Paste Into Group </a:t>
             </a:r>
             <a:r>
               <a:rPr lang="en-US" baseline="0" dirty="0" smtClean="0"/>
-              <a:t> Shapes 1 group and 1 image</a:t>
-            </a:r>
-            <a:endParaRPr lang="en-US" dirty="0"/>
+              <a:t>on the group of 3 colored squares</a:t>
+            </a:r>
+          </a:p>
+          <a:p>
+            <a:r>
+              <a:rPr lang="en-US" dirty="0" smtClean="0"/>
+              <a:t>The image</a:t>
+            </a:r>
+            <a:r>
+              <a:rPr lang="en-US" baseline="0" dirty="0" smtClean="0"/>
+              <a:t> should be in the center of </a:t>
+            </a:r>
+            <a:r>
+              <a:rPr lang="en-US" baseline="0" smtClean="0"/>
+              <a:t>the group.</a:t>
+            </a:r>
+            <a:r>
+              <a:rPr lang="en-US" b="0" baseline="0" smtClean="0"/>
+              <a:t> </a:t>
+            </a:r>
+            <a:r>
+              <a:rPr lang="en-US" b="0" baseline="0" dirty="0" smtClean="0"/>
+              <a:t>Note that the group should still retain its animation</a:t>
+            </a:r>
+            <a:endParaRPr lang="en-US" baseline="0" dirty="0" smtClean="0"/>
+          </a:p>
+          <a:p>
+            <a:endParaRPr lang="en-US" baseline="0" dirty="0" smtClean="0"/>
           </a:p>
         </p:txBody>
       </p:sp>
@@ -1922,7 +1978,7 @@
           <a:p>
             <a:fld id="{0FE7C38A-472B-4221-8E00-509E1DA863EC}" type="slidenum">
               <a:rPr lang="en-US" smtClean="0"/>
-              <a:t>26</a:t>
+              <a:t>24</a:t>
             </a:fld>
             <a:endParaRPr lang="en-US"/>
           </a:p>
@@ -1931,99 +1987,7 @@
     </p:spTree>
     <p:extLst>
       <p:ext uri="{BB962C8B-B14F-4D97-AF65-F5344CB8AC3E}">
-        <p14:creationId xmlns:p14="http://schemas.microsoft.com/office/powerpoint/2010/main" val="1680277161"/>
-      </p:ext>
-    </p:extLst>
-  </p:cSld>
-  <p:clrMapOvr>
-    <a:masterClrMapping/>
-  </p:clrMapOvr>
-</p:notes>
-</file>
-
-<file path=ppt/notesSlides/notesSlide23.xml><?xml version="1.0" encoding="utf-8"?>
-<p:notes xmlns:a="http://schemas.openxmlformats.org/drawingml/2006/main" xmlns:r="http://schemas.openxmlformats.org/officeDocument/2006/relationships" xmlns:p="http://schemas.openxmlformats.org/presentationml/2006/main">
-  <p:cSld>
-    <p:spTree>
-      <p:nvGrpSpPr>
-        <p:cNvPr id="1" name=""/>
-        <p:cNvGrpSpPr/>
-        <p:nvPr/>
-      </p:nvGrpSpPr>
-      <p:grpSpPr>
-        <a:xfrm>
-          <a:off x="0" y="0"/>
-          <a:ext cx="0" cy="0"/>
-          <a:chOff x="0" y="0"/>
-          <a:chExt cx="0" cy="0"/>
-        </a:xfrm>
-      </p:grpSpPr>
-      <p:sp>
-        <p:nvSpPr>
-          <p:cNvPr id="2" name="Slide Image Placeholder 1"/>
-          <p:cNvSpPr>
-            <a:spLocks noGrp="1" noRot="1" noChangeAspect="1"/>
-          </p:cNvSpPr>
-          <p:nvPr>
-            <p:ph type="sldImg"/>
-          </p:nvPr>
-        </p:nvSpPr>
-        <p:spPr/>
-      </p:sp>
-      <p:sp>
-        <p:nvSpPr>
-          <p:cNvPr id="3" name="Notes Placeholder 2"/>
-          <p:cNvSpPr>
-            <a:spLocks noGrp="1"/>
-          </p:cNvSpPr>
-          <p:nvPr>
-            <p:ph type="body" idx="1"/>
-          </p:nvPr>
-        </p:nvSpPr>
-        <p:spPr/>
-        <p:txBody>
-          <a:bodyPr/>
-          <a:lstStyle/>
-          <a:p>
-            <a:r>
-              <a:rPr lang="en-US" dirty="0" smtClean="0"/>
-              <a:t>Original</a:t>
-            </a:r>
-            <a:r>
-              <a:rPr lang="en-US" baseline="0" dirty="0" smtClean="0"/>
-              <a:t> Shapes 1 group and 1 image</a:t>
-            </a:r>
-            <a:endParaRPr lang="en-US" dirty="0"/>
-          </a:p>
-        </p:txBody>
-      </p:sp>
-      <p:sp>
-        <p:nvSpPr>
-          <p:cNvPr id="4" name="Slide Number Placeholder 3"/>
-          <p:cNvSpPr>
-            <a:spLocks noGrp="1"/>
-          </p:cNvSpPr>
-          <p:nvPr>
-            <p:ph type="sldNum" sz="quarter" idx="10"/>
-          </p:nvPr>
-        </p:nvSpPr>
-        <p:spPr/>
-        <p:txBody>
-          <a:bodyPr/>
-          <a:lstStyle/>
-          <a:p>
-            <a:fld id="{0FE7C38A-472B-4221-8E00-509E1DA863EC}" type="slidenum">
-              <a:rPr lang="en-US" smtClean="0"/>
-              <a:t>27</a:t>
-            </a:fld>
-            <a:endParaRPr lang="en-US"/>
-          </a:p>
-        </p:txBody>
-      </p:sp>
-    </p:spTree>
-    <p:extLst>
-      <p:ext uri="{BB962C8B-B14F-4D97-AF65-F5344CB8AC3E}">
-        <p14:creationId xmlns:p14="http://schemas.microsoft.com/office/powerpoint/2010/main" val="2876070804"/>
+        <p14:creationId xmlns:p14="http://schemas.microsoft.com/office/powerpoint/2010/main" val="1944604826"/>
       </p:ext>
     </p:extLst>
   </p:cSld>
@@ -2848,7 +2812,7 @@
           <a:p>
             <a:fld id="{699DC775-C286-4358-8C92-D7E584E969B3}" type="datetimeFigureOut">
               <a:rPr lang="en-US" smtClean="0"/>
-              <a:t>5/19/2017</a:t>
+              <a:t>5/22/2017</a:t>
             </a:fld>
             <a:endParaRPr lang="en-US"/>
           </a:p>
@@ -3016,7 +2980,7 @@
           <a:p>
             <a:fld id="{699DC775-C286-4358-8C92-D7E584E969B3}" type="datetimeFigureOut">
               <a:rPr lang="en-US" smtClean="0"/>
-              <a:t>5/19/2017</a:t>
+              <a:t>5/22/2017</a:t>
             </a:fld>
             <a:endParaRPr lang="en-US"/>
           </a:p>
@@ -3194,7 +3158,7 @@
           <a:p>
             <a:fld id="{699DC775-C286-4358-8C92-D7E584E969B3}" type="datetimeFigureOut">
               <a:rPr lang="en-US" smtClean="0"/>
-              <a:t>5/19/2017</a:t>
+              <a:t>5/22/2017</a:t>
             </a:fld>
             <a:endParaRPr lang="en-US"/>
           </a:p>
@@ -3434,7 +3398,7 @@
           <a:p>
             <a:fld id="{699DC775-C286-4358-8C92-D7E584E969B3}" type="datetimeFigureOut">
               <a:rPr lang="en-US" smtClean="0"/>
-              <a:t>5/19/2017</a:t>
+              <a:t>5/22/2017</a:t>
             </a:fld>
             <a:endParaRPr lang="en-US"/>
           </a:p>
@@ -3602,7 +3566,7 @@
           <a:p>
             <a:fld id="{699DC775-C286-4358-8C92-D7E584E969B3}" type="datetimeFigureOut">
               <a:rPr lang="en-US" smtClean="0"/>
-              <a:t>5/19/2017</a:t>
+              <a:t>5/22/2017</a:t>
             </a:fld>
             <a:endParaRPr lang="en-US"/>
           </a:p>
@@ -3847,7 +3811,7 @@
           <a:p>
             <a:fld id="{699DC775-C286-4358-8C92-D7E584E969B3}" type="datetimeFigureOut">
               <a:rPr lang="en-US" smtClean="0"/>
-              <a:t>5/19/2017</a:t>
+              <a:t>5/22/2017</a:t>
             </a:fld>
             <a:endParaRPr lang="en-US"/>
           </a:p>
@@ -4132,7 +4096,7 @@
           <a:p>
             <a:fld id="{699DC775-C286-4358-8C92-D7E584E969B3}" type="datetimeFigureOut">
               <a:rPr lang="en-US" smtClean="0"/>
-              <a:t>5/19/2017</a:t>
+              <a:t>5/22/2017</a:t>
             </a:fld>
             <a:endParaRPr lang="en-US"/>
           </a:p>
@@ -4551,7 +4515,7 @@
           <a:p>
             <a:fld id="{699DC775-C286-4358-8C92-D7E584E969B3}" type="datetimeFigureOut">
               <a:rPr lang="en-US" smtClean="0"/>
-              <a:t>5/19/2017</a:t>
+              <a:t>5/22/2017</a:t>
             </a:fld>
             <a:endParaRPr lang="en-US"/>
           </a:p>
@@ -4668,7 +4632,7 @@
           <a:p>
             <a:fld id="{699DC775-C286-4358-8C92-D7E584E969B3}" type="datetimeFigureOut">
               <a:rPr lang="en-US" smtClean="0"/>
-              <a:t>5/19/2017</a:t>
+              <a:t>5/22/2017</a:t>
             </a:fld>
             <a:endParaRPr lang="en-US"/>
           </a:p>
@@ -4763,7 +4727,7 @@
           <a:p>
             <a:fld id="{699DC775-C286-4358-8C92-D7E584E969B3}" type="datetimeFigureOut">
               <a:rPr lang="en-US" smtClean="0"/>
-              <a:t>5/19/2017</a:t>
+              <a:t>5/22/2017</a:t>
             </a:fld>
             <a:endParaRPr lang="en-US"/>
           </a:p>
@@ -5038,7 +5002,7 @@
           <a:p>
             <a:fld id="{699DC775-C286-4358-8C92-D7E584E969B3}" type="datetimeFigureOut">
               <a:rPr lang="en-US" smtClean="0"/>
-              <a:t>5/19/2017</a:t>
+              <a:t>5/22/2017</a:t>
             </a:fld>
             <a:endParaRPr lang="en-US"/>
           </a:p>
@@ -5206,7 +5170,7 @@
           <a:p>
             <a:fld id="{699DC775-C286-4358-8C92-D7E584E969B3}" type="datetimeFigureOut">
               <a:rPr lang="en-US" smtClean="0"/>
-              <a:t>5/19/2017</a:t>
+              <a:t>5/22/2017</a:t>
             </a:fld>
             <a:endParaRPr lang="en-US"/>
           </a:p>
@@ -5458,7 +5422,7 @@
           <a:p>
             <a:fld id="{699DC775-C286-4358-8C92-D7E584E969B3}" type="datetimeFigureOut">
               <a:rPr lang="en-US" smtClean="0"/>
-              <a:t>5/19/2017</a:t>
+              <a:t>5/22/2017</a:t>
             </a:fld>
             <a:endParaRPr lang="en-US"/>
           </a:p>
@@ -5626,7 +5590,7 @@
           <a:p>
             <a:fld id="{699DC775-C286-4358-8C92-D7E584E969B3}" type="datetimeFigureOut">
               <a:rPr lang="en-US" smtClean="0"/>
-              <a:t>5/19/2017</a:t>
+              <a:t>5/22/2017</a:t>
             </a:fld>
             <a:endParaRPr lang="en-US"/>
           </a:p>
@@ -5804,7 +5768,7 @@
           <a:p>
             <a:fld id="{699DC775-C286-4358-8C92-D7E584E969B3}" type="datetimeFigureOut">
               <a:rPr lang="en-US" smtClean="0"/>
-              <a:t>5/19/2017</a:t>
+              <a:t>5/22/2017</a:t>
             </a:fld>
             <a:endParaRPr lang="en-US"/>
           </a:p>
@@ -6052,7 +6016,7 @@
           <a:p>
             <a:fld id="{699DC775-C286-4358-8C92-D7E584E969B3}" type="datetimeFigureOut">
               <a:rPr lang="en-US" smtClean="0"/>
-              <a:t>5/19/2017</a:t>
+              <a:t>5/22/2017</a:t>
             </a:fld>
             <a:endParaRPr lang="en-US"/>
           </a:p>
@@ -6228,7 +6192,7 @@
           <a:p>
             <a:fld id="{699DC775-C286-4358-8C92-D7E584E969B3}" type="datetimeFigureOut">
               <a:rPr lang="en-US" smtClean="0"/>
-              <a:t>5/19/2017</a:t>
+              <a:t>5/22/2017</a:t>
             </a:fld>
             <a:endParaRPr lang="en-US"/>
           </a:p>
@@ -6481,7 +6445,7 @@
           <a:p>
             <a:fld id="{699DC775-C286-4358-8C92-D7E584E969B3}" type="datetimeFigureOut">
               <a:rPr lang="en-US" smtClean="0"/>
-              <a:t>5/19/2017</a:t>
+              <a:t>5/22/2017</a:t>
             </a:fld>
             <a:endParaRPr lang="en-US"/>
           </a:p>
@@ -6774,7 +6738,7 @@
           <a:p>
             <a:fld id="{699DC775-C286-4358-8C92-D7E584E969B3}" type="datetimeFigureOut">
               <a:rPr lang="en-US" smtClean="0"/>
-              <a:t>5/19/2017</a:t>
+              <a:t>5/22/2017</a:t>
             </a:fld>
             <a:endParaRPr lang="en-US"/>
           </a:p>
@@ -7201,7 +7165,7 @@
           <a:p>
             <a:fld id="{699DC775-C286-4358-8C92-D7E584E969B3}" type="datetimeFigureOut">
               <a:rPr lang="en-US" smtClean="0"/>
-              <a:t>5/19/2017</a:t>
+              <a:t>5/22/2017</a:t>
             </a:fld>
             <a:endParaRPr lang="en-US"/>
           </a:p>
@@ -7326,7 +7290,7 @@
           <a:p>
             <a:fld id="{699DC775-C286-4358-8C92-D7E584E969B3}" type="datetimeFigureOut">
               <a:rPr lang="en-US" smtClean="0"/>
-              <a:t>5/19/2017</a:t>
+              <a:t>5/22/2017</a:t>
             </a:fld>
             <a:endParaRPr lang="en-US"/>
           </a:p>
@@ -7429,7 +7393,7 @@
           <a:p>
             <a:fld id="{699DC775-C286-4358-8C92-D7E584E969B3}" type="datetimeFigureOut">
               <a:rPr lang="en-US" smtClean="0"/>
-              <a:t>5/19/2017</a:t>
+              <a:t>5/22/2017</a:t>
             </a:fld>
             <a:endParaRPr lang="en-US"/>
           </a:p>
@@ -7674,7 +7638,7 @@
           <a:p>
             <a:fld id="{699DC775-C286-4358-8C92-D7E584E969B3}" type="datetimeFigureOut">
               <a:rPr lang="en-US" smtClean="0"/>
-              <a:t>5/19/2017</a:t>
+              <a:t>5/22/2017</a:t>
             </a:fld>
             <a:endParaRPr lang="en-US"/>
           </a:p>
@@ -7957,7 +7921,7 @@
           <a:p>
             <a:fld id="{699DC775-C286-4358-8C92-D7E584E969B3}" type="datetimeFigureOut">
               <a:rPr lang="en-US" smtClean="0"/>
-              <a:t>5/19/2017</a:t>
+              <a:t>5/22/2017</a:t>
             </a:fld>
             <a:endParaRPr lang="en-US"/>
           </a:p>
@@ -8217,7 +8181,7 @@
           <a:p>
             <a:fld id="{699DC775-C286-4358-8C92-D7E584E969B3}" type="datetimeFigureOut">
               <a:rPr lang="en-US" smtClean="0"/>
-              <a:t>5/19/2017</a:t>
+              <a:t>5/22/2017</a:t>
             </a:fld>
             <a:endParaRPr lang="en-US"/>
           </a:p>
@@ -8393,7 +8357,7 @@
           <a:p>
             <a:fld id="{699DC775-C286-4358-8C92-D7E584E969B3}" type="datetimeFigureOut">
               <a:rPr lang="en-US" smtClean="0"/>
-              <a:t>5/19/2017</a:t>
+              <a:t>5/22/2017</a:t>
             </a:fld>
             <a:endParaRPr lang="en-US"/>
           </a:p>
@@ -8579,7 +8543,7 @@
           <a:p>
             <a:fld id="{699DC775-C286-4358-8C92-D7E584E969B3}" type="datetimeFigureOut">
               <a:rPr lang="en-US" smtClean="0"/>
-              <a:t>5/19/2017</a:t>
+              <a:t>5/22/2017</a:t>
             </a:fld>
             <a:endParaRPr lang="en-US"/>
           </a:p>
@@ -8771,7 +8735,7 @@
           <a:p>
             <a:fld id="{45696B32-6A70-48EC-8939-9D142D9557CD}" type="datetimeFigureOut">
               <a:rPr lang="en-US" smtClean="0"/>
-              <a:t>5/19/2017</a:t>
+              <a:t>5/22/2017</a:t>
             </a:fld>
             <a:endParaRPr lang="en-US"/>
           </a:p>
@@ -9087,7 +9051,7 @@
           <a:p>
             <a:fld id="{45696B32-6A70-48EC-8939-9D142D9557CD}" type="datetimeFigureOut">
               <a:rPr lang="en-US" smtClean="0"/>
-              <a:t>5/19/2017</a:t>
+              <a:t>5/22/2017</a:t>
             </a:fld>
             <a:endParaRPr lang="en-US"/>
           </a:p>
@@ -9333,7 +9297,7 @@
           <a:p>
             <a:fld id="{45696B32-6A70-48EC-8939-9D142D9557CD}" type="datetimeFigureOut">
               <a:rPr lang="en-US" smtClean="0"/>
-              <a:t>5/19/2017</a:t>
+              <a:t>5/22/2017</a:t>
             </a:fld>
             <a:endParaRPr lang="en-US"/>
           </a:p>
@@ -9565,7 +9529,7 @@
           <a:p>
             <a:fld id="{45696B32-6A70-48EC-8939-9D142D9557CD}" type="datetimeFigureOut">
               <a:rPr lang="en-US" smtClean="0"/>
-              <a:t>5/19/2017</a:t>
+              <a:t>5/22/2017</a:t>
             </a:fld>
             <a:endParaRPr lang="en-US"/>
           </a:p>
@@ -9932,7 +9896,7 @@
           <a:p>
             <a:fld id="{45696B32-6A70-48EC-8939-9D142D9557CD}" type="datetimeFigureOut">
               <a:rPr lang="en-US" smtClean="0"/>
-              <a:t>5/19/2017</a:t>
+              <a:t>5/22/2017</a:t>
             </a:fld>
             <a:endParaRPr lang="en-US"/>
           </a:p>
@@ -10050,7 +10014,7 @@
           <a:p>
             <a:fld id="{45696B32-6A70-48EC-8939-9D142D9557CD}" type="datetimeFigureOut">
               <a:rPr lang="en-US" smtClean="0"/>
-              <a:t>5/19/2017</a:t>
+              <a:t>5/22/2017</a:t>
             </a:fld>
             <a:endParaRPr lang="en-US"/>
           </a:p>
@@ -10335,7 +10299,7 @@
           <a:p>
             <a:fld id="{699DC775-C286-4358-8C92-D7E584E969B3}" type="datetimeFigureOut">
               <a:rPr lang="en-US" smtClean="0"/>
-              <a:t>5/19/2017</a:t>
+              <a:t>5/22/2017</a:t>
             </a:fld>
             <a:endParaRPr lang="en-US"/>
           </a:p>
@@ -10430,7 +10394,7 @@
           <a:p>
             <a:fld id="{45696B32-6A70-48EC-8939-9D142D9557CD}" type="datetimeFigureOut">
               <a:rPr lang="en-US" smtClean="0"/>
-              <a:t>5/19/2017</a:t>
+              <a:t>5/22/2017</a:t>
             </a:fld>
             <a:endParaRPr lang="en-US"/>
           </a:p>
@@ -10707,7 +10671,7 @@
           <a:p>
             <a:fld id="{45696B32-6A70-48EC-8939-9D142D9557CD}" type="datetimeFigureOut">
               <a:rPr lang="en-US" smtClean="0"/>
-              <a:t>5/19/2017</a:t>
+              <a:t>5/22/2017</a:t>
             </a:fld>
             <a:endParaRPr lang="en-US"/>
           </a:p>
@@ -10960,7 +10924,7 @@
           <a:p>
             <a:fld id="{45696B32-6A70-48EC-8939-9D142D9557CD}" type="datetimeFigureOut">
               <a:rPr lang="en-US" smtClean="0"/>
-              <a:t>5/19/2017</a:t>
+              <a:t>5/22/2017</a:t>
             </a:fld>
             <a:endParaRPr lang="en-US"/>
           </a:p>
@@ -11130,7 +11094,7 @@
           <a:p>
             <a:fld id="{45696B32-6A70-48EC-8939-9D142D9557CD}" type="datetimeFigureOut">
               <a:rPr lang="en-US" smtClean="0"/>
-              <a:t>5/19/2017</a:t>
+              <a:t>5/22/2017</a:t>
             </a:fld>
             <a:endParaRPr lang="en-US"/>
           </a:p>
@@ -11310,7 +11274,7 @@
           <a:p>
             <a:fld id="{45696B32-6A70-48EC-8939-9D142D9557CD}" type="datetimeFigureOut">
               <a:rPr lang="en-US" smtClean="0"/>
-              <a:t>5/19/2017</a:t>
+              <a:t>5/22/2017</a:t>
             </a:fld>
             <a:endParaRPr lang="en-US"/>
           </a:p>
@@ -11729,7 +11693,7 @@
           <a:p>
             <a:fld id="{699DC775-C286-4358-8C92-D7E584E969B3}" type="datetimeFigureOut">
               <a:rPr lang="en-US" smtClean="0"/>
-              <a:t>5/19/2017</a:t>
+              <a:t>5/22/2017</a:t>
             </a:fld>
             <a:endParaRPr lang="en-US"/>
           </a:p>
@@ -11846,7 +11810,7 @@
           <a:p>
             <a:fld id="{699DC775-C286-4358-8C92-D7E584E969B3}" type="datetimeFigureOut">
               <a:rPr lang="en-US" smtClean="0"/>
-              <a:t>5/19/2017</a:t>
+              <a:t>5/22/2017</a:t>
             </a:fld>
             <a:endParaRPr lang="en-US"/>
           </a:p>
@@ -11941,7 +11905,7 @@
           <a:p>
             <a:fld id="{699DC775-C286-4358-8C92-D7E584E969B3}" type="datetimeFigureOut">
               <a:rPr lang="en-US" smtClean="0"/>
-              <a:t>5/19/2017</a:t>
+              <a:t>5/22/2017</a:t>
             </a:fld>
             <a:endParaRPr lang="en-US"/>
           </a:p>
@@ -12216,7 +12180,7 @@
           <a:p>
             <a:fld id="{699DC775-C286-4358-8C92-D7E584E969B3}" type="datetimeFigureOut">
               <a:rPr lang="en-US" smtClean="0"/>
-              <a:t>5/19/2017</a:t>
+              <a:t>5/22/2017</a:t>
             </a:fld>
             <a:endParaRPr lang="en-US"/>
           </a:p>
@@ -12468,7 +12432,7 @@
           <a:p>
             <a:fld id="{699DC775-C286-4358-8C92-D7E584E969B3}" type="datetimeFigureOut">
               <a:rPr lang="en-US" smtClean="0"/>
-              <a:t>5/19/2017</a:t>
+              <a:t>5/22/2017</a:t>
             </a:fld>
             <a:endParaRPr lang="en-US"/>
           </a:p>
@@ -12679,7 +12643,7 @@
           <a:p>
             <a:fld id="{699DC775-C286-4358-8C92-D7E584E969B3}" type="datetimeFigureOut">
               <a:rPr lang="en-US" smtClean="0"/>
-              <a:t>5/19/2017</a:t>
+              <a:t>5/22/2017</a:t>
             </a:fld>
             <a:endParaRPr lang="en-US"/>
           </a:p>
@@ -13192,7 +13156,7 @@
           <a:p>
             <a:fld id="{699DC775-C286-4358-8C92-D7E584E969B3}" type="datetimeFigureOut">
               <a:rPr lang="en-US" smtClean="0"/>
-              <a:t>5/19/2017</a:t>
+              <a:t>5/22/2017</a:t>
             </a:fld>
             <a:endParaRPr lang="en-US"/>
           </a:p>
@@ -13703,7 +13667,7 @@
           <a:p>
             <a:fld id="{699DC775-C286-4358-8C92-D7E584E969B3}" type="datetimeFigureOut">
               <a:rPr lang="en-US" smtClean="0"/>
-              <a:t>5/19/2017</a:t>
+              <a:t>5/22/2017</a:t>
             </a:fld>
             <a:endParaRPr lang="en-US"/>
           </a:p>
@@ -14213,7 +14177,7 @@
           <a:p>
             <a:fld id="{45696B32-6A70-48EC-8939-9D142D9557CD}" type="datetimeFigureOut">
               <a:rPr lang="en-US" smtClean="0"/>
-              <a:t>5/19/2017</a:t>
+              <a:t>5/22/2017</a:t>
             </a:fld>
             <a:endParaRPr lang="en-US"/>
           </a:p>
@@ -14764,7 +14728,7 @@
       </p:grpSpPr>
       <p:grpSp>
         <p:nvGrpSpPr>
-          <p:cNvPr id="2" name="Group 1"/>
+          <p:cNvPr id="2" name="selectMe"/>
           <p:cNvGrpSpPr/>
           <p:nvPr/>
         </p:nvGrpSpPr>
@@ -14778,7 +14742,7 @@
         </p:grpSpPr>
         <p:pic>
           <p:nvPicPr>
-            <p:cNvPr id="5" name="selectMe"/>
+            <p:cNvPr id="5" name="selectMe2"/>
             <p:cNvPicPr>
               <a:picLocks noChangeAspect="1"/>
             </p:cNvPicPr>
@@ -15261,6 +15225,13 @@
   <p:clrMapOvr>
     <a:masterClrMapping/>
   </p:clrMapOvr>
+  <p:timing>
+    <p:tnLst>
+      <p:par>
+        <p:cTn id="1" dur="indefinite" restart="never" nodeType="tmRoot"/>
+      </p:par>
+    </p:tnLst>
+  </p:timing>
 </p:sld>
 </file>
 
@@ -15367,6 +15338,13 @@
   <p:clrMapOvr>
     <a:masterClrMapping/>
   </p:clrMapOvr>
+  <p:timing>
+    <p:tnLst>
+      <p:par>
+        <p:cTn id="1" dur="indefinite" restart="never" nodeType="tmRoot"/>
+      </p:par>
+    </p:tnLst>
+  </p:timing>
 </p:sld>
 </file>
 
@@ -15606,6 +15584,13 @@
   <p:clrMapOvr>
     <a:masterClrMapping/>
   </p:clrMapOvr>
+  <p:timing>
+    <p:tnLst>
+      <p:par>
+        <p:cTn id="1" dur="indefinite" restart="never" nodeType="tmRoot"/>
+      </p:par>
+    </p:tnLst>
+  </p:timing>
 </p:sld>
 </file>
 
@@ -15795,6 +15780,13 @@
   <p:clrMapOvr>
     <a:masterClrMapping/>
   </p:clrMapOvr>
+  <p:timing>
+    <p:tnLst>
+      <p:par>
+        <p:cTn id="1" dur="indefinite" restart="never" nodeType="tmRoot"/>
+      </p:par>
+    </p:tnLst>
+  </p:timing>
 </p:sld>
 </file>
 
@@ -15858,6 +15850,49 @@
           </a:p>
         </p:txBody>
       </p:sp>
+      <p:sp>
+        <p:nvSpPr>
+          <p:cNvPr id="7" name="Rectangle 6"/>
+          <p:cNvSpPr/>
+          <p:nvPr/>
+        </p:nvSpPr>
+        <p:spPr>
+          <a:xfrm>
+            <a:off x="1981200" y="2209800"/>
+            <a:ext cx="1981200" cy="2057400"/>
+          </a:xfrm>
+          <a:prstGeom prst="rect">
+            <a:avLst/>
+          </a:prstGeom>
+          <a:solidFill>
+            <a:srgbClr val="0070C0"/>
+          </a:solidFill>
+        </p:spPr>
+        <p:style>
+          <a:lnRef idx="2">
+            <a:schemeClr val="accent1">
+              <a:shade val="50000"/>
+            </a:schemeClr>
+          </a:lnRef>
+          <a:fillRef idx="1">
+            <a:schemeClr val="accent1"/>
+          </a:fillRef>
+          <a:effectRef idx="0">
+            <a:schemeClr val="accent1"/>
+          </a:effectRef>
+          <a:fontRef idx="minor">
+            <a:schemeClr val="lt1"/>
+          </a:fontRef>
+        </p:style>
+        <p:txBody>
+          <a:bodyPr rtlCol="0" anchor="ctr"/>
+          <a:lstStyle/>
+          <a:p>
+            <a:pPr algn="ctr"/>
+            <a:endParaRPr lang="en-US"/>
+          </a:p>
+        </p:txBody>
+      </p:sp>
       <p:pic>
         <p:nvPicPr>
           <p:cNvPr id="10" name="selectMe"/>
@@ -15886,58 +15921,12 @@
           <a:prstGeom prst="rect">
             <a:avLst/>
           </a:prstGeom>
-          <a:solidFill>
-            <a:srgbClr val="00B050"/>
-          </a:solidFill>
         </p:spPr>
       </p:pic>
-      <p:sp>
-        <p:nvSpPr>
-          <p:cNvPr id="7" name="Rectangle 6"/>
-          <p:cNvSpPr/>
-          <p:nvPr/>
-        </p:nvSpPr>
-        <p:spPr>
-          <a:xfrm>
-            <a:off x="1981200" y="2209800"/>
-            <a:ext cx="1981200" cy="2057400"/>
-          </a:xfrm>
-          <a:prstGeom prst="rect">
-            <a:avLst/>
-          </a:prstGeom>
-          <a:solidFill>
-            <a:srgbClr val="0070C0"/>
-          </a:solidFill>
-        </p:spPr>
-        <p:style>
-          <a:lnRef idx="2">
-            <a:schemeClr val="accent1">
-              <a:shade val="50000"/>
-            </a:schemeClr>
-          </a:lnRef>
-          <a:fillRef idx="1">
-            <a:schemeClr val="accent1"/>
-          </a:fillRef>
-          <a:effectRef idx="0">
-            <a:schemeClr val="accent1"/>
-          </a:effectRef>
-          <a:fontRef idx="minor">
-            <a:schemeClr val="lt1"/>
-          </a:fontRef>
-        </p:style>
-        <p:txBody>
-          <a:bodyPr rtlCol="0" anchor="ctr"/>
-          <a:lstStyle/>
-          <a:p>
-            <a:pPr algn="ctr"/>
-            <a:endParaRPr lang="en-US"/>
-          </a:p>
-        </p:txBody>
-      </p:sp>
     </p:spTree>
     <p:extLst>
       <p:ext uri="{BB962C8B-B14F-4D97-AF65-F5344CB8AC3E}">
-        <p14:creationId xmlns:p14="http://schemas.microsoft.com/office/powerpoint/2010/main" val="2887077876"/>
+        <p14:creationId xmlns:p14="http://schemas.microsoft.com/office/powerpoint/2010/main" val="4249550222"/>
       </p:ext>
     </p:extLst>
   </p:cSld>
@@ -16233,7 +16222,75 @@
   <p:timing>
     <p:tnLst>
       <p:par>
-        <p:cTn id="1" dur="indefinite" restart="never" nodeType="tmRoot"/>
+        <p:cTn id="1" dur="indefinite" restart="never" nodeType="tmRoot">
+          <p:childTnLst>
+            <p:seq concurrent="1" nextAc="seek">
+              <p:cTn id="2" dur="indefinite" nodeType="mainSeq">
+                <p:childTnLst>
+                  <p:par>
+                    <p:cTn id="3" fill="hold">
+                      <p:stCondLst>
+                        <p:cond delay="indefinite"/>
+                      </p:stCondLst>
+                      <p:childTnLst>
+                        <p:par>
+                          <p:cTn id="4" fill="hold">
+                            <p:stCondLst>
+                              <p:cond delay="0"/>
+                            </p:stCondLst>
+                            <p:childTnLst>
+                              <p:par>
+                                <p:cTn id="5" presetID="1" presetClass="entr" presetSubtype="0" fill="hold" nodeType="clickEffect">
+                                  <p:stCondLst>
+                                    <p:cond delay="0"/>
+                                  </p:stCondLst>
+                                  <p:childTnLst>
+                                    <p:set>
+                                      <p:cBhvr>
+                                        <p:cTn id="6" dur="1" fill="hold">
+                                          <p:stCondLst>
+                                            <p:cond delay="0"/>
+                                          </p:stCondLst>
+                                        </p:cTn>
+                                        <p:tgtEl>
+                                          <p:spTgt spid="2"/>
+                                        </p:tgtEl>
+                                        <p:attrNameLst>
+                                          <p:attrName>style.visibility</p:attrName>
+                                        </p:attrNameLst>
+                                      </p:cBhvr>
+                                      <p:to>
+                                        <p:strVal val="visible"/>
+                                      </p:to>
+                                    </p:set>
+                                  </p:childTnLst>
+                                </p:cTn>
+                              </p:par>
+                            </p:childTnLst>
+                          </p:cTn>
+                        </p:par>
+                      </p:childTnLst>
+                    </p:cTn>
+                  </p:par>
+                </p:childTnLst>
+              </p:cTn>
+              <p:prevCondLst>
+                <p:cond evt="onPrev" delay="0">
+                  <p:tgtEl>
+                    <p:sldTgt/>
+                  </p:tgtEl>
+                </p:cond>
+              </p:prevCondLst>
+              <p:nextCondLst>
+                <p:cond evt="onNext" delay="0">
+                  <p:tgtEl>
+                    <p:sldTgt/>
+                  </p:tgtEl>
+                </p:cond>
+              </p:nextCondLst>
+            </p:seq>
+          </p:childTnLst>
+        </p:cTn>
       </p:par>
     </p:tnLst>
   </p:timing>
@@ -16259,7 +16316,7 @@
       </p:grpSpPr>
       <p:grpSp>
         <p:nvGrpSpPr>
-          <p:cNvPr id="3" name="Group 2"/>
+          <p:cNvPr id="4" name="Group 3"/>
           <p:cNvGrpSpPr/>
           <p:nvPr/>
         </p:nvGrpSpPr>
@@ -16273,301 +16330,7 @@
         </p:grpSpPr>
         <p:sp>
           <p:nvSpPr>
-            <p:cNvPr id="5" name="Rectangle 4"/>
-            <p:cNvSpPr/>
-            <p:nvPr/>
-          </p:nvSpPr>
-          <p:spPr>
-            <a:xfrm>
-              <a:off x="914400" y="1116842"/>
-              <a:ext cx="1981200" cy="2057400"/>
-            </a:xfrm>
-            <a:prstGeom prst="rect">
-              <a:avLst/>
-            </a:prstGeom>
-            <a:solidFill>
-              <a:srgbClr val="FF0000"/>
-            </a:solidFill>
-          </p:spPr>
-          <p:style>
-            <a:lnRef idx="2">
-              <a:schemeClr val="accent1">
-                <a:shade val="50000"/>
-              </a:schemeClr>
-            </a:lnRef>
-            <a:fillRef idx="1">
-              <a:schemeClr val="accent1"/>
-            </a:fillRef>
-            <a:effectRef idx="0">
-              <a:schemeClr val="accent1"/>
-            </a:effectRef>
-            <a:fontRef idx="minor">
-              <a:schemeClr val="lt1"/>
-            </a:fontRef>
-          </p:style>
-          <p:txBody>
-            <a:bodyPr rtlCol="0" anchor="ctr"/>
-            <a:lstStyle/>
-            <a:p>
-              <a:pPr algn="ctr"/>
-              <a:endParaRPr lang="en-US"/>
-            </a:p>
-          </p:txBody>
-        </p:sp>
-        <p:pic>
-          <p:nvPicPr>
-            <p:cNvPr id="9" name="selectMe"/>
-            <p:cNvPicPr>
-              <a:picLocks noChangeAspect="1"/>
-            </p:cNvPicPr>
-            <p:nvPr/>
-          </p:nvPicPr>
-          <p:blipFill>
-            <a:blip r:embed="rId3">
-              <a:extLst>
-                <a:ext uri="{28A0092B-C50C-407E-A947-70E740481C1C}">
-                  <a14:useLocalDpi xmlns:a14="http://schemas.microsoft.com/office/drawing/2010/main" val="0"/>
-                </a:ext>
-              </a:extLst>
-            </a:blip>
-            <a:stretch>
-              <a:fillRect/>
-            </a:stretch>
-          </p:blipFill>
-          <p:spPr>
-            <a:xfrm>
-              <a:off x="1447800" y="1650242"/>
-              <a:ext cx="4572000" cy="3058418"/>
-            </a:xfrm>
-            <a:prstGeom prst="rect">
-              <a:avLst/>
-            </a:prstGeom>
-          </p:spPr>
-        </p:pic>
-        <p:sp>
-          <p:nvSpPr>
-            <p:cNvPr id="7" name="Rectangle 6"/>
-            <p:cNvSpPr/>
-            <p:nvPr/>
-          </p:nvSpPr>
-          <p:spPr>
-            <a:xfrm>
-              <a:off x="1981200" y="2209800"/>
-              <a:ext cx="1981200" cy="2057400"/>
-            </a:xfrm>
-            <a:prstGeom prst="rect">
-              <a:avLst/>
-            </a:prstGeom>
-            <a:solidFill>
-              <a:srgbClr val="0070C0"/>
-            </a:solidFill>
-          </p:spPr>
-          <p:style>
-            <a:lnRef idx="2">
-              <a:schemeClr val="accent1">
-                <a:shade val="50000"/>
-              </a:schemeClr>
-            </a:lnRef>
-            <a:fillRef idx="1">
-              <a:schemeClr val="accent1"/>
-            </a:fillRef>
-            <a:effectRef idx="0">
-              <a:schemeClr val="accent1"/>
-            </a:effectRef>
-            <a:fontRef idx="minor">
-              <a:schemeClr val="lt1"/>
-            </a:fontRef>
-          </p:style>
-          <p:txBody>
-            <a:bodyPr rtlCol="0" anchor="ctr"/>
-            <a:lstStyle/>
-            <a:p>
-              <a:pPr algn="ctr"/>
-              <a:endParaRPr lang="en-US"/>
-            </a:p>
-          </p:txBody>
-        </p:sp>
-      </p:grpSp>
-    </p:spTree>
-    <p:extLst>
-      <p:ext uri="{BB962C8B-B14F-4D97-AF65-F5344CB8AC3E}">
-        <p14:creationId xmlns:p14="http://schemas.microsoft.com/office/powerpoint/2010/main" val="1245735645"/>
-      </p:ext>
-    </p:extLst>
-  </p:cSld>
-  <p:clrMapOvr>
-    <a:masterClrMapping/>
-  </p:clrMapOvr>
-  <p:timing>
-    <p:tnLst>
-      <p:par>
-        <p:cTn id="1" dur="indefinite" restart="never" nodeType="tmRoot"/>
-      </p:par>
-    </p:tnLst>
-  </p:timing>
-</p:sld>
-</file>
-
-<file path=ppt/slides/slide22.xml><?xml version="1.0" encoding="utf-8"?>
-<p:sld xmlns:a="http://schemas.openxmlformats.org/drawingml/2006/main" xmlns:r="http://schemas.openxmlformats.org/officeDocument/2006/relationships" xmlns:p="http://schemas.openxmlformats.org/presentationml/2006/main">
-  <p:cSld>
-    <p:spTree>
-      <p:nvGrpSpPr>
-        <p:cNvPr id="1" name=""/>
-        <p:cNvGrpSpPr/>
-        <p:nvPr/>
-      </p:nvGrpSpPr>
-      <p:grpSpPr>
-        <a:xfrm>
-          <a:off x="0" y="0"/>
-          <a:ext cx="0" cy="0"/>
-          <a:chOff x="0" y="0"/>
-          <a:chExt cx="0" cy="0"/>
-        </a:xfrm>
-      </p:grpSpPr>
-      <p:sp>
-        <p:nvSpPr>
-          <p:cNvPr id="2" name="Title 1"/>
-          <p:cNvSpPr>
-            <a:spLocks noGrp="1"/>
-          </p:cNvSpPr>
-          <p:nvPr>
-            <p:ph type="title"/>
-          </p:nvPr>
-        </p:nvSpPr>
-        <p:spPr/>
-        <p:txBody>
-          <a:bodyPr/>
-          <a:lstStyle/>
-          <a:p>
-            <a:r>
-              <a:rPr lang="en-US" dirty="0" smtClean="0"/>
-              <a:t>Paste:: Paste Into Group</a:t>
-            </a:r>
-            <a:endParaRPr lang="en-SG" dirty="0"/>
-          </a:p>
-        </p:txBody>
-      </p:sp>
-      <p:sp>
-        <p:nvSpPr>
-          <p:cNvPr id="4" name="Content Placeholder 3"/>
-          <p:cNvSpPr>
-            <a:spLocks noGrp="1"/>
-          </p:cNvSpPr>
-          <p:nvPr>
-            <p:ph idx="1"/>
-          </p:nvPr>
-        </p:nvSpPr>
-        <p:spPr/>
-        <p:txBody>
-          <a:bodyPr/>
-          <a:lstStyle/>
-          <a:p>
-            <a:pPr marL="0" indent="0">
-              <a:buNone/>
-            </a:pPr>
-            <a:r>
-              <a:rPr lang="en-US" b="1" dirty="0" smtClean="0"/>
-              <a:t>Additional instructions</a:t>
-            </a:r>
-            <a:r>
-              <a:rPr lang="en-US" b="1" dirty="0"/>
-              <a:t>:</a:t>
-            </a:r>
-          </a:p>
-          <a:p>
-            <a:pPr marL="285750" indent="-285750"/>
-            <a:r>
-              <a:rPr lang="en-US" dirty="0"/>
-              <a:t>Select </a:t>
-            </a:r>
-            <a:r>
-              <a:rPr lang="en-US" dirty="0" smtClean="0"/>
-              <a:t>the appropriate shape/group.</a:t>
-            </a:r>
-            <a:endParaRPr lang="en-US" dirty="0"/>
-          </a:p>
-          <a:p>
-            <a:pPr marL="285750" indent="-285750"/>
-            <a:r>
-              <a:rPr lang="en-US" dirty="0" smtClean="0"/>
-              <a:t>Right click on the shape/group and click cut/copy.</a:t>
-            </a:r>
-            <a:endParaRPr lang="en-US" dirty="0"/>
-          </a:p>
-          <a:p>
-            <a:pPr marL="285750" indent="-285750"/>
-            <a:r>
-              <a:rPr lang="en-US" dirty="0" smtClean="0"/>
-              <a:t>Right click on the group of squares</a:t>
-            </a:r>
-            <a:endParaRPr lang="en-US" dirty="0"/>
-          </a:p>
-          <a:p>
-            <a:pPr marL="285750" indent="-285750"/>
-            <a:r>
-              <a:rPr lang="en-US" dirty="0" smtClean="0"/>
-              <a:t>Select Paste Into Group in the </a:t>
-            </a:r>
-            <a:r>
-              <a:rPr lang="en-US" dirty="0" err="1" smtClean="0"/>
-              <a:t>PowerPointLabs</a:t>
-            </a:r>
-            <a:r>
-              <a:rPr lang="en-US" dirty="0" smtClean="0"/>
-              <a:t> context menu</a:t>
-            </a:r>
-            <a:endParaRPr lang="en-US" dirty="0"/>
-          </a:p>
-        </p:txBody>
-      </p:sp>
-    </p:spTree>
-    <p:extLst>
-      <p:ext uri="{BB962C8B-B14F-4D97-AF65-F5344CB8AC3E}">
-        <p14:creationId xmlns:p14="http://schemas.microsoft.com/office/powerpoint/2010/main" val="3073987497"/>
-      </p:ext>
-    </p:extLst>
-  </p:cSld>
-  <p:clrMapOvr>
-    <a:masterClrMapping/>
-  </p:clrMapOvr>
-</p:sld>
-</file>
-
-<file path=ppt/slides/slide23.xml><?xml version="1.0" encoding="utf-8"?>
-<p:sld xmlns:a="http://schemas.openxmlformats.org/drawingml/2006/main" xmlns:r="http://schemas.openxmlformats.org/officeDocument/2006/relationships" xmlns:p="http://schemas.openxmlformats.org/presentationml/2006/main">
-  <p:cSld>
-    <p:spTree>
-      <p:nvGrpSpPr>
-        <p:cNvPr id="1" name=""/>
-        <p:cNvGrpSpPr/>
-        <p:nvPr/>
-      </p:nvGrpSpPr>
-      <p:grpSpPr>
-        <a:xfrm>
-          <a:off x="0" y="0"/>
-          <a:ext cx="0" cy="0"/>
-          <a:chOff x="0" y="0"/>
-          <a:chExt cx="0" cy="0"/>
-        </a:xfrm>
-      </p:grpSpPr>
-      <p:grpSp>
-        <p:nvGrpSpPr>
-          <p:cNvPr id="44" name="Group 43"/>
-          <p:cNvGrpSpPr/>
-          <p:nvPr/>
-        </p:nvGrpSpPr>
-        <p:grpSpPr>
-          <a:xfrm>
-            <a:off x="914400" y="1116842"/>
-            <a:ext cx="3048000" cy="3150358"/>
-            <a:chOff x="914400" y="1116842"/>
-            <a:chExt cx="3048000" cy="3150358"/>
-          </a:xfrm>
-        </p:grpSpPr>
-        <p:sp>
-          <p:nvSpPr>
-            <p:cNvPr id="5" name="Rectangle 4"/>
+            <p:cNvPr id="15" name="Rectangle 4"/>
             <p:cNvSpPr/>
             <p:nvPr/>
           </p:nvSpPr>
@@ -16610,261 +16373,7 @@
         </p:sp>
         <p:sp>
           <p:nvSpPr>
-            <p:cNvPr id="6" name="Rectangle 5"/>
-            <p:cNvSpPr/>
-            <p:nvPr/>
-          </p:nvSpPr>
-          <p:spPr>
-            <a:xfrm>
-              <a:off x="1447800" y="1650242"/>
-              <a:ext cx="1981200" cy="2057400"/>
-            </a:xfrm>
-            <a:prstGeom prst="rect">
-              <a:avLst/>
-            </a:prstGeom>
-            <a:solidFill>
-              <a:srgbClr val="00B050"/>
-            </a:solidFill>
-          </p:spPr>
-          <p:style>
-            <a:lnRef idx="2">
-              <a:schemeClr val="accent1">
-                <a:shade val="50000"/>
-              </a:schemeClr>
-            </a:lnRef>
-            <a:fillRef idx="1">
-              <a:schemeClr val="accent1"/>
-            </a:fillRef>
-            <a:effectRef idx="0">
-              <a:schemeClr val="accent1"/>
-            </a:effectRef>
-            <a:fontRef idx="minor">
-              <a:schemeClr val="lt1"/>
-            </a:fontRef>
-          </p:style>
-          <p:txBody>
-            <a:bodyPr rtlCol="0" anchor="ctr"/>
-            <a:lstStyle/>
-            <a:p>
-              <a:pPr algn="ctr"/>
-              <a:endParaRPr lang="en-US"/>
-            </a:p>
-          </p:txBody>
-        </p:sp>
-        <p:sp>
-          <p:nvSpPr>
-            <p:cNvPr id="7" name="Rectangle 6"/>
-            <p:cNvSpPr/>
-            <p:nvPr/>
-          </p:nvSpPr>
-          <p:spPr>
-            <a:xfrm>
-              <a:off x="1981200" y="2209800"/>
-              <a:ext cx="1981200" cy="2057400"/>
-            </a:xfrm>
-            <a:prstGeom prst="rect">
-              <a:avLst/>
-            </a:prstGeom>
-            <a:solidFill>
-              <a:srgbClr val="0070C0"/>
-            </a:solidFill>
-          </p:spPr>
-          <p:style>
-            <a:lnRef idx="2">
-              <a:schemeClr val="accent1">
-                <a:shade val="50000"/>
-              </a:schemeClr>
-            </a:lnRef>
-            <a:fillRef idx="1">
-              <a:schemeClr val="accent1"/>
-            </a:fillRef>
-            <a:effectRef idx="0">
-              <a:schemeClr val="accent1"/>
-            </a:effectRef>
-            <a:fontRef idx="minor">
-              <a:schemeClr val="lt1"/>
-            </a:fontRef>
-          </p:style>
-          <p:txBody>
-            <a:bodyPr rtlCol="0" anchor="ctr"/>
-            <a:lstStyle/>
-            <a:p>
-              <a:pPr algn="ctr"/>
-              <a:endParaRPr lang="en-US"/>
-            </a:p>
-          </p:txBody>
-        </p:sp>
-      </p:grpSp>
-      <p:pic>
-        <p:nvPicPr>
-          <p:cNvPr id="8" name="selectMe"/>
-          <p:cNvPicPr>
-            <a:picLocks noChangeAspect="1"/>
-          </p:cNvPicPr>
-          <p:nvPr/>
-        </p:nvPicPr>
-        <p:blipFill>
-          <a:blip r:embed="rId2">
-            <a:extLst>
-              <a:ext uri="{28A0092B-C50C-407E-A947-70E740481C1C}">
-                <a14:useLocalDpi xmlns:a14="http://schemas.microsoft.com/office/drawing/2010/main" val="0"/>
-              </a:ext>
-            </a:extLst>
-          </a:blip>
-          <a:stretch>
-            <a:fillRect/>
-          </a:stretch>
-        </p:blipFill>
-        <p:spPr>
-          <a:xfrm>
-            <a:off x="4343400" y="1208782"/>
-            <a:ext cx="4572000" cy="3058418"/>
-          </a:xfrm>
-          <a:prstGeom prst="rect">
-            <a:avLst/>
-          </a:prstGeom>
-        </p:spPr>
-      </p:pic>
-    </p:spTree>
-    <p:extLst>
-      <p:ext uri="{BB962C8B-B14F-4D97-AF65-F5344CB8AC3E}">
-        <p14:creationId xmlns:p14="http://schemas.microsoft.com/office/powerpoint/2010/main" val="2646484472"/>
-      </p:ext>
-    </p:extLst>
-  </p:cSld>
-  <p:clrMapOvr>
-    <a:masterClrMapping/>
-  </p:clrMapOvr>
-  <p:timing>
-    <p:tnLst>
-      <p:par>
-        <p:cTn id="1" dur="indefinite" restart="never" nodeType="tmRoot"/>
-      </p:par>
-    </p:tnLst>
-  </p:timing>
-</p:sld>
-</file>
-
-<file path=ppt/slides/slide24.xml><?xml version="1.0" encoding="utf-8"?>
-<p:sld xmlns:a="http://schemas.openxmlformats.org/drawingml/2006/main" xmlns:r="http://schemas.openxmlformats.org/officeDocument/2006/relationships" xmlns:p="http://schemas.openxmlformats.org/presentationml/2006/main">
-  <p:cSld>
-    <p:spTree>
-      <p:nvGrpSpPr>
-        <p:cNvPr id="1" name=""/>
-        <p:cNvGrpSpPr/>
-        <p:nvPr/>
-      </p:nvGrpSpPr>
-      <p:grpSpPr>
-        <a:xfrm>
-          <a:off x="0" y="0"/>
-          <a:ext cx="0" cy="0"/>
-          <a:chOff x="0" y="0"/>
-          <a:chExt cx="0" cy="0"/>
-        </a:xfrm>
-      </p:grpSpPr>
-      <p:grpSp>
-        <p:nvGrpSpPr>
-          <p:cNvPr id="2" name="Group 1"/>
-          <p:cNvGrpSpPr/>
-          <p:nvPr/>
-        </p:nvGrpSpPr>
-        <p:grpSpPr>
-          <a:xfrm>
-            <a:off x="914400" y="1116842"/>
-            <a:ext cx="8001000" cy="3150358"/>
-            <a:chOff x="914400" y="1116842"/>
-            <a:chExt cx="8001000" cy="3150358"/>
-          </a:xfrm>
-        </p:grpSpPr>
-        <p:sp>
-          <p:nvSpPr>
-            <p:cNvPr id="5" name="Rectangle 4"/>
-            <p:cNvSpPr/>
-            <p:nvPr/>
-          </p:nvSpPr>
-          <p:spPr>
-            <a:xfrm>
-              <a:off x="914400" y="1116842"/>
-              <a:ext cx="1981200" cy="2057400"/>
-            </a:xfrm>
-            <a:prstGeom prst="rect">
-              <a:avLst/>
-            </a:prstGeom>
-            <a:solidFill>
-              <a:srgbClr val="FF0000"/>
-            </a:solidFill>
-          </p:spPr>
-          <p:style>
-            <a:lnRef idx="2">
-              <a:schemeClr val="accent1">
-                <a:shade val="50000"/>
-              </a:schemeClr>
-            </a:lnRef>
-            <a:fillRef idx="1">
-              <a:schemeClr val="accent1"/>
-            </a:fillRef>
-            <a:effectRef idx="0">
-              <a:schemeClr val="accent1"/>
-            </a:effectRef>
-            <a:fontRef idx="minor">
-              <a:schemeClr val="lt1"/>
-            </a:fontRef>
-          </p:style>
-          <p:txBody>
-            <a:bodyPr rtlCol="0" anchor="ctr"/>
-            <a:lstStyle/>
-            <a:p>
-              <a:pPr algn="ctr"/>
-              <a:endParaRPr lang="en-US"/>
-            </a:p>
-          </p:txBody>
-        </p:sp>
-        <p:sp>
-          <p:nvSpPr>
-            <p:cNvPr id="6" name="Rectangle 5"/>
-            <p:cNvSpPr/>
-            <p:nvPr/>
-          </p:nvSpPr>
-          <p:spPr>
-            <a:xfrm>
-              <a:off x="1447800" y="1650242"/>
-              <a:ext cx="1981200" cy="2057400"/>
-            </a:xfrm>
-            <a:prstGeom prst="rect">
-              <a:avLst/>
-            </a:prstGeom>
-            <a:solidFill>
-              <a:srgbClr val="00B050"/>
-            </a:solidFill>
-          </p:spPr>
-          <p:style>
-            <a:lnRef idx="2">
-              <a:schemeClr val="accent1">
-                <a:shade val="50000"/>
-              </a:schemeClr>
-            </a:lnRef>
-            <a:fillRef idx="1">
-              <a:schemeClr val="accent1"/>
-            </a:fillRef>
-            <a:effectRef idx="0">
-              <a:schemeClr val="accent1"/>
-            </a:effectRef>
-            <a:fontRef idx="minor">
-              <a:schemeClr val="lt1"/>
-            </a:fontRef>
-          </p:style>
-          <p:txBody>
-            <a:bodyPr rtlCol="0" anchor="ctr"/>
-            <a:lstStyle/>
-            <a:p>
-              <a:pPr algn="ctr"/>
-              <a:endParaRPr lang="en-US"/>
-            </a:p>
-          </p:txBody>
-        </p:sp>
-        <p:sp>
-          <p:nvSpPr>
-            <p:cNvPr id="7" name="Rectangle 6"/>
+            <p:cNvPr id="14" name="Rectangle 6"/>
             <p:cNvSpPr/>
             <p:nvPr/>
           </p:nvSpPr>
@@ -16907,14 +16416,14 @@
         </p:sp>
         <p:pic>
           <p:nvPicPr>
-            <p:cNvPr id="9" name="selectMe"/>
+            <p:cNvPr id="8" name="selectMe"/>
             <p:cNvPicPr>
               <a:picLocks noChangeAspect="1"/>
             </p:cNvPicPr>
             <p:nvPr/>
           </p:nvPicPr>
           <p:blipFill>
-            <a:blip r:embed="rId2">
+            <a:blip r:embed="rId3">
               <a:extLst>
                 <a:ext uri="{28A0092B-C50C-407E-A947-70E740481C1C}">
                   <a14:useLocalDpi xmlns:a14="http://schemas.microsoft.com/office/drawing/2010/main" val="0"/>
@@ -16927,7 +16436,7 @@
           </p:blipFill>
           <p:spPr>
             <a:xfrm>
-              <a:off x="4343400" y="1208782"/>
+              <a:off x="1447800" y="1650242"/>
               <a:ext cx="4572000" cy="3058418"/>
             </a:xfrm>
             <a:prstGeom prst="rect">
@@ -16939,7 +16448,208 @@
     </p:spTree>
     <p:extLst>
       <p:ext uri="{BB962C8B-B14F-4D97-AF65-F5344CB8AC3E}">
-        <p14:creationId xmlns:p14="http://schemas.microsoft.com/office/powerpoint/2010/main" val="1259813525"/>
+        <p14:creationId xmlns:p14="http://schemas.microsoft.com/office/powerpoint/2010/main" val="3104905900"/>
+      </p:ext>
+    </p:extLst>
+  </p:cSld>
+  <p:clrMapOvr>
+    <a:masterClrMapping/>
+  </p:clrMapOvr>
+  <p:timing>
+    <p:tnLst>
+      <p:par>
+        <p:cTn id="1" dur="indefinite" restart="never" nodeType="tmRoot">
+          <p:childTnLst>
+            <p:seq concurrent="1" nextAc="seek">
+              <p:cTn id="2" dur="indefinite" nodeType="mainSeq">
+                <p:childTnLst>
+                  <p:par>
+                    <p:cTn id="3" fill="hold">
+                      <p:stCondLst>
+                        <p:cond delay="indefinite"/>
+                      </p:stCondLst>
+                      <p:childTnLst>
+                        <p:par>
+                          <p:cTn id="4" fill="hold">
+                            <p:stCondLst>
+                              <p:cond delay="0"/>
+                            </p:stCondLst>
+                            <p:childTnLst>
+                              <p:par>
+                                <p:cTn id="5" presetID="1" presetClass="entr" presetSubtype="0" fill="hold" nodeType="clickEffect">
+                                  <p:stCondLst>
+                                    <p:cond delay="0"/>
+                                  </p:stCondLst>
+                                  <p:childTnLst>
+                                    <p:set>
+                                      <p:cBhvr>
+                                        <p:cTn id="6" dur="1" fill="hold">
+                                          <p:stCondLst>
+                                            <p:cond delay="0"/>
+                                          </p:stCondLst>
+                                        </p:cTn>
+                                        <p:tgtEl>
+                                          <p:spTgt spid="4"/>
+                                        </p:tgtEl>
+                                        <p:attrNameLst>
+                                          <p:attrName>style.visibility</p:attrName>
+                                        </p:attrNameLst>
+                                      </p:cBhvr>
+                                      <p:to>
+                                        <p:strVal val="visible"/>
+                                      </p:to>
+                                    </p:set>
+                                  </p:childTnLst>
+                                </p:cTn>
+                              </p:par>
+                            </p:childTnLst>
+                          </p:cTn>
+                        </p:par>
+                      </p:childTnLst>
+                    </p:cTn>
+                  </p:par>
+                </p:childTnLst>
+              </p:cTn>
+              <p:prevCondLst>
+                <p:cond evt="onPrev" delay="0">
+                  <p:tgtEl>
+                    <p:sldTgt/>
+                  </p:tgtEl>
+                </p:cond>
+              </p:prevCondLst>
+              <p:nextCondLst>
+                <p:cond evt="onNext" delay="0">
+                  <p:tgtEl>
+                    <p:sldTgt/>
+                  </p:tgtEl>
+                </p:cond>
+              </p:nextCondLst>
+            </p:seq>
+          </p:childTnLst>
+        </p:cTn>
+      </p:par>
+    </p:tnLst>
+  </p:timing>
+</p:sld>
+</file>
+
+<file path=ppt/slides/slide22.xml><?xml version="1.0" encoding="utf-8"?>
+<p:sld xmlns:a="http://schemas.openxmlformats.org/drawingml/2006/main" xmlns:r="http://schemas.openxmlformats.org/officeDocument/2006/relationships" xmlns:p="http://schemas.openxmlformats.org/presentationml/2006/main">
+  <p:cSld>
+    <p:spTree>
+      <p:nvGrpSpPr>
+        <p:cNvPr id="1" name=""/>
+        <p:cNvGrpSpPr/>
+        <p:nvPr/>
+      </p:nvGrpSpPr>
+      <p:grpSpPr>
+        <a:xfrm>
+          <a:off x="0" y="0"/>
+          <a:ext cx="0" cy="0"/>
+          <a:chOff x="0" y="0"/>
+          <a:chExt cx="0" cy="0"/>
+        </a:xfrm>
+      </p:grpSpPr>
+      <p:sp>
+        <p:nvSpPr>
+          <p:cNvPr id="2" name="Title 1"/>
+          <p:cNvSpPr>
+            <a:spLocks noGrp="1"/>
+          </p:cNvSpPr>
+          <p:nvPr>
+            <p:ph type="title"/>
+          </p:nvPr>
+        </p:nvSpPr>
+        <p:spPr/>
+        <p:txBody>
+          <a:bodyPr/>
+          <a:lstStyle/>
+          <a:p>
+            <a:r>
+              <a:rPr lang="en-US" dirty="0" smtClean="0"/>
+              <a:t>Paste:: Paste Into Group</a:t>
+            </a:r>
+            <a:endParaRPr lang="en-SG" dirty="0"/>
+          </a:p>
+        </p:txBody>
+      </p:sp>
+      <p:sp>
+        <p:nvSpPr>
+          <p:cNvPr id="4" name="Content Placeholder 3"/>
+          <p:cNvSpPr>
+            <a:spLocks noGrp="1"/>
+          </p:cNvSpPr>
+          <p:nvPr>
+            <p:ph idx="1"/>
+          </p:nvPr>
+        </p:nvSpPr>
+        <p:spPr/>
+        <p:txBody>
+          <a:bodyPr/>
+          <a:lstStyle/>
+          <a:p>
+            <a:pPr marL="0" indent="0">
+              <a:buNone/>
+            </a:pPr>
+            <a:r>
+              <a:rPr lang="en-US" b="1" dirty="0" smtClean="0"/>
+              <a:t>Additional instructions</a:t>
+            </a:r>
+            <a:r>
+              <a:rPr lang="en-US" b="1" dirty="0"/>
+              <a:t>:</a:t>
+            </a:r>
+          </a:p>
+          <a:p>
+            <a:pPr marL="285750" indent="-285750"/>
+            <a:r>
+              <a:rPr lang="en-US" dirty="0"/>
+              <a:t>Select </a:t>
+            </a:r>
+            <a:r>
+              <a:rPr lang="en-US" dirty="0" smtClean="0"/>
+              <a:t>the appropriate shape/group.</a:t>
+            </a:r>
+            <a:endParaRPr lang="en-US" dirty="0"/>
+          </a:p>
+          <a:p>
+            <a:pPr marL="285750" indent="-285750"/>
+            <a:r>
+              <a:rPr lang="en-US" dirty="0" smtClean="0"/>
+              <a:t>Right click on the shape/group and click cut/copy.</a:t>
+            </a:r>
+            <a:endParaRPr lang="en-US" dirty="0"/>
+          </a:p>
+          <a:p>
+            <a:pPr marL="285750" indent="-285750"/>
+            <a:r>
+              <a:rPr lang="en-US" dirty="0" smtClean="0"/>
+              <a:t>Right click on the group of squares</a:t>
+            </a:r>
+            <a:endParaRPr lang="en-US" dirty="0"/>
+          </a:p>
+          <a:p>
+            <a:pPr marL="285750" indent="-285750"/>
+            <a:r>
+              <a:rPr lang="en-US" dirty="0" smtClean="0"/>
+              <a:t>Select Paste Into Group in the </a:t>
+            </a:r>
+            <a:r>
+              <a:rPr lang="en-US" dirty="0" err="1" smtClean="0"/>
+              <a:t>PowerPointLabs</a:t>
+            </a:r>
+            <a:r>
+              <a:rPr lang="en-US" dirty="0" smtClean="0"/>
+              <a:t> context menu</a:t>
+            </a:r>
+            <a:endParaRPr lang="en-US" dirty="0"/>
+          </a:p>
+        </p:txBody>
+      </p:sp>
+    </p:spTree>
+    <p:extLst>
+      <p:ext uri="{BB962C8B-B14F-4D97-AF65-F5344CB8AC3E}">
+        <p14:creationId xmlns:p14="http://schemas.microsoft.com/office/powerpoint/2010/main" val="3073987497"/>
       </p:ext>
     </p:extLst>
   </p:cSld>
@@ -16956,125 +16666,7 @@
 </p:sld>
 </file>
 
-<file path=ppt/slides/slide25.xml><?xml version="1.0" encoding="utf-8"?>
-<p:sld xmlns:a="http://schemas.openxmlformats.org/drawingml/2006/main" xmlns:r="http://schemas.openxmlformats.org/officeDocument/2006/relationships" xmlns:p="http://schemas.openxmlformats.org/presentationml/2006/main">
-  <p:cSld>
-    <p:spTree>
-      <p:nvGrpSpPr>
-        <p:cNvPr id="1" name=""/>
-        <p:cNvGrpSpPr/>
-        <p:nvPr/>
-      </p:nvGrpSpPr>
-      <p:grpSpPr>
-        <a:xfrm>
-          <a:off x="0" y="0"/>
-          <a:ext cx="0" cy="0"/>
-          <a:chOff x="0" y="0"/>
-          <a:chExt cx="0" cy="0"/>
-        </a:xfrm>
-      </p:grpSpPr>
-      <p:sp>
-        <p:nvSpPr>
-          <p:cNvPr id="2" name="Title 1"/>
-          <p:cNvSpPr>
-            <a:spLocks noGrp="1"/>
-          </p:cNvSpPr>
-          <p:nvPr>
-            <p:ph type="title"/>
-          </p:nvPr>
-        </p:nvSpPr>
-        <p:spPr/>
-        <p:txBody>
-          <a:bodyPr/>
-          <a:lstStyle/>
-          <a:p>
-            <a:r>
-              <a:rPr lang="en-US" dirty="0" smtClean="0"/>
-              <a:t>Paste:: Merge Into One Group</a:t>
-            </a:r>
-            <a:endParaRPr lang="en-SG" dirty="0"/>
-          </a:p>
-        </p:txBody>
-      </p:sp>
-      <p:sp>
-        <p:nvSpPr>
-          <p:cNvPr id="4" name="Content Placeholder 3"/>
-          <p:cNvSpPr>
-            <a:spLocks noGrp="1"/>
-          </p:cNvSpPr>
-          <p:nvPr>
-            <p:ph idx="1"/>
-          </p:nvPr>
-        </p:nvSpPr>
-        <p:spPr/>
-        <p:txBody>
-          <a:bodyPr/>
-          <a:lstStyle/>
-          <a:p>
-            <a:pPr marL="0" indent="0">
-              <a:buNone/>
-            </a:pPr>
-            <a:r>
-              <a:rPr lang="en-US" b="1" dirty="0" smtClean="0"/>
-              <a:t>Additional instructions</a:t>
-            </a:r>
-            <a:r>
-              <a:rPr lang="en-US" b="1" dirty="0"/>
-              <a:t>:</a:t>
-            </a:r>
-          </a:p>
-          <a:p>
-            <a:pPr marL="285750" indent="-285750"/>
-            <a:r>
-              <a:rPr lang="en-US" dirty="0"/>
-              <a:t>Select </a:t>
-            </a:r>
-            <a:r>
-              <a:rPr lang="en-US" dirty="0" smtClean="0"/>
-              <a:t>the appropriate shapes/groups.</a:t>
-            </a:r>
-            <a:endParaRPr lang="en-US" dirty="0"/>
-          </a:p>
-          <a:p>
-            <a:pPr marL="285750" indent="-285750"/>
-            <a:r>
-              <a:rPr lang="en-US" dirty="0" smtClean="0"/>
-              <a:t>Right click on the shapes/groups.</a:t>
-            </a:r>
-            <a:endParaRPr lang="en-US" dirty="0"/>
-          </a:p>
-          <a:p>
-            <a:pPr marL="285750" indent="-285750"/>
-            <a:r>
-              <a:rPr lang="en-US" dirty="0" smtClean="0"/>
-              <a:t>Select Merge Into One Group in the </a:t>
-            </a:r>
-            <a:r>
-              <a:rPr lang="en-US" dirty="0" err="1" smtClean="0"/>
-              <a:t>PowerPointLabs</a:t>
-            </a:r>
-            <a:r>
-              <a:rPr lang="en-US" dirty="0" smtClean="0"/>
-              <a:t> context menu</a:t>
-            </a:r>
-            <a:endParaRPr lang="en-US" dirty="0"/>
-          </a:p>
-        </p:txBody>
-      </p:sp>
-    </p:spTree>
-    <p:extLst>
-      <p:ext uri="{BB962C8B-B14F-4D97-AF65-F5344CB8AC3E}">
-        <p14:creationId xmlns:p14="http://schemas.microsoft.com/office/powerpoint/2010/main" val="1788128288"/>
-      </p:ext>
-    </p:extLst>
-  </p:cSld>
-  <p:clrMapOvr>
-    <a:masterClrMapping/>
-  </p:clrMapOvr>
-</p:sld>
-</file>
-
-<file path=ppt/slides/slide26.xml><?xml version="1.0" encoding="utf-8"?>
+<file path=ppt/slides/slide23.xml><?xml version="1.0" encoding="utf-8"?>
 <p:sld xmlns:a="http://schemas.openxmlformats.org/drawingml/2006/main" xmlns:r="http://schemas.openxmlformats.org/officeDocument/2006/relationships" xmlns:p="http://schemas.openxmlformats.org/presentationml/2006/main">
   <p:cSld>
     <p:spTree>
@@ -17268,7 +16860,7 @@
     </p:spTree>
     <p:extLst>
       <p:ext uri="{BB962C8B-B14F-4D97-AF65-F5344CB8AC3E}">
-        <p14:creationId xmlns:p14="http://schemas.microsoft.com/office/powerpoint/2010/main" val="2047173331"/>
+        <p14:creationId xmlns:p14="http://schemas.microsoft.com/office/powerpoint/2010/main" val="2646484472"/>
       </p:ext>
     </p:extLst>
   </p:cSld>
@@ -17296,7 +16888,7 @@
                             </p:stCondLst>
                             <p:childTnLst>
                               <p:par>
-                                <p:cTn id="5" presetID="2" presetClass="entr" presetSubtype="4" fill="hold" nodeType="clickEffect">
+                                <p:cTn id="5" presetID="1" presetClass="entr" presetSubtype="0" fill="hold" nodeType="clickEffect">
                                   <p:stCondLst>
                                     <p:cond delay="0"/>
                                   </p:stCondLst>
@@ -17319,52 +16911,6 @@
                                         <p:strVal val="visible"/>
                                       </p:to>
                                     </p:set>
-                                    <p:anim calcmode="lin" valueType="num">
-                                      <p:cBhvr additive="base">
-                                        <p:cTn id="7" dur="500" fill="hold"/>
-                                        <p:tgtEl>
-                                          <p:spTgt spid="44"/>
-                                        </p:tgtEl>
-                                        <p:attrNameLst>
-                                          <p:attrName>ppt_x</p:attrName>
-                                        </p:attrNameLst>
-                                      </p:cBhvr>
-                                      <p:tavLst>
-                                        <p:tav tm="0">
-                                          <p:val>
-                                            <p:strVal val="#ppt_x"/>
-                                          </p:val>
-                                        </p:tav>
-                                        <p:tav tm="100000">
-                                          <p:val>
-                                            <p:strVal val="#ppt_x"/>
-                                          </p:val>
-                                        </p:tav>
-                                      </p:tavLst>
-                                    </p:anim>
-                                    <p:anim calcmode="lin" valueType="num">
-                                      <p:cBhvr additive="base">
-                                        <p:cTn id="8" dur="500" fill="hold"/>
-                                        <p:tgtEl>
-                                          <p:spTgt spid="44"/>
-                                        </p:tgtEl>
-                                        <p:attrNameLst>
-                                          <p:attrName>ppt_y</p:attrName>
-                                        </p:attrNameLst>
-                                      </p:cBhvr>
-                                      <p:tavLst>
-                                        <p:tav tm="0">
-                                          <p:val>
-                                            <p:strVal val="1+#ppt_h/2"/>
-                                          </p:val>
-                                        </p:tav>
-                                        <p:tav tm="100000">
-                                          <p:val>
-                                            <p:strVal val="#ppt_y"/>
-                                          </p:val>
-                                        </p:tav>
-                                      </p:tavLst>
-                                    </p:anim>
                                   </p:childTnLst>
                                 </p:cTn>
                               </p:par>
@@ -17399,7 +16945,7 @@
 </p:sld>
 </file>
 
-<file path=ppt/slides/slide27.xml><?xml version="1.0" encoding="utf-8"?>
+<file path=ppt/slides/slide24.xml><?xml version="1.0" encoding="utf-8"?>
 <p:sld xmlns:a="http://schemas.openxmlformats.org/drawingml/2006/main" xmlns:r="http://schemas.openxmlformats.org/officeDocument/2006/relationships" xmlns:p="http://schemas.openxmlformats.org/presentationml/2006/main">
   <p:cSld>
     <p:spTree>
@@ -17416,169 +16962,199 @@
           <a:chExt cx="0" cy="0"/>
         </a:xfrm>
       </p:grpSpPr>
-      <p:sp>
-        <p:nvSpPr>
-          <p:cNvPr id="5" name="Rectangle 4"/>
-          <p:cNvSpPr/>
+      <p:grpSp>
+        <p:nvGrpSpPr>
+          <p:cNvPr id="2" name="Group 1"/>
+          <p:cNvGrpSpPr/>
           <p:nvPr/>
-        </p:nvSpPr>
-        <p:spPr>
+        </p:nvGrpSpPr>
+        <p:grpSpPr>
           <a:xfrm>
-            <a:off x="914400" y="1116842"/>
-            <a:ext cx="1981200" cy="2057400"/>
+            <a:off x="152400" y="1116842"/>
+            <a:ext cx="4572000" cy="3150358"/>
+            <a:chOff x="152400" y="1116842"/>
+            <a:chExt cx="4572000" cy="3150358"/>
           </a:xfrm>
-          <a:prstGeom prst="rect">
-            <a:avLst/>
-          </a:prstGeom>
-          <a:solidFill>
-            <a:srgbClr val="FF0000"/>
-          </a:solidFill>
-        </p:spPr>
-        <p:style>
-          <a:lnRef idx="2">
-            <a:schemeClr val="accent1">
-              <a:shade val="50000"/>
-            </a:schemeClr>
-          </a:lnRef>
-          <a:fillRef idx="1">
-            <a:schemeClr val="accent1"/>
-          </a:fillRef>
-          <a:effectRef idx="0">
-            <a:schemeClr val="accent1"/>
-          </a:effectRef>
-          <a:fontRef idx="minor">
-            <a:schemeClr val="lt1"/>
-          </a:fontRef>
-        </p:style>
-        <p:txBody>
-          <a:bodyPr rtlCol="0" anchor="ctr"/>
-          <a:lstStyle/>
-          <a:p>
-            <a:pPr algn="ctr"/>
-            <a:endParaRPr lang="en-US"/>
-          </a:p>
-        </p:txBody>
-      </p:sp>
-      <p:sp>
-        <p:nvSpPr>
-          <p:cNvPr id="6" name="Rectangle 5"/>
-          <p:cNvSpPr/>
-          <p:nvPr/>
-        </p:nvSpPr>
-        <p:spPr>
-          <a:xfrm>
-            <a:off x="1447800" y="1650242"/>
-            <a:ext cx="1981200" cy="2057400"/>
-          </a:xfrm>
-          <a:prstGeom prst="rect">
-            <a:avLst/>
-          </a:prstGeom>
-          <a:solidFill>
-            <a:srgbClr val="00B050"/>
-          </a:solidFill>
-        </p:spPr>
-        <p:style>
-          <a:lnRef idx="2">
-            <a:schemeClr val="accent1">
-              <a:shade val="50000"/>
-            </a:schemeClr>
-          </a:lnRef>
-          <a:fillRef idx="1">
-            <a:schemeClr val="accent1"/>
-          </a:fillRef>
-          <a:effectRef idx="0">
-            <a:schemeClr val="accent1"/>
-          </a:effectRef>
-          <a:fontRef idx="minor">
-            <a:schemeClr val="lt1"/>
-          </a:fontRef>
-        </p:style>
-        <p:txBody>
-          <a:bodyPr rtlCol="0" anchor="ctr"/>
-          <a:lstStyle/>
-          <a:p>
-            <a:pPr algn="ctr"/>
-            <a:endParaRPr lang="en-US"/>
-          </a:p>
-        </p:txBody>
-      </p:sp>
-      <p:sp>
-        <p:nvSpPr>
-          <p:cNvPr id="7" name="Rectangle 6"/>
-          <p:cNvSpPr/>
-          <p:nvPr/>
-        </p:nvSpPr>
-        <p:spPr>
-          <a:xfrm>
-            <a:off x="1981200" y="2209800"/>
-            <a:ext cx="1981200" cy="2057400"/>
-          </a:xfrm>
-          <a:prstGeom prst="rect">
-            <a:avLst/>
-          </a:prstGeom>
-          <a:solidFill>
-            <a:srgbClr val="0070C0"/>
-          </a:solidFill>
-        </p:spPr>
-        <p:style>
-          <a:lnRef idx="2">
-            <a:schemeClr val="accent1">
-              <a:shade val="50000"/>
-            </a:schemeClr>
-          </a:lnRef>
-          <a:fillRef idx="1">
-            <a:schemeClr val="accent1"/>
-          </a:fillRef>
-          <a:effectRef idx="0">
-            <a:schemeClr val="accent1"/>
-          </a:effectRef>
-          <a:fontRef idx="minor">
-            <a:schemeClr val="lt1"/>
-          </a:fontRef>
-        </p:style>
-        <p:txBody>
-          <a:bodyPr rtlCol="0" anchor="ctr"/>
-          <a:lstStyle/>
-          <a:p>
-            <a:pPr algn="ctr"/>
-            <a:endParaRPr lang="en-US"/>
-          </a:p>
-        </p:txBody>
-      </p:sp>
-      <p:pic>
-        <p:nvPicPr>
-          <p:cNvPr id="8" name="selectMe"/>
-          <p:cNvPicPr>
-            <a:picLocks noChangeAspect="1"/>
-          </p:cNvPicPr>
-          <p:nvPr/>
-        </p:nvPicPr>
-        <p:blipFill>
-          <a:blip r:embed="rId3">
-            <a:extLst>
-              <a:ext uri="{28A0092B-C50C-407E-A947-70E740481C1C}">
-                <a14:useLocalDpi xmlns:a14="http://schemas.microsoft.com/office/drawing/2010/main" val="0"/>
-              </a:ext>
-            </a:extLst>
-          </a:blip>
-          <a:stretch>
-            <a:fillRect/>
-          </a:stretch>
-        </p:blipFill>
-        <p:spPr>
-          <a:xfrm>
-            <a:off x="4343400" y="1208782"/>
-            <a:ext cx="4572000" cy="3058418"/>
-          </a:xfrm>
-          <a:prstGeom prst="rect">
-            <a:avLst/>
-          </a:prstGeom>
-        </p:spPr>
-      </p:pic>
+        </p:grpSpPr>
+        <p:grpSp>
+          <p:nvGrpSpPr>
+            <p:cNvPr id="9" name="Group 8"/>
+            <p:cNvGrpSpPr/>
+            <p:nvPr/>
+          </p:nvGrpSpPr>
+          <p:grpSpPr>
+            <a:xfrm>
+              <a:off x="914400" y="1116842"/>
+              <a:ext cx="3048000" cy="3150358"/>
+              <a:chOff x="914400" y="1116842"/>
+              <a:chExt cx="3048000" cy="3150358"/>
+            </a:xfrm>
+          </p:grpSpPr>
+          <p:sp>
+            <p:nvSpPr>
+              <p:cNvPr id="10" name="Rectangle 9"/>
+              <p:cNvSpPr/>
+              <p:nvPr/>
+            </p:nvSpPr>
+            <p:spPr>
+              <a:xfrm>
+                <a:off x="914400" y="1116842"/>
+                <a:ext cx="1981200" cy="2057400"/>
+              </a:xfrm>
+              <a:prstGeom prst="rect">
+                <a:avLst/>
+              </a:prstGeom>
+              <a:solidFill>
+                <a:srgbClr val="FF0000"/>
+              </a:solidFill>
+            </p:spPr>
+            <p:style>
+              <a:lnRef idx="2">
+                <a:schemeClr val="accent1">
+                  <a:shade val="50000"/>
+                </a:schemeClr>
+              </a:lnRef>
+              <a:fillRef idx="1">
+                <a:schemeClr val="accent1"/>
+              </a:fillRef>
+              <a:effectRef idx="0">
+                <a:schemeClr val="accent1"/>
+              </a:effectRef>
+              <a:fontRef idx="minor">
+                <a:schemeClr val="lt1"/>
+              </a:fontRef>
+            </p:style>
+            <p:txBody>
+              <a:bodyPr rtlCol="0" anchor="ctr"/>
+              <a:lstStyle/>
+              <a:p>
+                <a:pPr algn="ctr"/>
+                <a:endParaRPr lang="en-US"/>
+              </a:p>
+            </p:txBody>
+          </p:sp>
+          <p:sp>
+            <p:nvSpPr>
+              <p:cNvPr id="11" name="Rectangle 10"/>
+              <p:cNvSpPr/>
+              <p:nvPr/>
+            </p:nvSpPr>
+            <p:spPr>
+              <a:xfrm>
+                <a:off x="1447800" y="1650242"/>
+                <a:ext cx="1981200" cy="2057400"/>
+              </a:xfrm>
+              <a:prstGeom prst="rect">
+                <a:avLst/>
+              </a:prstGeom>
+              <a:solidFill>
+                <a:srgbClr val="00B050"/>
+              </a:solidFill>
+            </p:spPr>
+            <p:style>
+              <a:lnRef idx="2">
+                <a:schemeClr val="accent1">
+                  <a:shade val="50000"/>
+                </a:schemeClr>
+              </a:lnRef>
+              <a:fillRef idx="1">
+                <a:schemeClr val="accent1"/>
+              </a:fillRef>
+              <a:effectRef idx="0">
+                <a:schemeClr val="accent1"/>
+              </a:effectRef>
+              <a:fontRef idx="minor">
+                <a:schemeClr val="lt1"/>
+              </a:fontRef>
+            </p:style>
+            <p:txBody>
+              <a:bodyPr rtlCol="0" anchor="ctr"/>
+              <a:lstStyle/>
+              <a:p>
+                <a:pPr algn="ctr"/>
+                <a:endParaRPr lang="en-US"/>
+              </a:p>
+            </p:txBody>
+          </p:sp>
+          <p:sp>
+            <p:nvSpPr>
+              <p:cNvPr id="12" name="Rectangle 11"/>
+              <p:cNvSpPr/>
+              <p:nvPr/>
+            </p:nvSpPr>
+            <p:spPr>
+              <a:xfrm>
+                <a:off x="1981200" y="2209800"/>
+                <a:ext cx="1981200" cy="2057400"/>
+              </a:xfrm>
+              <a:prstGeom prst="rect">
+                <a:avLst/>
+              </a:prstGeom>
+              <a:solidFill>
+                <a:srgbClr val="0070C0"/>
+              </a:solidFill>
+            </p:spPr>
+            <p:style>
+              <a:lnRef idx="2">
+                <a:schemeClr val="accent1">
+                  <a:shade val="50000"/>
+                </a:schemeClr>
+              </a:lnRef>
+              <a:fillRef idx="1">
+                <a:schemeClr val="accent1"/>
+              </a:fillRef>
+              <a:effectRef idx="0">
+                <a:schemeClr val="accent1"/>
+              </a:effectRef>
+              <a:fontRef idx="minor">
+                <a:schemeClr val="lt1"/>
+              </a:fontRef>
+            </p:style>
+            <p:txBody>
+              <a:bodyPr rtlCol="0" anchor="ctr"/>
+              <a:lstStyle/>
+              <a:p>
+                <a:pPr algn="ctr"/>
+                <a:endParaRPr lang="en-US"/>
+              </a:p>
+            </p:txBody>
+          </p:sp>
+        </p:grpSp>
+        <p:pic>
+          <p:nvPicPr>
+            <p:cNvPr id="8" name="selectMe"/>
+            <p:cNvPicPr>
+              <a:picLocks noChangeAspect="1"/>
+            </p:cNvPicPr>
+            <p:nvPr/>
+          </p:nvPicPr>
+          <p:blipFill>
+            <a:blip r:embed="rId3">
+              <a:extLst>
+                <a:ext uri="{28A0092B-C50C-407E-A947-70E740481C1C}">
+                  <a14:useLocalDpi xmlns:a14="http://schemas.microsoft.com/office/drawing/2010/main" val="0"/>
+                </a:ext>
+              </a:extLst>
+            </a:blip>
+            <a:stretch>
+              <a:fillRect/>
+            </a:stretch>
+          </p:blipFill>
+          <p:spPr>
+            <a:xfrm>
+              <a:off x="152400" y="1162812"/>
+              <a:ext cx="4572000" cy="3058418"/>
+            </a:xfrm>
+            <a:prstGeom prst="rect">
+              <a:avLst/>
+            </a:prstGeom>
+          </p:spPr>
+        </p:pic>
+      </p:grpSp>
     </p:spTree>
     <p:extLst>
       <p:ext uri="{BB962C8B-B14F-4D97-AF65-F5344CB8AC3E}">
-        <p14:creationId xmlns:p14="http://schemas.microsoft.com/office/powerpoint/2010/main" val="233134890"/>
+        <p14:creationId xmlns:p14="http://schemas.microsoft.com/office/powerpoint/2010/main" val="3062807459"/>
       </p:ext>
     </p:extLst>
   </p:cSld>
@@ -17606,7 +17182,7 @@
                             </p:stCondLst>
                             <p:childTnLst>
                               <p:par>
-                                <p:cTn id="5" presetID="2" presetClass="entr" presetSubtype="4" fill="hold" grpId="0" nodeType="clickEffect">
+                                <p:cTn id="5" presetID="1" presetClass="entr" presetSubtype="0" fill="hold" nodeType="clickEffect">
                                   <p:stCondLst>
                                     <p:cond delay="0"/>
                                   </p:stCondLst>
@@ -17619,7 +17195,7 @@
                                           </p:stCondLst>
                                         </p:cTn>
                                         <p:tgtEl>
-                                          <p:spTgt spid="5"/>
+                                          <p:spTgt spid="2"/>
                                         </p:tgtEl>
                                         <p:attrNameLst>
                                           <p:attrName>style.visibility</p:attrName>
@@ -17629,52 +17205,6 @@
                                         <p:strVal val="visible"/>
                                       </p:to>
                                     </p:set>
-                                    <p:anim calcmode="lin" valueType="num">
-                                      <p:cBhvr additive="base">
-                                        <p:cTn id="7" dur="500" fill="hold"/>
-                                        <p:tgtEl>
-                                          <p:spTgt spid="5"/>
-                                        </p:tgtEl>
-                                        <p:attrNameLst>
-                                          <p:attrName>ppt_x</p:attrName>
-                                        </p:attrNameLst>
-                                      </p:cBhvr>
-                                      <p:tavLst>
-                                        <p:tav tm="0">
-                                          <p:val>
-                                            <p:strVal val="#ppt_x"/>
-                                          </p:val>
-                                        </p:tav>
-                                        <p:tav tm="100000">
-                                          <p:val>
-                                            <p:strVal val="#ppt_x"/>
-                                          </p:val>
-                                        </p:tav>
-                                      </p:tavLst>
-                                    </p:anim>
-                                    <p:anim calcmode="lin" valueType="num">
-                                      <p:cBhvr additive="base">
-                                        <p:cTn id="8" dur="500" fill="hold"/>
-                                        <p:tgtEl>
-                                          <p:spTgt spid="5"/>
-                                        </p:tgtEl>
-                                        <p:attrNameLst>
-                                          <p:attrName>ppt_y</p:attrName>
-                                        </p:attrNameLst>
-                                      </p:cBhvr>
-                                      <p:tavLst>
-                                        <p:tav tm="0">
-                                          <p:val>
-                                            <p:strVal val="1+#ppt_h/2"/>
-                                          </p:val>
-                                        </p:tav>
-                                        <p:tav tm="100000">
-                                          <p:val>
-                                            <p:strVal val="#ppt_y"/>
-                                          </p:val>
-                                        </p:tav>
-                                      </p:tavLst>
-                                    </p:anim>
                                   </p:childTnLst>
                                 </p:cTn>
                               </p:par>
@@ -17705,9 +17235,6 @@
         </p:cTn>
       </p:par>
     </p:tnLst>
-    <p:bldLst>
-      <p:bldP spid="5" grpId="0" animBg="1"/>
-    </p:bldLst>
   </p:timing>
 </p:sld>
 </file>

</xml_diff>

<commit_message>
Paste Lab: Replace With Clipboard should maintain z-order #1337 (#1381)
</commit_message>
<xml_diff>
--- a/doc/test/PasteLab.pptx
+++ b/doc/test/PasteLab.pptx
@@ -171,7 +171,7 @@
       </p14:sectionLst>
     </p:ext>
     <p:ext uri="{EFAFB233-063F-42B5-8137-9DF3F51BA10A}">
-      <p15:sldGuideLst xmlns:p15="http://schemas.microsoft.com/office/powerpoint/2012/main"/>
+      <p15:sldGuideLst xmlns="" xmlns:p15="http://schemas.microsoft.com/office/powerpoint/2012/main"/>
     </p:ext>
   </p:extLst>
 </p:presentation>
@@ -259,7 +259,7 @@
           <a:p>
             <a:fld id="{43E32005-3A63-48D2-8C73-BF5F95786EBD}" type="datetimeFigureOut">
               <a:rPr lang="en-US" smtClean="0"/>
-              <a:t>5/22/2017</a:t>
+              <a:t>5/26/2017</a:t>
             </a:fld>
             <a:endParaRPr lang="en-US"/>
           </a:p>
@@ -2812,7 +2812,7 @@
           <a:p>
             <a:fld id="{699DC775-C286-4358-8C92-D7E584E969B3}" type="datetimeFigureOut">
               <a:rPr lang="en-US" smtClean="0"/>
-              <a:t>5/22/2017</a:t>
+              <a:t>5/26/2017</a:t>
             </a:fld>
             <a:endParaRPr lang="en-US"/>
           </a:p>
@@ -2980,7 +2980,7 @@
           <a:p>
             <a:fld id="{699DC775-C286-4358-8C92-D7E584E969B3}" type="datetimeFigureOut">
               <a:rPr lang="en-US" smtClean="0"/>
-              <a:t>5/22/2017</a:t>
+              <a:t>5/26/2017</a:t>
             </a:fld>
             <a:endParaRPr lang="en-US"/>
           </a:p>
@@ -3158,7 +3158,7 @@
           <a:p>
             <a:fld id="{699DC775-C286-4358-8C92-D7E584E969B3}" type="datetimeFigureOut">
               <a:rPr lang="en-US" smtClean="0"/>
-              <a:t>5/22/2017</a:t>
+              <a:t>5/26/2017</a:t>
             </a:fld>
             <a:endParaRPr lang="en-US"/>
           </a:p>
@@ -3398,7 +3398,7 @@
           <a:p>
             <a:fld id="{699DC775-C286-4358-8C92-D7E584E969B3}" type="datetimeFigureOut">
               <a:rPr lang="en-US" smtClean="0"/>
-              <a:t>5/22/2017</a:t>
+              <a:t>5/26/2017</a:t>
             </a:fld>
             <a:endParaRPr lang="en-US"/>
           </a:p>
@@ -3566,7 +3566,7 @@
           <a:p>
             <a:fld id="{699DC775-C286-4358-8C92-D7E584E969B3}" type="datetimeFigureOut">
               <a:rPr lang="en-US" smtClean="0"/>
-              <a:t>5/22/2017</a:t>
+              <a:t>5/26/2017</a:t>
             </a:fld>
             <a:endParaRPr lang="en-US"/>
           </a:p>
@@ -3811,7 +3811,7 @@
           <a:p>
             <a:fld id="{699DC775-C286-4358-8C92-D7E584E969B3}" type="datetimeFigureOut">
               <a:rPr lang="en-US" smtClean="0"/>
-              <a:t>5/22/2017</a:t>
+              <a:t>5/26/2017</a:t>
             </a:fld>
             <a:endParaRPr lang="en-US"/>
           </a:p>
@@ -4096,7 +4096,7 @@
           <a:p>
             <a:fld id="{699DC775-C286-4358-8C92-D7E584E969B3}" type="datetimeFigureOut">
               <a:rPr lang="en-US" smtClean="0"/>
-              <a:t>5/22/2017</a:t>
+              <a:t>5/26/2017</a:t>
             </a:fld>
             <a:endParaRPr lang="en-US"/>
           </a:p>
@@ -4515,7 +4515,7 @@
           <a:p>
             <a:fld id="{699DC775-C286-4358-8C92-D7E584E969B3}" type="datetimeFigureOut">
               <a:rPr lang="en-US" smtClean="0"/>
-              <a:t>5/22/2017</a:t>
+              <a:t>5/26/2017</a:t>
             </a:fld>
             <a:endParaRPr lang="en-US"/>
           </a:p>
@@ -4632,7 +4632,7 @@
           <a:p>
             <a:fld id="{699DC775-C286-4358-8C92-D7E584E969B3}" type="datetimeFigureOut">
               <a:rPr lang="en-US" smtClean="0"/>
-              <a:t>5/22/2017</a:t>
+              <a:t>5/26/2017</a:t>
             </a:fld>
             <a:endParaRPr lang="en-US"/>
           </a:p>
@@ -4727,7 +4727,7 @@
           <a:p>
             <a:fld id="{699DC775-C286-4358-8C92-D7E584E969B3}" type="datetimeFigureOut">
               <a:rPr lang="en-US" smtClean="0"/>
-              <a:t>5/22/2017</a:t>
+              <a:t>5/26/2017</a:t>
             </a:fld>
             <a:endParaRPr lang="en-US"/>
           </a:p>
@@ -5002,7 +5002,7 @@
           <a:p>
             <a:fld id="{699DC775-C286-4358-8C92-D7E584E969B3}" type="datetimeFigureOut">
               <a:rPr lang="en-US" smtClean="0"/>
-              <a:t>5/22/2017</a:t>
+              <a:t>5/26/2017</a:t>
             </a:fld>
             <a:endParaRPr lang="en-US"/>
           </a:p>
@@ -5170,7 +5170,7 @@
           <a:p>
             <a:fld id="{699DC775-C286-4358-8C92-D7E584E969B3}" type="datetimeFigureOut">
               <a:rPr lang="en-US" smtClean="0"/>
-              <a:t>5/22/2017</a:t>
+              <a:t>5/26/2017</a:t>
             </a:fld>
             <a:endParaRPr lang="en-US"/>
           </a:p>
@@ -5422,7 +5422,7 @@
           <a:p>
             <a:fld id="{699DC775-C286-4358-8C92-D7E584E969B3}" type="datetimeFigureOut">
               <a:rPr lang="en-US" smtClean="0"/>
-              <a:t>5/22/2017</a:t>
+              <a:t>5/26/2017</a:t>
             </a:fld>
             <a:endParaRPr lang="en-US"/>
           </a:p>
@@ -5590,7 +5590,7 @@
           <a:p>
             <a:fld id="{699DC775-C286-4358-8C92-D7E584E969B3}" type="datetimeFigureOut">
               <a:rPr lang="en-US" smtClean="0"/>
-              <a:t>5/22/2017</a:t>
+              <a:t>5/26/2017</a:t>
             </a:fld>
             <a:endParaRPr lang="en-US"/>
           </a:p>
@@ -5768,7 +5768,7 @@
           <a:p>
             <a:fld id="{699DC775-C286-4358-8C92-D7E584E969B3}" type="datetimeFigureOut">
               <a:rPr lang="en-US" smtClean="0"/>
-              <a:t>5/22/2017</a:t>
+              <a:t>5/26/2017</a:t>
             </a:fld>
             <a:endParaRPr lang="en-US"/>
           </a:p>
@@ -6016,7 +6016,7 @@
           <a:p>
             <a:fld id="{699DC775-C286-4358-8C92-D7E584E969B3}" type="datetimeFigureOut">
               <a:rPr lang="en-US" smtClean="0"/>
-              <a:t>5/22/2017</a:t>
+              <a:t>5/26/2017</a:t>
             </a:fld>
             <a:endParaRPr lang="en-US"/>
           </a:p>
@@ -6192,7 +6192,7 @@
           <a:p>
             <a:fld id="{699DC775-C286-4358-8C92-D7E584E969B3}" type="datetimeFigureOut">
               <a:rPr lang="en-US" smtClean="0"/>
-              <a:t>5/22/2017</a:t>
+              <a:t>5/26/2017</a:t>
             </a:fld>
             <a:endParaRPr lang="en-US"/>
           </a:p>
@@ -6445,7 +6445,7 @@
           <a:p>
             <a:fld id="{699DC775-C286-4358-8C92-D7E584E969B3}" type="datetimeFigureOut">
               <a:rPr lang="en-US" smtClean="0"/>
-              <a:t>5/22/2017</a:t>
+              <a:t>5/26/2017</a:t>
             </a:fld>
             <a:endParaRPr lang="en-US"/>
           </a:p>
@@ -6738,7 +6738,7 @@
           <a:p>
             <a:fld id="{699DC775-C286-4358-8C92-D7E584E969B3}" type="datetimeFigureOut">
               <a:rPr lang="en-US" smtClean="0"/>
-              <a:t>5/22/2017</a:t>
+              <a:t>5/26/2017</a:t>
             </a:fld>
             <a:endParaRPr lang="en-US"/>
           </a:p>
@@ -7165,7 +7165,7 @@
           <a:p>
             <a:fld id="{699DC775-C286-4358-8C92-D7E584E969B3}" type="datetimeFigureOut">
               <a:rPr lang="en-US" smtClean="0"/>
-              <a:t>5/22/2017</a:t>
+              <a:t>5/26/2017</a:t>
             </a:fld>
             <a:endParaRPr lang="en-US"/>
           </a:p>
@@ -7290,7 +7290,7 @@
           <a:p>
             <a:fld id="{699DC775-C286-4358-8C92-D7E584E969B3}" type="datetimeFigureOut">
               <a:rPr lang="en-US" smtClean="0"/>
-              <a:t>5/22/2017</a:t>
+              <a:t>5/26/2017</a:t>
             </a:fld>
             <a:endParaRPr lang="en-US"/>
           </a:p>
@@ -7393,7 +7393,7 @@
           <a:p>
             <a:fld id="{699DC775-C286-4358-8C92-D7E584E969B3}" type="datetimeFigureOut">
               <a:rPr lang="en-US" smtClean="0"/>
-              <a:t>5/22/2017</a:t>
+              <a:t>5/26/2017</a:t>
             </a:fld>
             <a:endParaRPr lang="en-US"/>
           </a:p>
@@ -7638,7 +7638,7 @@
           <a:p>
             <a:fld id="{699DC775-C286-4358-8C92-D7E584E969B3}" type="datetimeFigureOut">
               <a:rPr lang="en-US" smtClean="0"/>
-              <a:t>5/22/2017</a:t>
+              <a:t>5/26/2017</a:t>
             </a:fld>
             <a:endParaRPr lang="en-US"/>
           </a:p>
@@ -7921,7 +7921,7 @@
           <a:p>
             <a:fld id="{699DC775-C286-4358-8C92-D7E584E969B3}" type="datetimeFigureOut">
               <a:rPr lang="en-US" smtClean="0"/>
-              <a:t>5/22/2017</a:t>
+              <a:t>5/26/2017</a:t>
             </a:fld>
             <a:endParaRPr lang="en-US"/>
           </a:p>
@@ -8181,7 +8181,7 @@
           <a:p>
             <a:fld id="{699DC775-C286-4358-8C92-D7E584E969B3}" type="datetimeFigureOut">
               <a:rPr lang="en-US" smtClean="0"/>
-              <a:t>5/22/2017</a:t>
+              <a:t>5/26/2017</a:t>
             </a:fld>
             <a:endParaRPr lang="en-US"/>
           </a:p>
@@ -8357,7 +8357,7 @@
           <a:p>
             <a:fld id="{699DC775-C286-4358-8C92-D7E584E969B3}" type="datetimeFigureOut">
               <a:rPr lang="en-US" smtClean="0"/>
-              <a:t>5/22/2017</a:t>
+              <a:t>5/26/2017</a:t>
             </a:fld>
             <a:endParaRPr lang="en-US"/>
           </a:p>
@@ -8543,7 +8543,7 @@
           <a:p>
             <a:fld id="{699DC775-C286-4358-8C92-D7E584E969B3}" type="datetimeFigureOut">
               <a:rPr lang="en-US" smtClean="0"/>
-              <a:t>5/22/2017</a:t>
+              <a:t>5/26/2017</a:t>
             </a:fld>
             <a:endParaRPr lang="en-US"/>
           </a:p>
@@ -8735,7 +8735,7 @@
           <a:p>
             <a:fld id="{45696B32-6A70-48EC-8939-9D142D9557CD}" type="datetimeFigureOut">
               <a:rPr lang="en-US" smtClean="0"/>
-              <a:t>5/22/2017</a:t>
+              <a:t>5/26/2017</a:t>
             </a:fld>
             <a:endParaRPr lang="en-US"/>
           </a:p>
@@ -9051,7 +9051,7 @@
           <a:p>
             <a:fld id="{45696B32-6A70-48EC-8939-9D142D9557CD}" type="datetimeFigureOut">
               <a:rPr lang="en-US" smtClean="0"/>
-              <a:t>5/22/2017</a:t>
+              <a:t>5/26/2017</a:t>
             </a:fld>
             <a:endParaRPr lang="en-US"/>
           </a:p>
@@ -9297,7 +9297,7 @@
           <a:p>
             <a:fld id="{45696B32-6A70-48EC-8939-9D142D9557CD}" type="datetimeFigureOut">
               <a:rPr lang="en-US" smtClean="0"/>
-              <a:t>5/22/2017</a:t>
+              <a:t>5/26/2017</a:t>
             </a:fld>
             <a:endParaRPr lang="en-US"/>
           </a:p>
@@ -9529,7 +9529,7 @@
           <a:p>
             <a:fld id="{45696B32-6A70-48EC-8939-9D142D9557CD}" type="datetimeFigureOut">
               <a:rPr lang="en-US" smtClean="0"/>
-              <a:t>5/22/2017</a:t>
+              <a:t>5/26/2017</a:t>
             </a:fld>
             <a:endParaRPr lang="en-US"/>
           </a:p>
@@ -9896,7 +9896,7 @@
           <a:p>
             <a:fld id="{45696B32-6A70-48EC-8939-9D142D9557CD}" type="datetimeFigureOut">
               <a:rPr lang="en-US" smtClean="0"/>
-              <a:t>5/22/2017</a:t>
+              <a:t>5/26/2017</a:t>
             </a:fld>
             <a:endParaRPr lang="en-US"/>
           </a:p>
@@ -10014,7 +10014,7 @@
           <a:p>
             <a:fld id="{45696B32-6A70-48EC-8939-9D142D9557CD}" type="datetimeFigureOut">
               <a:rPr lang="en-US" smtClean="0"/>
-              <a:t>5/22/2017</a:t>
+              <a:t>5/26/2017</a:t>
             </a:fld>
             <a:endParaRPr lang="en-US"/>
           </a:p>
@@ -10299,7 +10299,7 @@
           <a:p>
             <a:fld id="{699DC775-C286-4358-8C92-D7E584E969B3}" type="datetimeFigureOut">
               <a:rPr lang="en-US" smtClean="0"/>
-              <a:t>5/22/2017</a:t>
+              <a:t>5/26/2017</a:t>
             </a:fld>
             <a:endParaRPr lang="en-US"/>
           </a:p>
@@ -10394,7 +10394,7 @@
           <a:p>
             <a:fld id="{45696B32-6A70-48EC-8939-9D142D9557CD}" type="datetimeFigureOut">
               <a:rPr lang="en-US" smtClean="0"/>
-              <a:t>5/22/2017</a:t>
+              <a:t>5/26/2017</a:t>
             </a:fld>
             <a:endParaRPr lang="en-US"/>
           </a:p>
@@ -10671,7 +10671,7 @@
           <a:p>
             <a:fld id="{45696B32-6A70-48EC-8939-9D142D9557CD}" type="datetimeFigureOut">
               <a:rPr lang="en-US" smtClean="0"/>
-              <a:t>5/22/2017</a:t>
+              <a:t>5/26/2017</a:t>
             </a:fld>
             <a:endParaRPr lang="en-US"/>
           </a:p>
@@ -10924,7 +10924,7 @@
           <a:p>
             <a:fld id="{45696B32-6A70-48EC-8939-9D142D9557CD}" type="datetimeFigureOut">
               <a:rPr lang="en-US" smtClean="0"/>
-              <a:t>5/22/2017</a:t>
+              <a:t>5/26/2017</a:t>
             </a:fld>
             <a:endParaRPr lang="en-US"/>
           </a:p>
@@ -11094,7 +11094,7 @@
           <a:p>
             <a:fld id="{45696B32-6A70-48EC-8939-9D142D9557CD}" type="datetimeFigureOut">
               <a:rPr lang="en-US" smtClean="0"/>
-              <a:t>5/22/2017</a:t>
+              <a:t>5/26/2017</a:t>
             </a:fld>
             <a:endParaRPr lang="en-US"/>
           </a:p>
@@ -11274,7 +11274,7 @@
           <a:p>
             <a:fld id="{45696B32-6A70-48EC-8939-9D142D9557CD}" type="datetimeFigureOut">
               <a:rPr lang="en-US" smtClean="0"/>
-              <a:t>5/22/2017</a:t>
+              <a:t>5/26/2017</a:t>
             </a:fld>
             <a:endParaRPr lang="en-US"/>
           </a:p>
@@ -11693,7 +11693,7 @@
           <a:p>
             <a:fld id="{699DC775-C286-4358-8C92-D7E584E969B3}" type="datetimeFigureOut">
               <a:rPr lang="en-US" smtClean="0"/>
-              <a:t>5/22/2017</a:t>
+              <a:t>5/26/2017</a:t>
             </a:fld>
             <a:endParaRPr lang="en-US"/>
           </a:p>
@@ -11810,7 +11810,7 @@
           <a:p>
             <a:fld id="{699DC775-C286-4358-8C92-D7E584E969B3}" type="datetimeFigureOut">
               <a:rPr lang="en-US" smtClean="0"/>
-              <a:t>5/22/2017</a:t>
+              <a:t>5/26/2017</a:t>
             </a:fld>
             <a:endParaRPr lang="en-US"/>
           </a:p>
@@ -11905,7 +11905,7 @@
           <a:p>
             <a:fld id="{699DC775-C286-4358-8C92-D7E584E969B3}" type="datetimeFigureOut">
               <a:rPr lang="en-US" smtClean="0"/>
-              <a:t>5/22/2017</a:t>
+              <a:t>5/26/2017</a:t>
             </a:fld>
             <a:endParaRPr lang="en-US"/>
           </a:p>
@@ -12180,7 +12180,7 @@
           <a:p>
             <a:fld id="{699DC775-C286-4358-8C92-D7E584E969B3}" type="datetimeFigureOut">
               <a:rPr lang="en-US" smtClean="0"/>
-              <a:t>5/22/2017</a:t>
+              <a:t>5/26/2017</a:t>
             </a:fld>
             <a:endParaRPr lang="en-US"/>
           </a:p>
@@ -12432,7 +12432,7 @@
           <a:p>
             <a:fld id="{699DC775-C286-4358-8C92-D7E584E969B3}" type="datetimeFigureOut">
               <a:rPr lang="en-US" smtClean="0"/>
-              <a:t>5/22/2017</a:t>
+              <a:t>5/26/2017</a:t>
             </a:fld>
             <a:endParaRPr lang="en-US"/>
           </a:p>
@@ -12643,7 +12643,7 @@
           <a:p>
             <a:fld id="{699DC775-C286-4358-8C92-D7E584E969B3}" type="datetimeFigureOut">
               <a:rPr lang="en-US" smtClean="0"/>
-              <a:t>5/22/2017</a:t>
+              <a:t>5/26/2017</a:t>
             </a:fld>
             <a:endParaRPr lang="en-US"/>
           </a:p>
@@ -13156,7 +13156,7 @@
           <a:p>
             <a:fld id="{699DC775-C286-4358-8C92-D7E584E969B3}" type="datetimeFigureOut">
               <a:rPr lang="en-US" smtClean="0"/>
-              <a:t>5/22/2017</a:t>
+              <a:t>5/26/2017</a:t>
             </a:fld>
             <a:endParaRPr lang="en-US"/>
           </a:p>
@@ -13667,7 +13667,7 @@
           <a:p>
             <a:fld id="{699DC775-C286-4358-8C92-D7E584E969B3}" type="datetimeFigureOut">
               <a:rPr lang="en-US" smtClean="0"/>
-              <a:t>5/22/2017</a:t>
+              <a:t>5/26/2017</a:t>
             </a:fld>
             <a:endParaRPr lang="en-US"/>
           </a:p>
@@ -14177,7 +14177,7 @@
           <a:p>
             <a:fld id="{45696B32-6A70-48EC-8939-9D142D9557CD}" type="datetimeFigureOut">
               <a:rPr lang="en-US" smtClean="0"/>
-              <a:t>5/22/2017</a:t>
+              <a:t>5/26/2017</a:t>
             </a:fld>
             <a:endParaRPr lang="en-US"/>
           </a:p>
@@ -15850,49 +15850,6 @@
           </a:p>
         </p:txBody>
       </p:sp>
-      <p:sp>
-        <p:nvSpPr>
-          <p:cNvPr id="7" name="Rectangle 6"/>
-          <p:cNvSpPr/>
-          <p:nvPr/>
-        </p:nvSpPr>
-        <p:spPr>
-          <a:xfrm>
-            <a:off x="1981200" y="2209800"/>
-            <a:ext cx="1981200" cy="2057400"/>
-          </a:xfrm>
-          <a:prstGeom prst="rect">
-            <a:avLst/>
-          </a:prstGeom>
-          <a:solidFill>
-            <a:srgbClr val="0070C0"/>
-          </a:solidFill>
-        </p:spPr>
-        <p:style>
-          <a:lnRef idx="2">
-            <a:schemeClr val="accent1">
-              <a:shade val="50000"/>
-            </a:schemeClr>
-          </a:lnRef>
-          <a:fillRef idx="1">
-            <a:schemeClr val="accent1"/>
-          </a:fillRef>
-          <a:effectRef idx="0">
-            <a:schemeClr val="accent1"/>
-          </a:effectRef>
-          <a:fontRef idx="minor">
-            <a:schemeClr val="lt1"/>
-          </a:fontRef>
-        </p:style>
-        <p:txBody>
-          <a:bodyPr rtlCol="0" anchor="ctr"/>
-          <a:lstStyle/>
-          <a:p>
-            <a:pPr algn="ctr"/>
-            <a:endParaRPr lang="en-US"/>
-          </a:p>
-        </p:txBody>
-      </p:sp>
       <p:pic>
         <p:nvPicPr>
           <p:cNvPr id="10" name="selectMe"/>
@@ -15923,6 +15880,49 @@
           </a:prstGeom>
         </p:spPr>
       </p:pic>
+      <p:sp>
+        <p:nvSpPr>
+          <p:cNvPr id="7" name="Rectangle 6"/>
+          <p:cNvSpPr/>
+          <p:nvPr/>
+        </p:nvSpPr>
+        <p:spPr>
+          <a:xfrm>
+            <a:off x="1981200" y="2209800"/>
+            <a:ext cx="1981200" cy="2057400"/>
+          </a:xfrm>
+          <a:prstGeom prst="rect">
+            <a:avLst/>
+          </a:prstGeom>
+          <a:solidFill>
+            <a:srgbClr val="0070C0"/>
+          </a:solidFill>
+        </p:spPr>
+        <p:style>
+          <a:lnRef idx="2">
+            <a:schemeClr val="accent1">
+              <a:shade val="50000"/>
+            </a:schemeClr>
+          </a:lnRef>
+          <a:fillRef idx="1">
+            <a:schemeClr val="accent1"/>
+          </a:fillRef>
+          <a:effectRef idx="0">
+            <a:schemeClr val="accent1"/>
+          </a:effectRef>
+          <a:fontRef idx="minor">
+            <a:schemeClr val="lt1"/>
+          </a:fontRef>
+        </p:style>
+        <p:txBody>
+          <a:bodyPr rtlCol="0" anchor="ctr"/>
+          <a:lstStyle/>
+          <a:p>
+            <a:pPr algn="ctr"/>
+            <a:endParaRPr lang="en-US"/>
+          </a:p>
+        </p:txBody>
+      </p:sp>
     </p:spTree>
     <p:extLst>
       <p:ext uri="{BB962C8B-B14F-4D97-AF65-F5344CB8AC3E}">
@@ -16371,6 +16371,36 @@
             </a:p>
           </p:txBody>
         </p:sp>
+        <p:pic>
+          <p:nvPicPr>
+            <p:cNvPr id="8" name="selectMe"/>
+            <p:cNvPicPr>
+              <a:picLocks noChangeAspect="1"/>
+            </p:cNvPicPr>
+            <p:nvPr/>
+          </p:nvPicPr>
+          <p:blipFill>
+            <a:blip r:embed="rId3">
+              <a:extLst>
+                <a:ext uri="{28A0092B-C50C-407E-A947-70E740481C1C}">
+                  <a14:useLocalDpi xmlns:a14="http://schemas.microsoft.com/office/drawing/2010/main" val="0"/>
+                </a:ext>
+              </a:extLst>
+            </a:blip>
+            <a:stretch>
+              <a:fillRect/>
+            </a:stretch>
+          </p:blipFill>
+          <p:spPr>
+            <a:xfrm>
+              <a:off x="1447800" y="1650242"/>
+              <a:ext cx="4572000" cy="3058418"/>
+            </a:xfrm>
+            <a:prstGeom prst="rect">
+              <a:avLst/>
+            </a:prstGeom>
+          </p:spPr>
+        </p:pic>
         <p:sp>
           <p:nvSpPr>
             <p:cNvPr id="14" name="Rectangle 6"/>
@@ -16414,36 +16444,6 @@
             </a:p>
           </p:txBody>
         </p:sp>
-        <p:pic>
-          <p:nvPicPr>
-            <p:cNvPr id="8" name="selectMe"/>
-            <p:cNvPicPr>
-              <a:picLocks noChangeAspect="1"/>
-            </p:cNvPicPr>
-            <p:nvPr/>
-          </p:nvPicPr>
-          <p:blipFill>
-            <a:blip r:embed="rId3">
-              <a:extLst>
-                <a:ext uri="{28A0092B-C50C-407E-A947-70E740481C1C}">
-                  <a14:useLocalDpi xmlns:a14="http://schemas.microsoft.com/office/drawing/2010/main" val="0"/>
-                </a:ext>
-              </a:extLst>
-            </a:blip>
-            <a:stretch>
-              <a:fillRect/>
-            </a:stretch>
-          </p:blipFill>
-          <p:spPr>
-            <a:xfrm>
-              <a:off x="1447800" y="1650242"/>
-              <a:ext cx="4572000" cy="3058418"/>
-            </a:xfrm>
-            <a:prstGeom prst="rect">
-              <a:avLst/>
-            </a:prstGeom>
-          </p:spPr>
-        </p:pic>
       </p:grpSp>
     </p:spTree>
     <p:extLst>
@@ -18871,7 +18871,7 @@
   <a:extraClrSchemeLst/>
   <a:extLst>
     <a:ext uri="{05A4C25C-085E-4340-85A3-A5531E510DB2}">
-      <thm15:themeFamily xmlns:thm15="http://schemas.microsoft.com/office/thememl/2012/main" name="Office Theme" id="{62F939B6-93AF-4DB8-9C6B-D6C7DFDC589F}" vid="{4A3C46E8-61CC-4603-A589-7422A47A8E4A}"/>
+      <thm15:themeFamily xmlns="" xmlns:thm15="http://schemas.microsoft.com/office/thememl/2012/main" name="Office Theme" id="{62F939B6-93AF-4DB8-9C6B-D6C7DFDC589F}" vid="{4A3C46E8-61CC-4603-A589-7422A47A8E4A}"/>
     </a:ext>
   </a:extLst>
 </a:theme>
@@ -19132,7 +19132,7 @@
   <a:extraClrSchemeLst/>
   <a:extLst>
     <a:ext uri="{05A4C25C-085E-4340-85A3-A5531E510DB2}">
-      <thm15:themeFamily xmlns:thm15="http://schemas.microsoft.com/office/thememl/2012/main" name="Office Theme" id="{62F939B6-93AF-4DB8-9C6B-D6C7DFDC589F}" vid="{4A3C46E8-61CC-4603-A589-7422A47A8E4A}"/>
+      <thm15:themeFamily xmlns="" xmlns:thm15="http://schemas.microsoft.com/office/thememl/2012/main" name="Office Theme" id="{62F939B6-93AF-4DB8-9C6B-D6C7DFDC589F}" vid="{4A3C46E8-61CC-4603-A589-7422A47A8E4A}"/>
     </a:ext>
   </a:extLst>
 </a:theme>

</xml_diff>

<commit_message>
Fix misaligned box on slide 13
</commit_message>
<xml_diff>
--- a/doc/test/PasteLab.pptx
+++ b/doc/test/PasteLab.pptx
@@ -171,7 +171,18 @@
       </p14:sectionLst>
     </p:ext>
     <p:ext uri="{EFAFB233-063F-42B5-8137-9DF3F51BA10A}">
-      <p15:sldGuideLst xmlns="" xmlns:p15="http://schemas.microsoft.com/office/powerpoint/2012/main"/>
+      <p15:sldGuideLst xmlns:p15="http://schemas.microsoft.com/office/powerpoint/2012/main">
+        <p15:guide id="1" orient="horz" pos="2160">
+          <p15:clr>
+            <a:srgbClr val="A4A3A4"/>
+          </p15:clr>
+        </p15:guide>
+        <p15:guide id="2" pos="2880">
+          <p15:clr>
+            <a:srgbClr val="A4A3A4"/>
+          </p15:clr>
+        </p15:guide>
+      </p15:sldGuideLst>
     </p:ext>
   </p:extLst>
 </p:presentation>
@@ -259,7 +270,7 @@
           <a:p>
             <a:fld id="{43E32005-3A63-48D2-8C73-BF5F95786EBD}" type="datetimeFigureOut">
               <a:rPr lang="en-US" smtClean="0"/>
-              <a:t>5/26/2017</a:t>
+              <a:t>5/30/2017</a:t>
             </a:fld>
             <a:endParaRPr lang="en-US"/>
           </a:p>
@@ -2812,7 +2823,7 @@
           <a:p>
             <a:fld id="{699DC775-C286-4358-8C92-D7E584E969B3}" type="datetimeFigureOut">
               <a:rPr lang="en-US" smtClean="0"/>
-              <a:t>5/26/2017</a:t>
+              <a:t>5/30/2017</a:t>
             </a:fld>
             <a:endParaRPr lang="en-US"/>
           </a:p>
@@ -2980,7 +2991,7 @@
           <a:p>
             <a:fld id="{699DC775-C286-4358-8C92-D7E584E969B3}" type="datetimeFigureOut">
               <a:rPr lang="en-US" smtClean="0"/>
-              <a:t>5/26/2017</a:t>
+              <a:t>5/30/2017</a:t>
             </a:fld>
             <a:endParaRPr lang="en-US"/>
           </a:p>
@@ -3158,7 +3169,7 @@
           <a:p>
             <a:fld id="{699DC775-C286-4358-8C92-D7E584E969B3}" type="datetimeFigureOut">
               <a:rPr lang="en-US" smtClean="0"/>
-              <a:t>5/26/2017</a:t>
+              <a:t>5/30/2017</a:t>
             </a:fld>
             <a:endParaRPr lang="en-US"/>
           </a:p>
@@ -3398,7 +3409,7 @@
           <a:p>
             <a:fld id="{699DC775-C286-4358-8C92-D7E584E969B3}" type="datetimeFigureOut">
               <a:rPr lang="en-US" smtClean="0"/>
-              <a:t>5/26/2017</a:t>
+              <a:t>5/30/2017</a:t>
             </a:fld>
             <a:endParaRPr lang="en-US"/>
           </a:p>
@@ -3566,7 +3577,7 @@
           <a:p>
             <a:fld id="{699DC775-C286-4358-8C92-D7E584E969B3}" type="datetimeFigureOut">
               <a:rPr lang="en-US" smtClean="0"/>
-              <a:t>5/26/2017</a:t>
+              <a:t>5/30/2017</a:t>
             </a:fld>
             <a:endParaRPr lang="en-US"/>
           </a:p>
@@ -3811,7 +3822,7 @@
           <a:p>
             <a:fld id="{699DC775-C286-4358-8C92-D7E584E969B3}" type="datetimeFigureOut">
               <a:rPr lang="en-US" smtClean="0"/>
-              <a:t>5/26/2017</a:t>
+              <a:t>5/30/2017</a:t>
             </a:fld>
             <a:endParaRPr lang="en-US"/>
           </a:p>
@@ -4096,7 +4107,7 @@
           <a:p>
             <a:fld id="{699DC775-C286-4358-8C92-D7E584E969B3}" type="datetimeFigureOut">
               <a:rPr lang="en-US" smtClean="0"/>
-              <a:t>5/26/2017</a:t>
+              <a:t>5/30/2017</a:t>
             </a:fld>
             <a:endParaRPr lang="en-US"/>
           </a:p>
@@ -4515,7 +4526,7 @@
           <a:p>
             <a:fld id="{699DC775-C286-4358-8C92-D7E584E969B3}" type="datetimeFigureOut">
               <a:rPr lang="en-US" smtClean="0"/>
-              <a:t>5/26/2017</a:t>
+              <a:t>5/30/2017</a:t>
             </a:fld>
             <a:endParaRPr lang="en-US"/>
           </a:p>
@@ -4632,7 +4643,7 @@
           <a:p>
             <a:fld id="{699DC775-C286-4358-8C92-D7E584E969B3}" type="datetimeFigureOut">
               <a:rPr lang="en-US" smtClean="0"/>
-              <a:t>5/26/2017</a:t>
+              <a:t>5/30/2017</a:t>
             </a:fld>
             <a:endParaRPr lang="en-US"/>
           </a:p>
@@ -4727,7 +4738,7 @@
           <a:p>
             <a:fld id="{699DC775-C286-4358-8C92-D7E584E969B3}" type="datetimeFigureOut">
               <a:rPr lang="en-US" smtClean="0"/>
-              <a:t>5/26/2017</a:t>
+              <a:t>5/30/2017</a:t>
             </a:fld>
             <a:endParaRPr lang="en-US"/>
           </a:p>
@@ -5002,7 +5013,7 @@
           <a:p>
             <a:fld id="{699DC775-C286-4358-8C92-D7E584E969B3}" type="datetimeFigureOut">
               <a:rPr lang="en-US" smtClean="0"/>
-              <a:t>5/26/2017</a:t>
+              <a:t>5/30/2017</a:t>
             </a:fld>
             <a:endParaRPr lang="en-US"/>
           </a:p>
@@ -5170,7 +5181,7 @@
           <a:p>
             <a:fld id="{699DC775-C286-4358-8C92-D7E584E969B3}" type="datetimeFigureOut">
               <a:rPr lang="en-US" smtClean="0"/>
-              <a:t>5/26/2017</a:t>
+              <a:t>5/30/2017</a:t>
             </a:fld>
             <a:endParaRPr lang="en-US"/>
           </a:p>
@@ -5422,7 +5433,7 @@
           <a:p>
             <a:fld id="{699DC775-C286-4358-8C92-D7E584E969B3}" type="datetimeFigureOut">
               <a:rPr lang="en-US" smtClean="0"/>
-              <a:t>5/26/2017</a:t>
+              <a:t>5/30/2017</a:t>
             </a:fld>
             <a:endParaRPr lang="en-US"/>
           </a:p>
@@ -5590,7 +5601,7 @@
           <a:p>
             <a:fld id="{699DC775-C286-4358-8C92-D7E584E969B3}" type="datetimeFigureOut">
               <a:rPr lang="en-US" smtClean="0"/>
-              <a:t>5/26/2017</a:t>
+              <a:t>5/30/2017</a:t>
             </a:fld>
             <a:endParaRPr lang="en-US"/>
           </a:p>
@@ -5768,7 +5779,7 @@
           <a:p>
             <a:fld id="{699DC775-C286-4358-8C92-D7E584E969B3}" type="datetimeFigureOut">
               <a:rPr lang="en-US" smtClean="0"/>
-              <a:t>5/26/2017</a:t>
+              <a:t>5/30/2017</a:t>
             </a:fld>
             <a:endParaRPr lang="en-US"/>
           </a:p>
@@ -6016,7 +6027,7 @@
           <a:p>
             <a:fld id="{699DC775-C286-4358-8C92-D7E584E969B3}" type="datetimeFigureOut">
               <a:rPr lang="en-US" smtClean="0"/>
-              <a:t>5/26/2017</a:t>
+              <a:t>5/30/2017</a:t>
             </a:fld>
             <a:endParaRPr lang="en-US"/>
           </a:p>
@@ -6192,7 +6203,7 @@
           <a:p>
             <a:fld id="{699DC775-C286-4358-8C92-D7E584E969B3}" type="datetimeFigureOut">
               <a:rPr lang="en-US" smtClean="0"/>
-              <a:t>5/26/2017</a:t>
+              <a:t>5/30/2017</a:t>
             </a:fld>
             <a:endParaRPr lang="en-US"/>
           </a:p>
@@ -6445,7 +6456,7 @@
           <a:p>
             <a:fld id="{699DC775-C286-4358-8C92-D7E584E969B3}" type="datetimeFigureOut">
               <a:rPr lang="en-US" smtClean="0"/>
-              <a:t>5/26/2017</a:t>
+              <a:t>5/30/2017</a:t>
             </a:fld>
             <a:endParaRPr lang="en-US"/>
           </a:p>
@@ -6738,7 +6749,7 @@
           <a:p>
             <a:fld id="{699DC775-C286-4358-8C92-D7E584E969B3}" type="datetimeFigureOut">
               <a:rPr lang="en-US" smtClean="0"/>
-              <a:t>5/26/2017</a:t>
+              <a:t>5/30/2017</a:t>
             </a:fld>
             <a:endParaRPr lang="en-US"/>
           </a:p>
@@ -7165,7 +7176,7 @@
           <a:p>
             <a:fld id="{699DC775-C286-4358-8C92-D7E584E969B3}" type="datetimeFigureOut">
               <a:rPr lang="en-US" smtClean="0"/>
-              <a:t>5/26/2017</a:t>
+              <a:t>5/30/2017</a:t>
             </a:fld>
             <a:endParaRPr lang="en-US"/>
           </a:p>
@@ -7290,7 +7301,7 @@
           <a:p>
             <a:fld id="{699DC775-C286-4358-8C92-D7E584E969B3}" type="datetimeFigureOut">
               <a:rPr lang="en-US" smtClean="0"/>
-              <a:t>5/26/2017</a:t>
+              <a:t>5/30/2017</a:t>
             </a:fld>
             <a:endParaRPr lang="en-US"/>
           </a:p>
@@ -7393,7 +7404,7 @@
           <a:p>
             <a:fld id="{699DC775-C286-4358-8C92-D7E584E969B3}" type="datetimeFigureOut">
               <a:rPr lang="en-US" smtClean="0"/>
-              <a:t>5/26/2017</a:t>
+              <a:t>5/30/2017</a:t>
             </a:fld>
             <a:endParaRPr lang="en-US"/>
           </a:p>
@@ -7638,7 +7649,7 @@
           <a:p>
             <a:fld id="{699DC775-C286-4358-8C92-D7E584E969B3}" type="datetimeFigureOut">
               <a:rPr lang="en-US" smtClean="0"/>
-              <a:t>5/26/2017</a:t>
+              <a:t>5/30/2017</a:t>
             </a:fld>
             <a:endParaRPr lang="en-US"/>
           </a:p>
@@ -7921,7 +7932,7 @@
           <a:p>
             <a:fld id="{699DC775-C286-4358-8C92-D7E584E969B3}" type="datetimeFigureOut">
               <a:rPr lang="en-US" smtClean="0"/>
-              <a:t>5/26/2017</a:t>
+              <a:t>5/30/2017</a:t>
             </a:fld>
             <a:endParaRPr lang="en-US"/>
           </a:p>
@@ -8181,7 +8192,7 @@
           <a:p>
             <a:fld id="{699DC775-C286-4358-8C92-D7E584E969B3}" type="datetimeFigureOut">
               <a:rPr lang="en-US" smtClean="0"/>
-              <a:t>5/26/2017</a:t>
+              <a:t>5/30/2017</a:t>
             </a:fld>
             <a:endParaRPr lang="en-US"/>
           </a:p>
@@ -8357,7 +8368,7 @@
           <a:p>
             <a:fld id="{699DC775-C286-4358-8C92-D7E584E969B3}" type="datetimeFigureOut">
               <a:rPr lang="en-US" smtClean="0"/>
-              <a:t>5/26/2017</a:t>
+              <a:t>5/30/2017</a:t>
             </a:fld>
             <a:endParaRPr lang="en-US"/>
           </a:p>
@@ -8543,7 +8554,7 @@
           <a:p>
             <a:fld id="{699DC775-C286-4358-8C92-D7E584E969B3}" type="datetimeFigureOut">
               <a:rPr lang="en-US" smtClean="0"/>
-              <a:t>5/26/2017</a:t>
+              <a:t>5/30/2017</a:t>
             </a:fld>
             <a:endParaRPr lang="en-US"/>
           </a:p>
@@ -8735,7 +8746,7 @@
           <a:p>
             <a:fld id="{45696B32-6A70-48EC-8939-9D142D9557CD}" type="datetimeFigureOut">
               <a:rPr lang="en-US" smtClean="0"/>
-              <a:t>5/26/2017</a:t>
+              <a:t>5/30/2017</a:t>
             </a:fld>
             <a:endParaRPr lang="en-US"/>
           </a:p>
@@ -9051,7 +9062,7 @@
           <a:p>
             <a:fld id="{45696B32-6A70-48EC-8939-9D142D9557CD}" type="datetimeFigureOut">
               <a:rPr lang="en-US" smtClean="0"/>
-              <a:t>5/26/2017</a:t>
+              <a:t>5/30/2017</a:t>
             </a:fld>
             <a:endParaRPr lang="en-US"/>
           </a:p>
@@ -9297,7 +9308,7 @@
           <a:p>
             <a:fld id="{45696B32-6A70-48EC-8939-9D142D9557CD}" type="datetimeFigureOut">
               <a:rPr lang="en-US" smtClean="0"/>
-              <a:t>5/26/2017</a:t>
+              <a:t>5/30/2017</a:t>
             </a:fld>
             <a:endParaRPr lang="en-US"/>
           </a:p>
@@ -9529,7 +9540,7 @@
           <a:p>
             <a:fld id="{45696B32-6A70-48EC-8939-9D142D9557CD}" type="datetimeFigureOut">
               <a:rPr lang="en-US" smtClean="0"/>
-              <a:t>5/26/2017</a:t>
+              <a:t>5/30/2017</a:t>
             </a:fld>
             <a:endParaRPr lang="en-US"/>
           </a:p>
@@ -9896,7 +9907,7 @@
           <a:p>
             <a:fld id="{45696B32-6A70-48EC-8939-9D142D9557CD}" type="datetimeFigureOut">
               <a:rPr lang="en-US" smtClean="0"/>
-              <a:t>5/26/2017</a:t>
+              <a:t>5/30/2017</a:t>
             </a:fld>
             <a:endParaRPr lang="en-US"/>
           </a:p>
@@ -10014,7 +10025,7 @@
           <a:p>
             <a:fld id="{45696B32-6A70-48EC-8939-9D142D9557CD}" type="datetimeFigureOut">
               <a:rPr lang="en-US" smtClean="0"/>
-              <a:t>5/26/2017</a:t>
+              <a:t>5/30/2017</a:t>
             </a:fld>
             <a:endParaRPr lang="en-US"/>
           </a:p>
@@ -10299,7 +10310,7 @@
           <a:p>
             <a:fld id="{699DC775-C286-4358-8C92-D7E584E969B3}" type="datetimeFigureOut">
               <a:rPr lang="en-US" smtClean="0"/>
-              <a:t>5/26/2017</a:t>
+              <a:t>5/30/2017</a:t>
             </a:fld>
             <a:endParaRPr lang="en-US"/>
           </a:p>
@@ -10394,7 +10405,7 @@
           <a:p>
             <a:fld id="{45696B32-6A70-48EC-8939-9D142D9557CD}" type="datetimeFigureOut">
               <a:rPr lang="en-US" smtClean="0"/>
-              <a:t>5/26/2017</a:t>
+              <a:t>5/30/2017</a:t>
             </a:fld>
             <a:endParaRPr lang="en-US"/>
           </a:p>
@@ -10671,7 +10682,7 @@
           <a:p>
             <a:fld id="{45696B32-6A70-48EC-8939-9D142D9557CD}" type="datetimeFigureOut">
               <a:rPr lang="en-US" smtClean="0"/>
-              <a:t>5/26/2017</a:t>
+              <a:t>5/30/2017</a:t>
             </a:fld>
             <a:endParaRPr lang="en-US"/>
           </a:p>
@@ -10924,7 +10935,7 @@
           <a:p>
             <a:fld id="{45696B32-6A70-48EC-8939-9D142D9557CD}" type="datetimeFigureOut">
               <a:rPr lang="en-US" smtClean="0"/>
-              <a:t>5/26/2017</a:t>
+              <a:t>5/30/2017</a:t>
             </a:fld>
             <a:endParaRPr lang="en-US"/>
           </a:p>
@@ -11094,7 +11105,7 @@
           <a:p>
             <a:fld id="{45696B32-6A70-48EC-8939-9D142D9557CD}" type="datetimeFigureOut">
               <a:rPr lang="en-US" smtClean="0"/>
-              <a:t>5/26/2017</a:t>
+              <a:t>5/30/2017</a:t>
             </a:fld>
             <a:endParaRPr lang="en-US"/>
           </a:p>
@@ -11274,7 +11285,7 @@
           <a:p>
             <a:fld id="{45696B32-6A70-48EC-8939-9D142D9557CD}" type="datetimeFigureOut">
               <a:rPr lang="en-US" smtClean="0"/>
-              <a:t>5/26/2017</a:t>
+              <a:t>5/30/2017</a:t>
             </a:fld>
             <a:endParaRPr lang="en-US"/>
           </a:p>
@@ -11693,7 +11704,7 @@
           <a:p>
             <a:fld id="{699DC775-C286-4358-8C92-D7E584E969B3}" type="datetimeFigureOut">
               <a:rPr lang="en-US" smtClean="0"/>
-              <a:t>5/26/2017</a:t>
+              <a:t>5/30/2017</a:t>
             </a:fld>
             <a:endParaRPr lang="en-US"/>
           </a:p>
@@ -11810,7 +11821,7 @@
           <a:p>
             <a:fld id="{699DC775-C286-4358-8C92-D7E584E969B3}" type="datetimeFigureOut">
               <a:rPr lang="en-US" smtClean="0"/>
-              <a:t>5/26/2017</a:t>
+              <a:t>5/30/2017</a:t>
             </a:fld>
             <a:endParaRPr lang="en-US"/>
           </a:p>
@@ -11905,7 +11916,7 @@
           <a:p>
             <a:fld id="{699DC775-C286-4358-8C92-D7E584E969B3}" type="datetimeFigureOut">
               <a:rPr lang="en-US" smtClean="0"/>
-              <a:t>5/26/2017</a:t>
+              <a:t>5/30/2017</a:t>
             </a:fld>
             <a:endParaRPr lang="en-US"/>
           </a:p>
@@ -12180,7 +12191,7 @@
           <a:p>
             <a:fld id="{699DC775-C286-4358-8C92-D7E584E969B3}" type="datetimeFigureOut">
               <a:rPr lang="en-US" smtClean="0"/>
-              <a:t>5/26/2017</a:t>
+              <a:t>5/30/2017</a:t>
             </a:fld>
             <a:endParaRPr lang="en-US"/>
           </a:p>
@@ -12432,7 +12443,7 @@
           <a:p>
             <a:fld id="{699DC775-C286-4358-8C92-D7E584E969B3}" type="datetimeFigureOut">
               <a:rPr lang="en-US" smtClean="0"/>
-              <a:t>5/26/2017</a:t>
+              <a:t>5/30/2017</a:t>
             </a:fld>
             <a:endParaRPr lang="en-US"/>
           </a:p>
@@ -12643,7 +12654,7 @@
           <a:p>
             <a:fld id="{699DC775-C286-4358-8C92-D7E584E969B3}" type="datetimeFigureOut">
               <a:rPr lang="en-US" smtClean="0"/>
-              <a:t>5/26/2017</a:t>
+              <a:t>5/30/2017</a:t>
             </a:fld>
             <a:endParaRPr lang="en-US"/>
           </a:p>
@@ -13156,7 +13167,7 @@
           <a:p>
             <a:fld id="{699DC775-C286-4358-8C92-D7E584E969B3}" type="datetimeFigureOut">
               <a:rPr lang="en-US" smtClean="0"/>
-              <a:t>5/26/2017</a:t>
+              <a:t>5/30/2017</a:t>
             </a:fld>
             <a:endParaRPr lang="en-US"/>
           </a:p>
@@ -13667,7 +13678,7 @@
           <a:p>
             <a:fld id="{699DC775-C286-4358-8C92-D7E584E969B3}" type="datetimeFigureOut">
               <a:rPr lang="en-US" smtClean="0"/>
-              <a:t>5/26/2017</a:t>
+              <a:t>5/30/2017</a:t>
             </a:fld>
             <a:endParaRPr lang="en-US"/>
           </a:p>
@@ -14177,7 +14188,7 @@
           <a:p>
             <a:fld id="{45696B32-6A70-48EC-8939-9D142D9557CD}" type="datetimeFigureOut">
               <a:rPr lang="en-US" smtClean="0"/>
-              <a:t>5/26/2017</a:t>
+              <a:t>5/30/2017</a:t>
             </a:fld>
             <a:endParaRPr lang="en-US"/>
           </a:p>
@@ -15071,7 +15082,7 @@
         </p:nvSpPr>
         <p:spPr>
           <a:xfrm>
-            <a:off x="1269242" y="1049740"/>
+            <a:off x="1295400" y="1066800"/>
             <a:ext cx="4572000" cy="3058418"/>
           </a:xfrm>
           <a:prstGeom prst="rect">
@@ -15153,11 +15164,19 @@
           <a:prstGeom prst="rect">
             <a:avLst/>
           </a:prstGeom>
-          <a:noFill/>
-          <a:ln w="38100">
+          <a:solidFill>
+            <a:scrgbClr r="0" g="0" b="0">
+              <a:alpha val="0"/>
+            </a:scrgbClr>
+          </a:solidFill>
+          <a:ln w="38100" cap="flat" cmpd="sng" algn="ctr">
             <a:solidFill>
-              <a:schemeClr val="tx1"/>
+              <a:srgbClr val="000000"/>
             </a:solidFill>
+            <a:prstDash val="solid"/>
+            <a:round/>
+            <a:headEnd type="none" w="med" len="med"/>
+            <a:tailEnd type="none" w="med" len="med"/>
           </a:ln>
         </p:spPr>
         <p:style>
@@ -15181,7 +15200,12 @@
           <a:lstStyle/>
           <a:p>
             <a:pPr algn="ctr"/>
-            <a:endParaRPr lang="en-US"/>
+            <a:endParaRPr lang="en-US">
+              <a:solidFill>
+                <a:srgbClr val="FFFFFF"/>
+              </a:solidFill>
+              <a:latin typeface="Calibri" panose="020F0502020204030204" pitchFamily="34" charset="0"/>
+            </a:endParaRPr>
           </a:p>
         </p:txBody>
       </p:sp>
@@ -18871,7 +18895,7 @@
   <a:extraClrSchemeLst/>
   <a:extLst>
     <a:ext uri="{05A4C25C-085E-4340-85A3-A5531E510DB2}">
-      <thm15:themeFamily xmlns="" xmlns:thm15="http://schemas.microsoft.com/office/thememl/2012/main" name="Office Theme" id="{62F939B6-93AF-4DB8-9C6B-D6C7DFDC589F}" vid="{4A3C46E8-61CC-4603-A589-7422A47A8E4A}"/>
+      <thm15:themeFamily xmlns:thm15="http://schemas.microsoft.com/office/thememl/2012/main" name="Office Theme" id="{62F939B6-93AF-4DB8-9C6B-D6C7DFDC589F}" vid="{4A3C46E8-61CC-4603-A589-7422A47A8E4A}"/>
     </a:ext>
   </a:extLst>
 </a:theme>
@@ -19132,7 +19156,7 @@
   <a:extraClrSchemeLst/>
   <a:extLst>
     <a:ext uri="{05A4C25C-085E-4340-85A3-A5531E510DB2}">
-      <thm15:themeFamily xmlns="" xmlns:thm15="http://schemas.microsoft.com/office/thememl/2012/main" name="Office Theme" id="{62F939B6-93AF-4DB8-9C6B-D6C7DFDC589F}" vid="{4A3C46E8-61CC-4603-A589-7422A47A8E4A}"/>
+      <thm15:themeFamily xmlns:thm15="http://schemas.microsoft.com/office/thememl/2012/main" name="Office Theme" id="{62F939B6-93AF-4DB8-9C6B-D6C7DFDC589F}" vid="{4A3C46E8-61CC-4603-A589-7422A47A8E4A}"/>
     </a:ext>
   </a:extLst>
 </a:theme>

</xml_diff>

<commit_message>
Fix misaligned box on slide 13 (#1391)
</commit_message>
<xml_diff>
--- a/doc/test/PasteLab.pptx
+++ b/doc/test/PasteLab.pptx
@@ -171,7 +171,18 @@
       </p14:sectionLst>
     </p:ext>
     <p:ext uri="{EFAFB233-063F-42B5-8137-9DF3F51BA10A}">
-      <p15:sldGuideLst xmlns="" xmlns:p15="http://schemas.microsoft.com/office/powerpoint/2012/main"/>
+      <p15:sldGuideLst xmlns:p15="http://schemas.microsoft.com/office/powerpoint/2012/main">
+        <p15:guide id="1" orient="horz" pos="2160">
+          <p15:clr>
+            <a:srgbClr val="A4A3A4"/>
+          </p15:clr>
+        </p15:guide>
+        <p15:guide id="2" pos="2880">
+          <p15:clr>
+            <a:srgbClr val="A4A3A4"/>
+          </p15:clr>
+        </p15:guide>
+      </p15:sldGuideLst>
     </p:ext>
   </p:extLst>
 </p:presentation>
@@ -259,7 +270,7 @@
           <a:p>
             <a:fld id="{43E32005-3A63-48D2-8C73-BF5F95786EBD}" type="datetimeFigureOut">
               <a:rPr lang="en-US" smtClean="0"/>
-              <a:t>5/26/2017</a:t>
+              <a:t>5/30/2017</a:t>
             </a:fld>
             <a:endParaRPr lang="en-US"/>
           </a:p>
@@ -2812,7 +2823,7 @@
           <a:p>
             <a:fld id="{699DC775-C286-4358-8C92-D7E584E969B3}" type="datetimeFigureOut">
               <a:rPr lang="en-US" smtClean="0"/>
-              <a:t>5/26/2017</a:t>
+              <a:t>5/30/2017</a:t>
             </a:fld>
             <a:endParaRPr lang="en-US"/>
           </a:p>
@@ -2980,7 +2991,7 @@
           <a:p>
             <a:fld id="{699DC775-C286-4358-8C92-D7E584E969B3}" type="datetimeFigureOut">
               <a:rPr lang="en-US" smtClean="0"/>
-              <a:t>5/26/2017</a:t>
+              <a:t>5/30/2017</a:t>
             </a:fld>
             <a:endParaRPr lang="en-US"/>
           </a:p>
@@ -3158,7 +3169,7 @@
           <a:p>
             <a:fld id="{699DC775-C286-4358-8C92-D7E584E969B3}" type="datetimeFigureOut">
               <a:rPr lang="en-US" smtClean="0"/>
-              <a:t>5/26/2017</a:t>
+              <a:t>5/30/2017</a:t>
             </a:fld>
             <a:endParaRPr lang="en-US"/>
           </a:p>
@@ -3398,7 +3409,7 @@
           <a:p>
             <a:fld id="{699DC775-C286-4358-8C92-D7E584E969B3}" type="datetimeFigureOut">
               <a:rPr lang="en-US" smtClean="0"/>
-              <a:t>5/26/2017</a:t>
+              <a:t>5/30/2017</a:t>
             </a:fld>
             <a:endParaRPr lang="en-US"/>
           </a:p>
@@ -3566,7 +3577,7 @@
           <a:p>
             <a:fld id="{699DC775-C286-4358-8C92-D7E584E969B3}" type="datetimeFigureOut">
               <a:rPr lang="en-US" smtClean="0"/>
-              <a:t>5/26/2017</a:t>
+              <a:t>5/30/2017</a:t>
             </a:fld>
             <a:endParaRPr lang="en-US"/>
           </a:p>
@@ -3811,7 +3822,7 @@
           <a:p>
             <a:fld id="{699DC775-C286-4358-8C92-D7E584E969B3}" type="datetimeFigureOut">
               <a:rPr lang="en-US" smtClean="0"/>
-              <a:t>5/26/2017</a:t>
+              <a:t>5/30/2017</a:t>
             </a:fld>
             <a:endParaRPr lang="en-US"/>
           </a:p>
@@ -4096,7 +4107,7 @@
           <a:p>
             <a:fld id="{699DC775-C286-4358-8C92-D7E584E969B3}" type="datetimeFigureOut">
               <a:rPr lang="en-US" smtClean="0"/>
-              <a:t>5/26/2017</a:t>
+              <a:t>5/30/2017</a:t>
             </a:fld>
             <a:endParaRPr lang="en-US"/>
           </a:p>
@@ -4515,7 +4526,7 @@
           <a:p>
             <a:fld id="{699DC775-C286-4358-8C92-D7E584E969B3}" type="datetimeFigureOut">
               <a:rPr lang="en-US" smtClean="0"/>
-              <a:t>5/26/2017</a:t>
+              <a:t>5/30/2017</a:t>
             </a:fld>
             <a:endParaRPr lang="en-US"/>
           </a:p>
@@ -4632,7 +4643,7 @@
           <a:p>
             <a:fld id="{699DC775-C286-4358-8C92-D7E584E969B3}" type="datetimeFigureOut">
               <a:rPr lang="en-US" smtClean="0"/>
-              <a:t>5/26/2017</a:t>
+              <a:t>5/30/2017</a:t>
             </a:fld>
             <a:endParaRPr lang="en-US"/>
           </a:p>
@@ -4727,7 +4738,7 @@
           <a:p>
             <a:fld id="{699DC775-C286-4358-8C92-D7E584E969B3}" type="datetimeFigureOut">
               <a:rPr lang="en-US" smtClean="0"/>
-              <a:t>5/26/2017</a:t>
+              <a:t>5/30/2017</a:t>
             </a:fld>
             <a:endParaRPr lang="en-US"/>
           </a:p>
@@ -5002,7 +5013,7 @@
           <a:p>
             <a:fld id="{699DC775-C286-4358-8C92-D7E584E969B3}" type="datetimeFigureOut">
               <a:rPr lang="en-US" smtClean="0"/>
-              <a:t>5/26/2017</a:t>
+              <a:t>5/30/2017</a:t>
             </a:fld>
             <a:endParaRPr lang="en-US"/>
           </a:p>
@@ -5170,7 +5181,7 @@
           <a:p>
             <a:fld id="{699DC775-C286-4358-8C92-D7E584E969B3}" type="datetimeFigureOut">
               <a:rPr lang="en-US" smtClean="0"/>
-              <a:t>5/26/2017</a:t>
+              <a:t>5/30/2017</a:t>
             </a:fld>
             <a:endParaRPr lang="en-US"/>
           </a:p>
@@ -5422,7 +5433,7 @@
           <a:p>
             <a:fld id="{699DC775-C286-4358-8C92-D7E584E969B3}" type="datetimeFigureOut">
               <a:rPr lang="en-US" smtClean="0"/>
-              <a:t>5/26/2017</a:t>
+              <a:t>5/30/2017</a:t>
             </a:fld>
             <a:endParaRPr lang="en-US"/>
           </a:p>
@@ -5590,7 +5601,7 @@
           <a:p>
             <a:fld id="{699DC775-C286-4358-8C92-D7E584E969B3}" type="datetimeFigureOut">
               <a:rPr lang="en-US" smtClean="0"/>
-              <a:t>5/26/2017</a:t>
+              <a:t>5/30/2017</a:t>
             </a:fld>
             <a:endParaRPr lang="en-US"/>
           </a:p>
@@ -5768,7 +5779,7 @@
           <a:p>
             <a:fld id="{699DC775-C286-4358-8C92-D7E584E969B3}" type="datetimeFigureOut">
               <a:rPr lang="en-US" smtClean="0"/>
-              <a:t>5/26/2017</a:t>
+              <a:t>5/30/2017</a:t>
             </a:fld>
             <a:endParaRPr lang="en-US"/>
           </a:p>
@@ -6016,7 +6027,7 @@
           <a:p>
             <a:fld id="{699DC775-C286-4358-8C92-D7E584E969B3}" type="datetimeFigureOut">
               <a:rPr lang="en-US" smtClean="0"/>
-              <a:t>5/26/2017</a:t>
+              <a:t>5/30/2017</a:t>
             </a:fld>
             <a:endParaRPr lang="en-US"/>
           </a:p>
@@ -6192,7 +6203,7 @@
           <a:p>
             <a:fld id="{699DC775-C286-4358-8C92-D7E584E969B3}" type="datetimeFigureOut">
               <a:rPr lang="en-US" smtClean="0"/>
-              <a:t>5/26/2017</a:t>
+              <a:t>5/30/2017</a:t>
             </a:fld>
             <a:endParaRPr lang="en-US"/>
           </a:p>
@@ -6445,7 +6456,7 @@
           <a:p>
             <a:fld id="{699DC775-C286-4358-8C92-D7E584E969B3}" type="datetimeFigureOut">
               <a:rPr lang="en-US" smtClean="0"/>
-              <a:t>5/26/2017</a:t>
+              <a:t>5/30/2017</a:t>
             </a:fld>
             <a:endParaRPr lang="en-US"/>
           </a:p>
@@ -6738,7 +6749,7 @@
           <a:p>
             <a:fld id="{699DC775-C286-4358-8C92-D7E584E969B3}" type="datetimeFigureOut">
               <a:rPr lang="en-US" smtClean="0"/>
-              <a:t>5/26/2017</a:t>
+              <a:t>5/30/2017</a:t>
             </a:fld>
             <a:endParaRPr lang="en-US"/>
           </a:p>
@@ -7165,7 +7176,7 @@
           <a:p>
             <a:fld id="{699DC775-C286-4358-8C92-D7E584E969B3}" type="datetimeFigureOut">
               <a:rPr lang="en-US" smtClean="0"/>
-              <a:t>5/26/2017</a:t>
+              <a:t>5/30/2017</a:t>
             </a:fld>
             <a:endParaRPr lang="en-US"/>
           </a:p>
@@ -7290,7 +7301,7 @@
           <a:p>
             <a:fld id="{699DC775-C286-4358-8C92-D7E584E969B3}" type="datetimeFigureOut">
               <a:rPr lang="en-US" smtClean="0"/>
-              <a:t>5/26/2017</a:t>
+              <a:t>5/30/2017</a:t>
             </a:fld>
             <a:endParaRPr lang="en-US"/>
           </a:p>
@@ -7393,7 +7404,7 @@
           <a:p>
             <a:fld id="{699DC775-C286-4358-8C92-D7E584E969B3}" type="datetimeFigureOut">
               <a:rPr lang="en-US" smtClean="0"/>
-              <a:t>5/26/2017</a:t>
+              <a:t>5/30/2017</a:t>
             </a:fld>
             <a:endParaRPr lang="en-US"/>
           </a:p>
@@ -7638,7 +7649,7 @@
           <a:p>
             <a:fld id="{699DC775-C286-4358-8C92-D7E584E969B3}" type="datetimeFigureOut">
               <a:rPr lang="en-US" smtClean="0"/>
-              <a:t>5/26/2017</a:t>
+              <a:t>5/30/2017</a:t>
             </a:fld>
             <a:endParaRPr lang="en-US"/>
           </a:p>
@@ -7921,7 +7932,7 @@
           <a:p>
             <a:fld id="{699DC775-C286-4358-8C92-D7E584E969B3}" type="datetimeFigureOut">
               <a:rPr lang="en-US" smtClean="0"/>
-              <a:t>5/26/2017</a:t>
+              <a:t>5/30/2017</a:t>
             </a:fld>
             <a:endParaRPr lang="en-US"/>
           </a:p>
@@ -8181,7 +8192,7 @@
           <a:p>
             <a:fld id="{699DC775-C286-4358-8C92-D7E584E969B3}" type="datetimeFigureOut">
               <a:rPr lang="en-US" smtClean="0"/>
-              <a:t>5/26/2017</a:t>
+              <a:t>5/30/2017</a:t>
             </a:fld>
             <a:endParaRPr lang="en-US"/>
           </a:p>
@@ -8357,7 +8368,7 @@
           <a:p>
             <a:fld id="{699DC775-C286-4358-8C92-D7E584E969B3}" type="datetimeFigureOut">
               <a:rPr lang="en-US" smtClean="0"/>
-              <a:t>5/26/2017</a:t>
+              <a:t>5/30/2017</a:t>
             </a:fld>
             <a:endParaRPr lang="en-US"/>
           </a:p>
@@ -8543,7 +8554,7 @@
           <a:p>
             <a:fld id="{699DC775-C286-4358-8C92-D7E584E969B3}" type="datetimeFigureOut">
               <a:rPr lang="en-US" smtClean="0"/>
-              <a:t>5/26/2017</a:t>
+              <a:t>5/30/2017</a:t>
             </a:fld>
             <a:endParaRPr lang="en-US"/>
           </a:p>
@@ -8735,7 +8746,7 @@
           <a:p>
             <a:fld id="{45696B32-6A70-48EC-8939-9D142D9557CD}" type="datetimeFigureOut">
               <a:rPr lang="en-US" smtClean="0"/>
-              <a:t>5/26/2017</a:t>
+              <a:t>5/30/2017</a:t>
             </a:fld>
             <a:endParaRPr lang="en-US"/>
           </a:p>
@@ -9051,7 +9062,7 @@
           <a:p>
             <a:fld id="{45696B32-6A70-48EC-8939-9D142D9557CD}" type="datetimeFigureOut">
               <a:rPr lang="en-US" smtClean="0"/>
-              <a:t>5/26/2017</a:t>
+              <a:t>5/30/2017</a:t>
             </a:fld>
             <a:endParaRPr lang="en-US"/>
           </a:p>
@@ -9297,7 +9308,7 @@
           <a:p>
             <a:fld id="{45696B32-6A70-48EC-8939-9D142D9557CD}" type="datetimeFigureOut">
               <a:rPr lang="en-US" smtClean="0"/>
-              <a:t>5/26/2017</a:t>
+              <a:t>5/30/2017</a:t>
             </a:fld>
             <a:endParaRPr lang="en-US"/>
           </a:p>
@@ -9529,7 +9540,7 @@
           <a:p>
             <a:fld id="{45696B32-6A70-48EC-8939-9D142D9557CD}" type="datetimeFigureOut">
               <a:rPr lang="en-US" smtClean="0"/>
-              <a:t>5/26/2017</a:t>
+              <a:t>5/30/2017</a:t>
             </a:fld>
             <a:endParaRPr lang="en-US"/>
           </a:p>
@@ -9896,7 +9907,7 @@
           <a:p>
             <a:fld id="{45696B32-6A70-48EC-8939-9D142D9557CD}" type="datetimeFigureOut">
               <a:rPr lang="en-US" smtClean="0"/>
-              <a:t>5/26/2017</a:t>
+              <a:t>5/30/2017</a:t>
             </a:fld>
             <a:endParaRPr lang="en-US"/>
           </a:p>
@@ -10014,7 +10025,7 @@
           <a:p>
             <a:fld id="{45696B32-6A70-48EC-8939-9D142D9557CD}" type="datetimeFigureOut">
               <a:rPr lang="en-US" smtClean="0"/>
-              <a:t>5/26/2017</a:t>
+              <a:t>5/30/2017</a:t>
             </a:fld>
             <a:endParaRPr lang="en-US"/>
           </a:p>
@@ -10299,7 +10310,7 @@
           <a:p>
             <a:fld id="{699DC775-C286-4358-8C92-D7E584E969B3}" type="datetimeFigureOut">
               <a:rPr lang="en-US" smtClean="0"/>
-              <a:t>5/26/2017</a:t>
+              <a:t>5/30/2017</a:t>
             </a:fld>
             <a:endParaRPr lang="en-US"/>
           </a:p>
@@ -10394,7 +10405,7 @@
           <a:p>
             <a:fld id="{45696B32-6A70-48EC-8939-9D142D9557CD}" type="datetimeFigureOut">
               <a:rPr lang="en-US" smtClean="0"/>
-              <a:t>5/26/2017</a:t>
+              <a:t>5/30/2017</a:t>
             </a:fld>
             <a:endParaRPr lang="en-US"/>
           </a:p>
@@ -10671,7 +10682,7 @@
           <a:p>
             <a:fld id="{45696B32-6A70-48EC-8939-9D142D9557CD}" type="datetimeFigureOut">
               <a:rPr lang="en-US" smtClean="0"/>
-              <a:t>5/26/2017</a:t>
+              <a:t>5/30/2017</a:t>
             </a:fld>
             <a:endParaRPr lang="en-US"/>
           </a:p>
@@ -10924,7 +10935,7 @@
           <a:p>
             <a:fld id="{45696B32-6A70-48EC-8939-9D142D9557CD}" type="datetimeFigureOut">
               <a:rPr lang="en-US" smtClean="0"/>
-              <a:t>5/26/2017</a:t>
+              <a:t>5/30/2017</a:t>
             </a:fld>
             <a:endParaRPr lang="en-US"/>
           </a:p>
@@ -11094,7 +11105,7 @@
           <a:p>
             <a:fld id="{45696B32-6A70-48EC-8939-9D142D9557CD}" type="datetimeFigureOut">
               <a:rPr lang="en-US" smtClean="0"/>
-              <a:t>5/26/2017</a:t>
+              <a:t>5/30/2017</a:t>
             </a:fld>
             <a:endParaRPr lang="en-US"/>
           </a:p>
@@ -11274,7 +11285,7 @@
           <a:p>
             <a:fld id="{45696B32-6A70-48EC-8939-9D142D9557CD}" type="datetimeFigureOut">
               <a:rPr lang="en-US" smtClean="0"/>
-              <a:t>5/26/2017</a:t>
+              <a:t>5/30/2017</a:t>
             </a:fld>
             <a:endParaRPr lang="en-US"/>
           </a:p>
@@ -11693,7 +11704,7 @@
           <a:p>
             <a:fld id="{699DC775-C286-4358-8C92-D7E584E969B3}" type="datetimeFigureOut">
               <a:rPr lang="en-US" smtClean="0"/>
-              <a:t>5/26/2017</a:t>
+              <a:t>5/30/2017</a:t>
             </a:fld>
             <a:endParaRPr lang="en-US"/>
           </a:p>
@@ -11810,7 +11821,7 @@
           <a:p>
             <a:fld id="{699DC775-C286-4358-8C92-D7E584E969B3}" type="datetimeFigureOut">
               <a:rPr lang="en-US" smtClean="0"/>
-              <a:t>5/26/2017</a:t>
+              <a:t>5/30/2017</a:t>
             </a:fld>
             <a:endParaRPr lang="en-US"/>
           </a:p>
@@ -11905,7 +11916,7 @@
           <a:p>
             <a:fld id="{699DC775-C286-4358-8C92-D7E584E969B3}" type="datetimeFigureOut">
               <a:rPr lang="en-US" smtClean="0"/>
-              <a:t>5/26/2017</a:t>
+              <a:t>5/30/2017</a:t>
             </a:fld>
             <a:endParaRPr lang="en-US"/>
           </a:p>
@@ -12180,7 +12191,7 @@
           <a:p>
             <a:fld id="{699DC775-C286-4358-8C92-D7E584E969B3}" type="datetimeFigureOut">
               <a:rPr lang="en-US" smtClean="0"/>
-              <a:t>5/26/2017</a:t>
+              <a:t>5/30/2017</a:t>
             </a:fld>
             <a:endParaRPr lang="en-US"/>
           </a:p>
@@ -12432,7 +12443,7 @@
           <a:p>
             <a:fld id="{699DC775-C286-4358-8C92-D7E584E969B3}" type="datetimeFigureOut">
               <a:rPr lang="en-US" smtClean="0"/>
-              <a:t>5/26/2017</a:t>
+              <a:t>5/30/2017</a:t>
             </a:fld>
             <a:endParaRPr lang="en-US"/>
           </a:p>
@@ -12643,7 +12654,7 @@
           <a:p>
             <a:fld id="{699DC775-C286-4358-8C92-D7E584E969B3}" type="datetimeFigureOut">
               <a:rPr lang="en-US" smtClean="0"/>
-              <a:t>5/26/2017</a:t>
+              <a:t>5/30/2017</a:t>
             </a:fld>
             <a:endParaRPr lang="en-US"/>
           </a:p>
@@ -13156,7 +13167,7 @@
           <a:p>
             <a:fld id="{699DC775-C286-4358-8C92-D7E584E969B3}" type="datetimeFigureOut">
               <a:rPr lang="en-US" smtClean="0"/>
-              <a:t>5/26/2017</a:t>
+              <a:t>5/30/2017</a:t>
             </a:fld>
             <a:endParaRPr lang="en-US"/>
           </a:p>
@@ -13667,7 +13678,7 @@
           <a:p>
             <a:fld id="{699DC775-C286-4358-8C92-D7E584E969B3}" type="datetimeFigureOut">
               <a:rPr lang="en-US" smtClean="0"/>
-              <a:t>5/26/2017</a:t>
+              <a:t>5/30/2017</a:t>
             </a:fld>
             <a:endParaRPr lang="en-US"/>
           </a:p>
@@ -14177,7 +14188,7 @@
           <a:p>
             <a:fld id="{45696B32-6A70-48EC-8939-9D142D9557CD}" type="datetimeFigureOut">
               <a:rPr lang="en-US" smtClean="0"/>
-              <a:t>5/26/2017</a:t>
+              <a:t>5/30/2017</a:t>
             </a:fld>
             <a:endParaRPr lang="en-US"/>
           </a:p>
@@ -15071,7 +15082,7 @@
         </p:nvSpPr>
         <p:spPr>
           <a:xfrm>
-            <a:off x="1269242" y="1049740"/>
+            <a:off x="1295400" y="1066800"/>
             <a:ext cx="4572000" cy="3058418"/>
           </a:xfrm>
           <a:prstGeom prst="rect">
@@ -15153,11 +15164,19 @@
           <a:prstGeom prst="rect">
             <a:avLst/>
           </a:prstGeom>
-          <a:noFill/>
-          <a:ln w="38100">
+          <a:solidFill>
+            <a:scrgbClr r="0" g="0" b="0">
+              <a:alpha val="0"/>
+            </a:scrgbClr>
+          </a:solidFill>
+          <a:ln w="38100" cap="flat" cmpd="sng" algn="ctr">
             <a:solidFill>
-              <a:schemeClr val="tx1"/>
+              <a:srgbClr val="000000"/>
             </a:solidFill>
+            <a:prstDash val="solid"/>
+            <a:round/>
+            <a:headEnd type="none" w="med" len="med"/>
+            <a:tailEnd type="none" w="med" len="med"/>
           </a:ln>
         </p:spPr>
         <p:style>
@@ -15181,7 +15200,12 @@
           <a:lstStyle/>
           <a:p>
             <a:pPr algn="ctr"/>
-            <a:endParaRPr lang="en-US"/>
+            <a:endParaRPr lang="en-US">
+              <a:solidFill>
+                <a:srgbClr val="FFFFFF"/>
+              </a:solidFill>
+              <a:latin typeface="Calibri" panose="020F0502020204030204" pitchFamily="34" charset="0"/>
+            </a:endParaRPr>
           </a:p>
         </p:txBody>
       </p:sp>
@@ -18871,7 +18895,7 @@
   <a:extraClrSchemeLst/>
   <a:extLst>
     <a:ext uri="{05A4C25C-085E-4340-85A3-A5531E510DB2}">
-      <thm15:themeFamily xmlns="" xmlns:thm15="http://schemas.microsoft.com/office/thememl/2012/main" name="Office Theme" id="{62F939B6-93AF-4DB8-9C6B-D6C7DFDC589F}" vid="{4A3C46E8-61CC-4603-A589-7422A47A8E4A}"/>
+      <thm15:themeFamily xmlns:thm15="http://schemas.microsoft.com/office/thememl/2012/main" name="Office Theme" id="{62F939B6-93AF-4DB8-9C6B-D6C7DFDC589F}" vid="{4A3C46E8-61CC-4603-A589-7422A47A8E4A}"/>
     </a:ext>
   </a:extLst>
 </a:theme>
@@ -19132,7 +19156,7 @@
   <a:extraClrSchemeLst/>
   <a:extLst>
     <a:ext uri="{05A4C25C-085E-4340-85A3-A5531E510DB2}">
-      <thm15:themeFamily xmlns="" xmlns:thm15="http://schemas.microsoft.com/office/thememl/2012/main" name="Office Theme" id="{62F939B6-93AF-4DB8-9C6B-D6C7DFDC589F}" vid="{4A3C46E8-61CC-4603-A589-7422A47A8E4A}"/>
+      <thm15:themeFamily xmlns:thm15="http://schemas.microsoft.com/office/thememl/2012/main" name="Office Theme" id="{62F939B6-93AF-4DB8-9C6B-D6C7DFDC589F}" vid="{4A3C46E8-61CC-4603-A589-7422A47A8E4A}"/>
     </a:ext>
   </a:extLst>
 </a:theme>

</xml_diff>